<commit_message>
Changes to PPT 1
</commit_message>
<xml_diff>
--- a/GitIntro.pptx
+++ b/GitIntro.pptx
@@ -5,16 +5,18 @@
     <p:sldMasterId id="2147483660" r:id="rId4"/>
   </p:sldMasterIdLst>
   <p:notesMasterIdLst>
-    <p:notesMasterId r:id="rId9"/>
+    <p:notesMasterId r:id="rId11"/>
   </p:notesMasterIdLst>
   <p:handoutMasterIdLst>
-    <p:handoutMasterId r:id="rId10"/>
+    <p:handoutMasterId r:id="rId12"/>
   </p:handoutMasterIdLst>
   <p:sldIdLst>
     <p:sldId id="263" r:id="rId5"/>
     <p:sldId id="316" r:id="rId6"/>
     <p:sldId id="317" r:id="rId7"/>
-    <p:sldId id="318" r:id="rId8"/>
+    <p:sldId id="319" r:id="rId8"/>
+    <p:sldId id="320" r:id="rId9"/>
+    <p:sldId id="318" r:id="rId10"/>
   </p:sldIdLst>
   <p:sldSz cx="9144000" cy="6858000" type="screen4x3"/>
   <p:notesSz cx="6858000" cy="9144000"/>
@@ -151,7 +153,7 @@
   <pc:docChgLst>
     <pc:chgData name="Will Brooks" userId="d4c2b272-852e-451d-80ba-d2f905b38211" providerId="ADAL" clId="{37A0AFB6-F6CA-4F11-9C33-0D7619B1449C}"/>
     <pc:docChg chg="undo custSel addSld delSld modSld">
-      <pc:chgData name="Will Brooks" userId="d4c2b272-852e-451d-80ba-d2f905b38211" providerId="ADAL" clId="{37A0AFB6-F6CA-4F11-9C33-0D7619B1449C}" dt="2022-09-20T15:42:30.421" v="897" actId="20577"/>
+      <pc:chgData name="Will Brooks" userId="d4c2b272-852e-451d-80ba-d2f905b38211" providerId="ADAL" clId="{37A0AFB6-F6CA-4F11-9C33-0D7619B1449C}" dt="2022-09-21T08:48:31.834" v="3650" actId="20577"/>
       <pc:docMkLst>
         <pc:docMk/>
       </pc:docMkLst>
@@ -487,13 +489,13 @@
         </pc:sldMkLst>
       </pc:sldChg>
       <pc:sldChg chg="modSp add del mod">
-        <pc:chgData name="Will Brooks" userId="d4c2b272-852e-451d-80ba-d2f905b38211" providerId="ADAL" clId="{37A0AFB6-F6CA-4F11-9C33-0D7619B1449C}" dt="2022-09-20T15:40:14.155" v="823" actId="20577"/>
+        <pc:chgData name="Will Brooks" userId="d4c2b272-852e-451d-80ba-d2f905b38211" providerId="ADAL" clId="{37A0AFB6-F6CA-4F11-9C33-0D7619B1449C}" dt="2022-09-21T08:21:43.033" v="1000" actId="20577"/>
         <pc:sldMkLst>
           <pc:docMk/>
           <pc:sldMk cId="3770664684" sldId="316"/>
         </pc:sldMkLst>
         <pc:spChg chg="mod">
-          <ac:chgData name="Will Brooks" userId="d4c2b272-852e-451d-80ba-d2f905b38211" providerId="ADAL" clId="{37A0AFB6-F6CA-4F11-9C33-0D7619B1449C}" dt="2022-09-20T15:40:14.155" v="823" actId="20577"/>
+          <ac:chgData name="Will Brooks" userId="d4c2b272-852e-451d-80ba-d2f905b38211" providerId="ADAL" clId="{37A0AFB6-F6CA-4F11-9C33-0D7619B1449C}" dt="2022-09-21T08:21:43.033" v="1000" actId="20577"/>
           <ac:spMkLst>
             <pc:docMk/>
             <pc:sldMk cId="3770664684" sldId="316"/>
@@ -510,13 +512,13 @@
         </pc:spChg>
       </pc:sldChg>
       <pc:sldChg chg="modSp add mod">
-        <pc:chgData name="Will Brooks" userId="d4c2b272-852e-451d-80ba-d2f905b38211" providerId="ADAL" clId="{37A0AFB6-F6CA-4F11-9C33-0D7619B1449C}" dt="2022-09-20T15:41:51.407" v="851" actId="20577"/>
+        <pc:chgData name="Will Brooks" userId="d4c2b272-852e-451d-80ba-d2f905b38211" providerId="ADAL" clId="{37A0AFB6-F6CA-4F11-9C33-0D7619B1449C}" dt="2022-09-21T08:48:10.067" v="3634" actId="20577"/>
         <pc:sldMkLst>
           <pc:docMk/>
           <pc:sldMk cId="1180572286" sldId="317"/>
         </pc:sldMkLst>
         <pc:spChg chg="mod">
-          <ac:chgData name="Will Brooks" userId="d4c2b272-852e-451d-80ba-d2f905b38211" providerId="ADAL" clId="{37A0AFB6-F6CA-4F11-9C33-0D7619B1449C}" dt="2022-09-20T15:41:51.407" v="851" actId="20577"/>
+          <ac:chgData name="Will Brooks" userId="d4c2b272-852e-451d-80ba-d2f905b38211" providerId="ADAL" clId="{37A0AFB6-F6CA-4F11-9C33-0D7619B1449C}" dt="2022-09-21T08:35:45.266" v="2503" actId="5793"/>
           <ac:spMkLst>
             <pc:docMk/>
             <pc:sldMk cId="1180572286" sldId="317"/>
@@ -524,7 +526,7 @@
           </ac:spMkLst>
         </pc:spChg>
         <pc:spChg chg="mod">
-          <ac:chgData name="Will Brooks" userId="d4c2b272-852e-451d-80ba-d2f905b38211" providerId="ADAL" clId="{37A0AFB6-F6CA-4F11-9C33-0D7619B1449C}" dt="2022-09-20T15:40:52.677" v="850" actId="20577"/>
+          <ac:chgData name="Will Brooks" userId="d4c2b272-852e-451d-80ba-d2f905b38211" providerId="ADAL" clId="{37A0AFB6-F6CA-4F11-9C33-0D7619B1449C}" dt="2022-09-21T08:48:10.067" v="3634" actId="20577"/>
           <ac:spMkLst>
             <pc:docMk/>
             <pc:sldMk cId="1180572286" sldId="317"/>
@@ -543,6 +545,52 @@
           <ac:spMkLst>
             <pc:docMk/>
             <pc:sldMk cId="2310298358" sldId="318"/>
+            <ac:spMk id="4" creationId="{42A5EA90-17C9-4BD5-BD0D-74A5419E18C7}"/>
+          </ac:spMkLst>
+        </pc:spChg>
+      </pc:sldChg>
+      <pc:sldChg chg="modSp add mod">
+        <pc:chgData name="Will Brooks" userId="d4c2b272-852e-451d-80ba-d2f905b38211" providerId="ADAL" clId="{37A0AFB6-F6CA-4F11-9C33-0D7619B1449C}" dt="2022-09-21T08:47:59.311" v="3601" actId="20577"/>
+        <pc:sldMkLst>
+          <pc:docMk/>
+          <pc:sldMk cId="4006080756" sldId="319"/>
+        </pc:sldMkLst>
+        <pc:spChg chg="mod">
+          <ac:chgData name="Will Brooks" userId="d4c2b272-852e-451d-80ba-d2f905b38211" providerId="ADAL" clId="{37A0AFB6-F6CA-4F11-9C33-0D7619B1449C}" dt="2022-09-21T08:47:43.749" v="3581" actId="20577"/>
+          <ac:spMkLst>
+            <pc:docMk/>
+            <pc:sldMk cId="4006080756" sldId="319"/>
+            <ac:spMk id="2" creationId="{48869F42-6D93-4C35-8FA5-AE406994C1E3}"/>
+          </ac:spMkLst>
+        </pc:spChg>
+        <pc:spChg chg="mod">
+          <ac:chgData name="Will Brooks" userId="d4c2b272-852e-451d-80ba-d2f905b38211" providerId="ADAL" clId="{37A0AFB6-F6CA-4F11-9C33-0D7619B1449C}" dt="2022-09-21T08:47:59.311" v="3601" actId="20577"/>
+          <ac:spMkLst>
+            <pc:docMk/>
+            <pc:sldMk cId="4006080756" sldId="319"/>
+            <ac:spMk id="4" creationId="{42A5EA90-17C9-4BD5-BD0D-74A5419E18C7}"/>
+          </ac:spMkLst>
+        </pc:spChg>
+      </pc:sldChg>
+      <pc:sldChg chg="modSp add mod">
+        <pc:chgData name="Will Brooks" userId="d4c2b272-852e-451d-80ba-d2f905b38211" providerId="ADAL" clId="{37A0AFB6-F6CA-4F11-9C33-0D7619B1449C}" dt="2022-09-21T08:48:31.834" v="3650" actId="20577"/>
+        <pc:sldMkLst>
+          <pc:docMk/>
+          <pc:sldMk cId="3118825995" sldId="320"/>
+        </pc:sldMkLst>
+        <pc:spChg chg="mod">
+          <ac:chgData name="Will Brooks" userId="d4c2b272-852e-451d-80ba-d2f905b38211" providerId="ADAL" clId="{37A0AFB6-F6CA-4F11-9C33-0D7619B1449C}" dt="2022-09-21T08:48:31.834" v="3650" actId="20577"/>
+          <ac:spMkLst>
+            <pc:docMk/>
+            <pc:sldMk cId="3118825995" sldId="320"/>
+            <ac:spMk id="2" creationId="{48869F42-6D93-4C35-8FA5-AE406994C1E3}"/>
+          </ac:spMkLst>
+        </pc:spChg>
+        <pc:spChg chg="mod">
+          <ac:chgData name="Will Brooks" userId="d4c2b272-852e-451d-80ba-d2f905b38211" providerId="ADAL" clId="{37A0AFB6-F6CA-4F11-9C33-0D7619B1449C}" dt="2022-09-21T08:48:27.651" v="3649" actId="20577"/>
+          <ac:spMkLst>
+            <pc:docMk/>
+            <pc:sldMk cId="3118825995" sldId="320"/>
             <ac:spMk id="4" creationId="{42A5EA90-17C9-4BD5-BD0D-74A5419E18C7}"/>
           </ac:spMkLst>
         </pc:spChg>
@@ -634,7 +682,7 @@
           <a:p>
             <a:fld id="{1790A331-7ADD-4391-8CA5-606C9BFD26F5}" type="datetimeFigureOut">
               <a:rPr lang="en-GB" smtClean="0"/>
-              <a:t>20/09/2022</a:t>
+              <a:t>21/09/2022</a:t>
             </a:fld>
             <a:endParaRPr lang="en-GB" dirty="0"/>
           </a:p>
@@ -803,7 +851,7 @@
           <a:p>
             <a:fld id="{002AE991-F138-4FD8-982E-957F3CA6A0F6}" type="datetimeFigureOut">
               <a:rPr lang="en-GB" smtClean="0"/>
-              <a:t>20/09/2022</a:t>
+              <a:t>21/09/2022</a:t>
             </a:fld>
             <a:endParaRPr lang="en-GB" dirty="0"/>
           </a:p>
@@ -1378,6 +1426,220 @@
             <a:fld id="{7890AB7D-FC04-41BF-88F7-E47891A06283}" type="slidenum">
               <a:rPr lang="en-GB" smtClean="0"/>
               <a:t>4</a:t>
+            </a:fld>
+            <a:endParaRPr lang="en-GB" dirty="0"/>
+          </a:p>
+        </p:txBody>
+      </p:sp>
+    </p:spTree>
+    <p:extLst>
+      <p:ext uri="{BB962C8B-B14F-4D97-AF65-F5344CB8AC3E}">
+        <p14:creationId xmlns:p14="http://schemas.microsoft.com/office/powerpoint/2010/main" val="782249591"/>
+      </p:ext>
+    </p:extLst>
+  </p:cSld>
+  <p:clrMapOvr>
+    <a:masterClrMapping/>
+  </p:clrMapOvr>
+</p:notes>
+</file>
+
+<file path=ppt/notesSlides/notesSlide4.xml><?xml version="1.0" encoding="utf-8"?>
+<p:notes xmlns:a="http://schemas.openxmlformats.org/drawingml/2006/main" xmlns:r="http://schemas.openxmlformats.org/officeDocument/2006/relationships" xmlns:p="http://schemas.openxmlformats.org/presentationml/2006/main">
+  <p:cSld>
+    <p:spTree>
+      <p:nvGrpSpPr>
+        <p:cNvPr id="1" name=""/>
+        <p:cNvGrpSpPr/>
+        <p:nvPr/>
+      </p:nvGrpSpPr>
+      <p:grpSpPr>
+        <a:xfrm>
+          <a:off x="0" y="0"/>
+          <a:ext cx="0" cy="0"/>
+          <a:chOff x="0" y="0"/>
+          <a:chExt cx="0" cy="0"/>
+        </a:xfrm>
+      </p:grpSpPr>
+      <p:sp>
+        <p:nvSpPr>
+          <p:cNvPr id="2" name="Slide Image Placeholder 1"/>
+          <p:cNvSpPr>
+            <a:spLocks noGrp="1" noRot="1" noChangeAspect="1"/>
+          </p:cNvSpPr>
+          <p:nvPr>
+            <p:ph type="sldImg"/>
+          </p:nvPr>
+        </p:nvSpPr>
+        <p:spPr/>
+      </p:sp>
+      <p:sp>
+        <p:nvSpPr>
+          <p:cNvPr id="3" name="Notes Placeholder 2"/>
+          <p:cNvSpPr>
+            <a:spLocks noGrp="1"/>
+          </p:cNvSpPr>
+          <p:nvPr>
+            <p:ph type="body" idx="1"/>
+          </p:nvPr>
+        </p:nvSpPr>
+        <p:spPr/>
+        <p:txBody>
+          <a:bodyPr/>
+          <a:lstStyle/>
+          <a:p>
+            <a:endParaRPr lang="en-GB" dirty="0"/>
+          </a:p>
+        </p:txBody>
+      </p:sp>
+      <p:sp>
+        <p:nvSpPr>
+          <p:cNvPr id="4" name="Footer Placeholder 3"/>
+          <p:cNvSpPr>
+            <a:spLocks noGrp="1"/>
+          </p:cNvSpPr>
+          <p:nvPr>
+            <p:ph type="ftr" sz="quarter" idx="4"/>
+          </p:nvPr>
+        </p:nvSpPr>
+        <p:spPr/>
+        <p:txBody>
+          <a:bodyPr/>
+          <a:lstStyle/>
+          <a:p>
+            <a:r>
+              <a:rPr lang="en-GB"/>
+              <a:t>NHS Improvement</a:t>
+            </a:r>
+            <a:endParaRPr lang="en-GB" dirty="0"/>
+          </a:p>
+        </p:txBody>
+      </p:sp>
+      <p:sp>
+        <p:nvSpPr>
+          <p:cNvPr id="5" name="Slide Number Placeholder 4"/>
+          <p:cNvSpPr>
+            <a:spLocks noGrp="1"/>
+          </p:cNvSpPr>
+          <p:nvPr>
+            <p:ph type="sldNum" sz="quarter" idx="5"/>
+          </p:nvPr>
+        </p:nvSpPr>
+        <p:spPr/>
+        <p:txBody>
+          <a:bodyPr/>
+          <a:lstStyle/>
+          <a:p>
+            <a:fld id="{7890AB7D-FC04-41BF-88F7-E47891A06283}" type="slidenum">
+              <a:rPr lang="en-GB" smtClean="0"/>
+              <a:t>5</a:t>
+            </a:fld>
+            <a:endParaRPr lang="en-GB" dirty="0"/>
+          </a:p>
+        </p:txBody>
+      </p:sp>
+    </p:spTree>
+    <p:extLst>
+      <p:ext uri="{BB962C8B-B14F-4D97-AF65-F5344CB8AC3E}">
+        <p14:creationId xmlns:p14="http://schemas.microsoft.com/office/powerpoint/2010/main" val="1505939935"/>
+      </p:ext>
+    </p:extLst>
+  </p:cSld>
+  <p:clrMapOvr>
+    <a:masterClrMapping/>
+  </p:clrMapOvr>
+</p:notes>
+</file>
+
+<file path=ppt/notesSlides/notesSlide5.xml><?xml version="1.0" encoding="utf-8"?>
+<p:notes xmlns:a="http://schemas.openxmlformats.org/drawingml/2006/main" xmlns:r="http://schemas.openxmlformats.org/officeDocument/2006/relationships" xmlns:p="http://schemas.openxmlformats.org/presentationml/2006/main">
+  <p:cSld>
+    <p:spTree>
+      <p:nvGrpSpPr>
+        <p:cNvPr id="1" name=""/>
+        <p:cNvGrpSpPr/>
+        <p:nvPr/>
+      </p:nvGrpSpPr>
+      <p:grpSpPr>
+        <a:xfrm>
+          <a:off x="0" y="0"/>
+          <a:ext cx="0" cy="0"/>
+          <a:chOff x="0" y="0"/>
+          <a:chExt cx="0" cy="0"/>
+        </a:xfrm>
+      </p:grpSpPr>
+      <p:sp>
+        <p:nvSpPr>
+          <p:cNvPr id="2" name="Slide Image Placeholder 1"/>
+          <p:cNvSpPr>
+            <a:spLocks noGrp="1" noRot="1" noChangeAspect="1"/>
+          </p:cNvSpPr>
+          <p:nvPr>
+            <p:ph type="sldImg"/>
+          </p:nvPr>
+        </p:nvSpPr>
+        <p:spPr/>
+      </p:sp>
+      <p:sp>
+        <p:nvSpPr>
+          <p:cNvPr id="3" name="Notes Placeholder 2"/>
+          <p:cNvSpPr>
+            <a:spLocks noGrp="1"/>
+          </p:cNvSpPr>
+          <p:nvPr>
+            <p:ph type="body" idx="1"/>
+          </p:nvPr>
+        </p:nvSpPr>
+        <p:spPr/>
+        <p:txBody>
+          <a:bodyPr/>
+          <a:lstStyle/>
+          <a:p>
+            <a:endParaRPr lang="en-GB" dirty="0"/>
+          </a:p>
+        </p:txBody>
+      </p:sp>
+      <p:sp>
+        <p:nvSpPr>
+          <p:cNvPr id="4" name="Footer Placeholder 3"/>
+          <p:cNvSpPr>
+            <a:spLocks noGrp="1"/>
+          </p:cNvSpPr>
+          <p:nvPr>
+            <p:ph type="ftr" sz="quarter" idx="4"/>
+          </p:nvPr>
+        </p:nvSpPr>
+        <p:spPr/>
+        <p:txBody>
+          <a:bodyPr/>
+          <a:lstStyle/>
+          <a:p>
+            <a:r>
+              <a:rPr lang="en-GB"/>
+              <a:t>NHS Improvement</a:t>
+            </a:r>
+            <a:endParaRPr lang="en-GB" dirty="0"/>
+          </a:p>
+        </p:txBody>
+      </p:sp>
+      <p:sp>
+        <p:nvSpPr>
+          <p:cNvPr id="5" name="Slide Number Placeholder 4"/>
+          <p:cNvSpPr>
+            <a:spLocks noGrp="1"/>
+          </p:cNvSpPr>
+          <p:nvPr>
+            <p:ph type="sldNum" sz="quarter" idx="5"/>
+          </p:nvPr>
+        </p:nvSpPr>
+        <p:spPr/>
+        <p:txBody>
+          <a:bodyPr/>
+          <a:lstStyle/>
+          <a:p>
+            <a:fld id="{7890AB7D-FC04-41BF-88F7-E47891A06283}" type="slidenum">
+              <a:rPr lang="en-GB" smtClean="0"/>
+              <a:t>6</a:t>
             </a:fld>
             <a:endParaRPr lang="en-GB" dirty="0"/>
           </a:p>
@@ -12378,7 +12640,7 @@
             </a:pPr>
             <a:r>
               <a:rPr lang="en-GB" dirty="0"/>
-              <a:t>Use your system, another system and remotes. Full history on repositories carried</a:t>
+              <a:t>Use your system, another system and remotes (GitHub). Full history on repositories carried</a:t>
             </a:r>
           </a:p>
           <a:p>
@@ -12401,6 +12663,16 @@
             <a:r>
               <a:rPr lang="en-GB" dirty="0"/>
               <a:t>Source code can be inspected by anyone</a:t>
+            </a:r>
+          </a:p>
+          <a:p>
+            <a:pPr lvl="1">
+              <a:buFont typeface="Courier New" panose="02070309020205020404" pitchFamily="49" charset="0"/>
+              <a:buChar char="o"/>
+            </a:pPr>
+            <a:r>
+              <a:rPr lang="en-GB" dirty="0"/>
+              <a:t>Used for scripts, not data</a:t>
             </a:r>
           </a:p>
           <a:p>
@@ -12454,7 +12726,7 @@
             </a:r>
             <a:r>
               <a:rPr lang="en-GB" dirty="0"/>
-              <a:t> from ‘remote’</a:t>
+              <a:t> from ‘remote’. Makes changes accessible to all working in a repository</a:t>
             </a:r>
           </a:p>
           <a:p>
@@ -12577,6 +12849,189 @@
           <a:bodyPr/>
           <a:lstStyle/>
           <a:p>
+            <a:r>
+              <a:rPr lang="en-GB" dirty="0"/>
+              <a:t>Choose a repository -&gt; A local folder in which you are going to work</a:t>
+            </a:r>
+          </a:p>
+          <a:p>
+            <a:pPr lvl="1">
+              <a:buFont typeface="Courier New" panose="02070309020205020404" pitchFamily="49" charset="0"/>
+              <a:buChar char="o"/>
+            </a:pPr>
+            <a:r>
+              <a:rPr lang="en-GB" dirty="0"/>
+              <a:t>Right-click, </a:t>
+            </a:r>
+            <a:r>
+              <a:rPr lang="en-GB" i="1" dirty="0"/>
+              <a:t>Git Bash here</a:t>
+            </a:r>
+            <a:endParaRPr lang="en-GB" dirty="0"/>
+          </a:p>
+          <a:p>
+            <a:pPr lvl="1">
+              <a:buFont typeface="Courier New" panose="02070309020205020404" pitchFamily="49" charset="0"/>
+              <a:buChar char="o"/>
+            </a:pPr>
+            <a:r>
+              <a:rPr lang="en-GB" i="1" dirty="0"/>
+              <a:t>git </a:t>
+            </a:r>
+            <a:r>
+              <a:rPr lang="en-GB" i="1" dirty="0" err="1"/>
+              <a:t>init</a:t>
+            </a:r>
+            <a:r>
+              <a:rPr lang="en-GB" i="1" dirty="0"/>
+              <a:t> </a:t>
+            </a:r>
+            <a:r>
+              <a:rPr lang="en-GB" dirty="0"/>
+              <a:t>-&gt; Initialise this repository as a .Git area</a:t>
+            </a:r>
+          </a:p>
+          <a:p>
+            <a:pPr lvl="1">
+              <a:buFont typeface="Courier New" panose="02070309020205020404" pitchFamily="49" charset="0"/>
+              <a:buChar char="o"/>
+            </a:pPr>
+            <a:r>
+              <a:rPr lang="en-GB" i="1" dirty="0"/>
+              <a:t>git config –global user.name “</a:t>
+            </a:r>
+            <a:r>
+              <a:rPr lang="en-GB" dirty="0"/>
+              <a:t>user name</a:t>
+            </a:r>
+            <a:r>
+              <a:rPr lang="en-GB" i="1" dirty="0"/>
+              <a:t>” </a:t>
+            </a:r>
+            <a:r>
+              <a:rPr lang="en-GB" dirty="0"/>
+              <a:t>-&gt; Set a username for your repository (try to match GitHub username)</a:t>
+            </a:r>
+            <a:endParaRPr lang="en-GB" i="1" dirty="0"/>
+          </a:p>
+          <a:p>
+            <a:pPr lvl="1">
+              <a:buFont typeface="Courier New" panose="02070309020205020404" pitchFamily="49" charset="0"/>
+              <a:buChar char="o"/>
+            </a:pPr>
+            <a:r>
+              <a:rPr lang="en-GB" i="1" dirty="0"/>
+              <a:t>git config –global </a:t>
+            </a:r>
+            <a:r>
+              <a:rPr lang="en-GB" i="1" dirty="0" err="1"/>
+              <a:t>user.email</a:t>
+            </a:r>
+            <a:r>
+              <a:rPr lang="en-GB" i="1" dirty="0"/>
+              <a:t> “</a:t>
+            </a:r>
+            <a:r>
+              <a:rPr lang="en-GB" dirty="0"/>
+              <a:t>username@nhs.net”</a:t>
+            </a:r>
+            <a:r>
+              <a:rPr lang="en-GB" i="1" dirty="0"/>
+              <a:t> </a:t>
+            </a:r>
+            <a:r>
+              <a:rPr lang="en-GB" dirty="0"/>
+              <a:t>-&gt; Set a user email</a:t>
+            </a:r>
+          </a:p>
+          <a:p>
+            <a:pPr lvl="1">
+              <a:buFont typeface="Courier New" panose="02070309020205020404" pitchFamily="49" charset="0"/>
+              <a:buChar char="o"/>
+            </a:pPr>
+            <a:r>
+              <a:rPr lang="en-GB" dirty="0"/>
+              <a:t>Both the username and email mean that when checking the version control log (</a:t>
+            </a:r>
+            <a:r>
+              <a:rPr lang="en-GB" i="1" dirty="0"/>
+              <a:t>git log</a:t>
+            </a:r>
+            <a:r>
+              <a:rPr lang="en-GB" dirty="0"/>
+              <a:t>), users can see who has made the changes and have a means of contacting them</a:t>
+            </a:r>
+          </a:p>
+          <a:p>
+            <a:pPr marL="457200" lvl="1" indent="0">
+              <a:buNone/>
+            </a:pPr>
+            <a:endParaRPr lang="en-GB" dirty="0"/>
+          </a:p>
+          <a:p>
+            <a:r>
+              <a:rPr lang="en-GB" dirty="0"/>
+              <a:t>Add files to your repository </a:t>
+            </a:r>
+          </a:p>
+          <a:p>
+            <a:pPr lvl="1">
+              <a:buFont typeface="Courier New" panose="02070309020205020404" pitchFamily="49" charset="0"/>
+              <a:buChar char="o"/>
+            </a:pPr>
+            <a:r>
+              <a:rPr lang="en-GB" i="1" dirty="0"/>
+              <a:t>git status </a:t>
+            </a:r>
+            <a:r>
+              <a:rPr lang="en-GB" dirty="0"/>
+              <a:t>-&gt; This will tell you what files are untracked, and need to be added to the git repository</a:t>
+            </a:r>
+          </a:p>
+          <a:p>
+            <a:pPr lvl="1">
+              <a:buFont typeface="Courier New" panose="02070309020205020404" pitchFamily="49" charset="0"/>
+              <a:buChar char="o"/>
+            </a:pPr>
+            <a:r>
+              <a:rPr lang="en-GB" i="1" dirty="0"/>
+              <a:t>git add . </a:t>
+            </a:r>
+            <a:r>
+              <a:rPr lang="en-GB" dirty="0"/>
+              <a:t>-&gt; Add these files to be tracked. These are not yet committed to the repository, so no real changes are made</a:t>
+            </a:r>
+          </a:p>
+          <a:p>
+            <a:pPr lvl="1">
+              <a:buFont typeface="Courier New" panose="02070309020205020404" pitchFamily="49" charset="0"/>
+              <a:buChar char="o"/>
+            </a:pPr>
+            <a:r>
+              <a:rPr lang="en-GB" i="1" dirty="0"/>
+              <a:t>git commit –m “First changes made” </a:t>
+            </a:r>
+            <a:r>
+              <a:rPr lang="en-GB" dirty="0"/>
+              <a:t>-&gt; These changes are committed to the repository. It is best to add a message, so that collaborators can see what changes you have made, and for what reason. This is a very good feature. To see these changes, use </a:t>
+            </a:r>
+            <a:r>
+              <a:rPr lang="en-GB" i="1" dirty="0"/>
+              <a:t>git log</a:t>
+            </a:r>
+            <a:endParaRPr lang="en-GB" dirty="0"/>
+          </a:p>
+          <a:p>
+            <a:pPr>
+              <a:buFont typeface="Courier New" panose="02070309020205020404" pitchFamily="49" charset="0"/>
+              <a:buChar char="o"/>
+            </a:pPr>
+            <a:endParaRPr lang="en-GB" i="1" dirty="0"/>
+          </a:p>
+          <a:p>
+            <a:pPr marL="457200" lvl="1" indent="0">
+              <a:buNone/>
+            </a:pPr>
             <a:endParaRPr lang="en-GB" dirty="0"/>
           </a:p>
         </p:txBody>
@@ -12603,7 +13058,7 @@
           <a:lstStyle/>
           <a:p>
             <a:r>
-              <a:rPr lang="en-GB"/>
+              <a:rPr lang="en-GB" dirty="0"/>
               <a:t>PowerPoint Style Guide / Supporting Templates</a:t>
             </a:r>
             <a:endParaRPr lang="en-US" dirty="0"/>
@@ -12633,7 +13088,7 @@
           <a:p>
             <a:r>
               <a:rPr lang="en-GB" dirty="0"/>
-              <a:t>An Introduction to Git</a:t>
+              <a:t>An Introduction to Git </a:t>
             </a:r>
           </a:p>
         </p:txBody>
@@ -12652,6 +13107,376 @@
 </file>
 
 <file path=ppt/slides/slide4.xml><?xml version="1.0" encoding="utf-8"?>
+<p:sld xmlns:a="http://schemas.openxmlformats.org/drawingml/2006/main" xmlns:r="http://schemas.openxmlformats.org/officeDocument/2006/relationships" xmlns:p="http://schemas.openxmlformats.org/presentationml/2006/main">
+  <p:cSld>
+    <p:spTree>
+      <p:nvGrpSpPr>
+        <p:cNvPr id="1" name=""/>
+        <p:cNvGrpSpPr/>
+        <p:nvPr/>
+      </p:nvGrpSpPr>
+      <p:grpSpPr>
+        <a:xfrm>
+          <a:off x="0" y="0"/>
+          <a:ext cx="0" cy="0"/>
+          <a:chOff x="0" y="0"/>
+          <a:chExt cx="0" cy="0"/>
+        </a:xfrm>
+      </p:grpSpPr>
+      <p:sp>
+        <p:nvSpPr>
+          <p:cNvPr id="2" name="Content Placeholder 1">
+            <a:extLst>
+              <a:ext uri="{FF2B5EF4-FFF2-40B4-BE49-F238E27FC236}">
+                <a16:creationId xmlns:a16="http://schemas.microsoft.com/office/drawing/2014/main" id="{48869F42-6D93-4C35-8FA5-AE406994C1E3}"/>
+              </a:ext>
+            </a:extLst>
+          </p:cNvPr>
+          <p:cNvSpPr>
+            <a:spLocks noGrp="1"/>
+          </p:cNvSpPr>
+          <p:nvPr>
+            <p:ph sz="quarter" idx="10"/>
+          </p:nvPr>
+        </p:nvSpPr>
+        <p:spPr/>
+        <p:txBody>
+          <a:bodyPr/>
+          <a:lstStyle/>
+          <a:p>
+            <a:r>
+              <a:rPr lang="en-GB" dirty="0"/>
+              <a:t>Create a ‘remote’ repository</a:t>
+            </a:r>
+          </a:p>
+          <a:p>
+            <a:pPr lvl="1">
+              <a:buFont typeface="Courier New" panose="02070309020205020404" pitchFamily="49" charset="0"/>
+              <a:buChar char="o"/>
+            </a:pPr>
+            <a:r>
+              <a:rPr lang="en-GB" i="1" dirty="0"/>
+              <a:t>Create a GitHub account on </a:t>
+            </a:r>
+            <a:r>
+              <a:rPr lang="en-GB" dirty="0">
+                <a:hlinkClick r:id="rId3"/>
+              </a:rPr>
+              <a:t>GitHub</a:t>
+            </a:r>
+            <a:endParaRPr lang="en-GB" dirty="0"/>
+          </a:p>
+          <a:p>
+            <a:pPr lvl="1">
+              <a:buFont typeface="Courier New" panose="02070309020205020404" pitchFamily="49" charset="0"/>
+              <a:buChar char="o"/>
+            </a:pPr>
+            <a:r>
+              <a:rPr lang="en-GB" dirty="0"/>
+              <a:t>Click ‘create a new repository’</a:t>
+            </a:r>
+          </a:p>
+          <a:p>
+            <a:pPr lvl="1">
+              <a:buFont typeface="Courier New" panose="02070309020205020404" pitchFamily="49" charset="0"/>
+              <a:buChar char="o"/>
+            </a:pPr>
+            <a:r>
+              <a:rPr lang="en-GB" dirty="0"/>
+              <a:t>Name it consistently with your local file</a:t>
+            </a:r>
+          </a:p>
+          <a:p>
+            <a:pPr lvl="1">
+              <a:buFont typeface="Courier New" panose="02070309020205020404" pitchFamily="49" charset="0"/>
+              <a:buChar char="o"/>
+            </a:pPr>
+            <a:r>
+              <a:rPr lang="en-GB" dirty="0"/>
+              <a:t>You can add a README.md which explains to outside users what the project is (usually HTML). Licences can also be added which control what users can/can’t do with code</a:t>
+            </a:r>
+          </a:p>
+          <a:p>
+            <a:pPr marL="457200" lvl="1" indent="0">
+              <a:buNone/>
+            </a:pPr>
+            <a:endParaRPr lang="en-GB" dirty="0"/>
+          </a:p>
+          <a:p>
+            <a:r>
+              <a:rPr lang="en-GB" dirty="0"/>
+              <a:t>Connect ‘remote’ to ‘local’ repository</a:t>
+            </a:r>
+          </a:p>
+          <a:p>
+            <a:pPr lvl="1">
+              <a:buFont typeface="Courier New" panose="02070309020205020404" pitchFamily="49" charset="0"/>
+              <a:buChar char="o"/>
+            </a:pPr>
+            <a:r>
+              <a:rPr lang="en-GB" dirty="0"/>
+              <a:t>Using </a:t>
+            </a:r>
+            <a:r>
+              <a:rPr lang="en-GB" dirty="0" err="1"/>
+              <a:t>GitBash</a:t>
+            </a:r>
+            <a:r>
+              <a:rPr lang="en-GB" dirty="0"/>
+              <a:t> -&gt; </a:t>
+            </a:r>
+            <a:r>
+              <a:rPr lang="en-GB" i="1" dirty="0"/>
+              <a:t>git remote add origin &lt;link to GitHub repo&gt;</a:t>
+            </a:r>
+          </a:p>
+          <a:p>
+            <a:pPr lvl="1">
+              <a:buFont typeface="Courier New" panose="02070309020205020404" pitchFamily="49" charset="0"/>
+              <a:buChar char="o"/>
+            </a:pPr>
+            <a:endParaRPr lang="en-GB" i="1" dirty="0"/>
+          </a:p>
+          <a:p>
+            <a:r>
+              <a:rPr lang="en-GB" dirty="0"/>
+              <a:t>Push your files to the remote repo</a:t>
+            </a:r>
+          </a:p>
+          <a:p>
+            <a:pPr lvl="1">
+              <a:buFont typeface="Courier New" panose="02070309020205020404" pitchFamily="49" charset="0"/>
+              <a:buChar char="o"/>
+            </a:pPr>
+            <a:r>
+              <a:rPr lang="en-GB" i="1" dirty="0"/>
+              <a:t>git push –u origin master </a:t>
+            </a:r>
+            <a:r>
+              <a:rPr lang="en-GB" dirty="0"/>
+              <a:t>-&gt; here, Master is the name of the main branch, and origin is the remote repo. If you were operating on a different branch, you would use that name, e.g. –u origin branch_1</a:t>
+            </a:r>
+          </a:p>
+          <a:p>
+            <a:pPr marL="457200" lvl="1" indent="0">
+              <a:buNone/>
+            </a:pPr>
+            <a:endParaRPr lang="en-GB" i="1" dirty="0"/>
+          </a:p>
+          <a:p>
+            <a:r>
+              <a:rPr lang="en-GB" i="1" dirty="0"/>
+              <a:t>Check GitHub to see if the changes have been made, and are up to date</a:t>
+            </a:r>
+          </a:p>
+          <a:p>
+            <a:pPr lvl="1">
+              <a:buFont typeface="Courier New" panose="02070309020205020404" pitchFamily="49" charset="0"/>
+              <a:buChar char="o"/>
+            </a:pPr>
+            <a:endParaRPr lang="en-GB" dirty="0"/>
+          </a:p>
+          <a:p>
+            <a:pPr marL="457200" lvl="1" indent="0">
+              <a:buNone/>
+            </a:pPr>
+            <a:endParaRPr lang="en-GB" dirty="0"/>
+          </a:p>
+        </p:txBody>
+      </p:sp>
+      <p:sp>
+        <p:nvSpPr>
+          <p:cNvPr id="3" name="Footer Placeholder 2">
+            <a:extLst>
+              <a:ext uri="{FF2B5EF4-FFF2-40B4-BE49-F238E27FC236}">
+                <a16:creationId xmlns:a16="http://schemas.microsoft.com/office/drawing/2014/main" id="{6942939B-7B0C-42A5-8BC5-642B25324167}"/>
+              </a:ext>
+            </a:extLst>
+          </p:cNvPr>
+          <p:cNvSpPr>
+            <a:spLocks noGrp="1"/>
+          </p:cNvSpPr>
+          <p:nvPr>
+            <p:ph type="ftr" sz="quarter" idx="3"/>
+          </p:nvPr>
+        </p:nvSpPr>
+        <p:spPr/>
+        <p:txBody>
+          <a:bodyPr/>
+          <a:lstStyle/>
+          <a:p>
+            <a:r>
+              <a:rPr lang="en-GB" dirty="0"/>
+              <a:t>PowerPoint Style Guide / Supporting Templates</a:t>
+            </a:r>
+            <a:endParaRPr lang="en-US" dirty="0"/>
+          </a:p>
+        </p:txBody>
+      </p:sp>
+      <p:sp>
+        <p:nvSpPr>
+          <p:cNvPr id="4" name="Title 3">
+            <a:extLst>
+              <a:ext uri="{FF2B5EF4-FFF2-40B4-BE49-F238E27FC236}">
+                <a16:creationId xmlns:a16="http://schemas.microsoft.com/office/drawing/2014/main" id="{42A5EA90-17C9-4BD5-BD0D-74A5419E18C7}"/>
+              </a:ext>
+            </a:extLst>
+          </p:cNvPr>
+          <p:cNvSpPr>
+            <a:spLocks noGrp="1"/>
+          </p:cNvSpPr>
+          <p:nvPr>
+            <p:ph type="title"/>
+          </p:nvPr>
+        </p:nvSpPr>
+        <p:spPr/>
+        <p:txBody>
+          <a:bodyPr/>
+          <a:lstStyle/>
+          <a:p>
+            <a:r>
+              <a:rPr lang="en-GB" dirty="0"/>
+              <a:t>Connecting to GitHub</a:t>
+            </a:r>
+          </a:p>
+        </p:txBody>
+      </p:sp>
+    </p:spTree>
+    <p:extLst>
+      <p:ext uri="{BB962C8B-B14F-4D97-AF65-F5344CB8AC3E}">
+        <p14:creationId xmlns:p14="http://schemas.microsoft.com/office/powerpoint/2010/main" val="4006080756"/>
+      </p:ext>
+    </p:extLst>
+  </p:cSld>
+  <p:clrMapOvr>
+    <a:masterClrMapping/>
+  </p:clrMapOvr>
+</p:sld>
+</file>
+
+<file path=ppt/slides/slide5.xml><?xml version="1.0" encoding="utf-8"?>
+<p:sld xmlns:a="http://schemas.openxmlformats.org/drawingml/2006/main" xmlns:r="http://schemas.openxmlformats.org/officeDocument/2006/relationships" xmlns:p="http://schemas.openxmlformats.org/presentationml/2006/main">
+  <p:cSld>
+    <p:spTree>
+      <p:nvGrpSpPr>
+        <p:cNvPr id="1" name=""/>
+        <p:cNvGrpSpPr/>
+        <p:nvPr/>
+      </p:nvGrpSpPr>
+      <p:grpSpPr>
+        <a:xfrm>
+          <a:off x="0" y="0"/>
+          <a:ext cx="0" cy="0"/>
+          <a:chOff x="0" y="0"/>
+          <a:chExt cx="0" cy="0"/>
+        </a:xfrm>
+      </p:grpSpPr>
+      <p:sp>
+        <p:nvSpPr>
+          <p:cNvPr id="2" name="Content Placeholder 1">
+            <a:extLst>
+              <a:ext uri="{FF2B5EF4-FFF2-40B4-BE49-F238E27FC236}">
+                <a16:creationId xmlns:a16="http://schemas.microsoft.com/office/drawing/2014/main" id="{48869F42-6D93-4C35-8FA5-AE406994C1E3}"/>
+              </a:ext>
+            </a:extLst>
+          </p:cNvPr>
+          <p:cNvSpPr>
+            <a:spLocks noGrp="1"/>
+          </p:cNvSpPr>
+          <p:nvPr>
+            <p:ph sz="quarter" idx="10"/>
+          </p:nvPr>
+        </p:nvSpPr>
+        <p:spPr/>
+        <p:txBody>
+          <a:bodyPr/>
+          <a:lstStyle/>
+          <a:p>
+            <a:pPr lvl="1">
+              <a:buFont typeface="Courier New" panose="02070309020205020404" pitchFamily="49" charset="0"/>
+              <a:buChar char="o"/>
+            </a:pPr>
+            <a:endParaRPr lang="en-GB" dirty="0"/>
+          </a:p>
+          <a:p>
+            <a:pPr marL="457200" lvl="1" indent="0">
+              <a:buNone/>
+            </a:pPr>
+            <a:endParaRPr lang="en-GB" dirty="0"/>
+          </a:p>
+        </p:txBody>
+      </p:sp>
+      <p:sp>
+        <p:nvSpPr>
+          <p:cNvPr id="3" name="Footer Placeholder 2">
+            <a:extLst>
+              <a:ext uri="{FF2B5EF4-FFF2-40B4-BE49-F238E27FC236}">
+                <a16:creationId xmlns:a16="http://schemas.microsoft.com/office/drawing/2014/main" id="{6942939B-7B0C-42A5-8BC5-642B25324167}"/>
+              </a:ext>
+            </a:extLst>
+          </p:cNvPr>
+          <p:cNvSpPr>
+            <a:spLocks noGrp="1"/>
+          </p:cNvSpPr>
+          <p:nvPr>
+            <p:ph type="ftr" sz="quarter" idx="3"/>
+          </p:nvPr>
+        </p:nvSpPr>
+        <p:spPr/>
+        <p:txBody>
+          <a:bodyPr/>
+          <a:lstStyle/>
+          <a:p>
+            <a:r>
+              <a:rPr lang="en-GB" dirty="0"/>
+              <a:t>PowerPoint Style Guide / Supporting Templates</a:t>
+            </a:r>
+            <a:endParaRPr lang="en-US" dirty="0"/>
+          </a:p>
+        </p:txBody>
+      </p:sp>
+      <p:sp>
+        <p:nvSpPr>
+          <p:cNvPr id="4" name="Title 3">
+            <a:extLst>
+              <a:ext uri="{FF2B5EF4-FFF2-40B4-BE49-F238E27FC236}">
+                <a16:creationId xmlns:a16="http://schemas.microsoft.com/office/drawing/2014/main" id="{42A5EA90-17C9-4BD5-BD0D-74A5419E18C7}"/>
+              </a:ext>
+            </a:extLst>
+          </p:cNvPr>
+          <p:cNvSpPr>
+            <a:spLocks noGrp="1"/>
+          </p:cNvSpPr>
+          <p:nvPr>
+            <p:ph type="title"/>
+          </p:nvPr>
+        </p:nvSpPr>
+        <p:spPr/>
+        <p:txBody>
+          <a:bodyPr/>
+          <a:lstStyle/>
+          <a:p>
+            <a:r>
+              <a:rPr lang="en-GB" dirty="0"/>
+              <a:t>Using Branches</a:t>
+            </a:r>
+          </a:p>
+        </p:txBody>
+      </p:sp>
+    </p:spTree>
+    <p:extLst>
+      <p:ext uri="{BB962C8B-B14F-4D97-AF65-F5344CB8AC3E}">
+        <p14:creationId xmlns:p14="http://schemas.microsoft.com/office/powerpoint/2010/main" val="3118825995"/>
+      </p:ext>
+    </p:extLst>
+  </p:cSld>
+  <p:clrMapOvr>
+    <a:masterClrMapping/>
+  </p:clrMapOvr>
+</p:sld>
+</file>
+
+<file path=ppt/slides/slide6.xml><?xml version="1.0" encoding="utf-8"?>
 <p:sld xmlns:a="http://schemas.openxmlformats.org/drawingml/2006/main" xmlns:r="http://schemas.openxmlformats.org/officeDocument/2006/relationships" xmlns:p="http://schemas.openxmlformats.org/presentationml/2006/main">
   <p:cSld>
     <p:spTree>
@@ -13595,6 +14420,15 @@
 </file>
 
 <file path=customXml/item1.xml><?xml version="1.0" encoding="utf-8"?>
+<?mso-contentType ?>
+<FormTemplates xmlns="http://schemas.microsoft.com/sharepoint/v3/contenttype/forms">
+  <Display>DocumentLibraryForm</Display>
+  <Edit>DocumentLibraryForm</Edit>
+  <New>DocumentLibraryForm</New>
+</FormTemplates>
+</file>
+
+<file path=customXml/item2.xml><?xml version="1.0" encoding="utf-8"?>
 <ct:contentTypeSchema xmlns:ct="http://schemas.microsoft.com/office/2006/metadata/contentType" xmlns:ma="http://schemas.microsoft.com/office/2006/metadata/properties/metaAttributes" ct:_="" ma:_="" ma:contentTypeName="Document" ma:contentTypeID="0x010100308E40E706C7A346904F58642B7D1969" ma:contentTypeVersion="0" ma:contentTypeDescription="Create a new document." ma:contentTypeScope="" ma:versionID="0ea485b46902d4f7e49967f1b2c25a65">
   <xsd:schema xmlns:xsd="http://www.w3.org/2001/XMLSchema" xmlns:xs="http://www.w3.org/2001/XMLSchema" xmlns:p="http://schemas.microsoft.com/office/2006/metadata/properties" targetNamespace="http://schemas.microsoft.com/office/2006/metadata/properties" ma:root="true" ma:fieldsID="90078a0fe6c183ae62661f67b7399e8a">
     <xsd:element name="properties">
@@ -13708,15 +14542,6 @@
 </ct:contentTypeSchema>
 </file>
 
-<file path=customXml/item2.xml><?xml version="1.0" encoding="utf-8"?>
-<?mso-contentType ?>
-<FormTemplates xmlns="http://schemas.microsoft.com/sharepoint/v3/contenttype/forms">
-  <Display>DocumentLibraryForm</Display>
-  <Edit>DocumentLibraryForm</Edit>
-  <New>DocumentLibraryForm</New>
-</FormTemplates>
-</file>
-
 <file path=customXml/item3.xml><?xml version="1.0" encoding="utf-8"?>
 <p:properties xmlns:p="http://schemas.microsoft.com/office/2006/metadata/properties" xmlns:xsi="http://www.w3.org/2001/XMLSchema-instance" xmlns:pc="http://schemas.microsoft.com/office/infopath/2007/PartnerControls">
   <documentManagement/>
@@ -13724,6 +14549,14 @@
 </file>
 
 <file path=customXml/itemProps1.xml><?xml version="1.0" encoding="utf-8"?>
+<ds:datastoreItem xmlns:ds="http://schemas.openxmlformats.org/officeDocument/2006/customXml" ds:itemID="{A6333066-D95F-4DC9-8F45-8431A5C3C76B}">
+  <ds:schemaRefs>
+    <ds:schemaRef ds:uri="http://schemas.microsoft.com/sharepoint/v3/contenttype/forms"/>
+  </ds:schemaRefs>
+</ds:datastoreItem>
+</file>
+
+<file path=customXml/itemProps2.xml><?xml version="1.0" encoding="utf-8"?>
 <ds:datastoreItem xmlns:ds="http://schemas.openxmlformats.org/officeDocument/2006/customXml" ds:itemID="{08DD32EF-F09C-4573-9C23-B48EA7D5886E}">
   <ds:schemaRefs>
     <ds:schemaRef ds:uri="http://schemas.microsoft.com/office/2006/metadata/contentType"/>
@@ -13735,14 +14568,6 @@
     <ds:schemaRef ds:uri="http://purl.org/dc/terms/"/>
     <ds:schemaRef ds:uri="http://schemas.microsoft.com/internal/obd"/>
     <ds:schemaRef ds:uri="http://schemas.microsoft.com/office/infopath/2007/PartnerControls"/>
-  </ds:schemaRefs>
-</ds:datastoreItem>
-</file>
-
-<file path=customXml/itemProps2.xml><?xml version="1.0" encoding="utf-8"?>
-<ds:datastoreItem xmlns:ds="http://schemas.openxmlformats.org/officeDocument/2006/customXml" ds:itemID="{A6333066-D95F-4DC9-8F45-8431A5C3C76B}">
-  <ds:schemaRefs>
-    <ds:schemaRef ds:uri="http://schemas.microsoft.com/sharepoint/v3/contenttype/forms"/>
   </ds:schemaRefs>
 </ds:datastoreItem>
 </file>

</xml_diff>

<commit_message>
Powerpoint Updated and Script changed slightly
</commit_message>
<xml_diff>
--- a/GitIntro.pptx
+++ b/GitIntro.pptx
@@ -153,12 +153,12 @@
   <pc:docChgLst>
     <pc:chgData name="Will Brooks" userId="d4c2b272-852e-451d-80ba-d2f905b38211" providerId="ADAL" clId="{37A0AFB6-F6CA-4F11-9C33-0D7619B1449C}"/>
     <pc:docChg chg="undo custSel addSld delSld modSld">
-      <pc:chgData name="Will Brooks" userId="d4c2b272-852e-451d-80ba-d2f905b38211" providerId="ADAL" clId="{37A0AFB6-F6CA-4F11-9C33-0D7619B1449C}" dt="2022-09-21T08:48:31.834" v="3650" actId="20577"/>
+      <pc:chgData name="Will Brooks" userId="d4c2b272-852e-451d-80ba-d2f905b38211" providerId="ADAL" clId="{37A0AFB6-F6CA-4F11-9C33-0D7619B1449C}" dt="2022-09-21T13:45:36.674" v="6427"/>
       <pc:docMkLst>
         <pc:docMk/>
       </pc:docMkLst>
-      <pc:sldChg chg="modSp mod">
-        <pc:chgData name="Will Brooks" userId="d4c2b272-852e-451d-80ba-d2f905b38211" providerId="ADAL" clId="{37A0AFB6-F6CA-4F11-9C33-0D7619B1449C}" dt="2022-09-20T15:32:41.302" v="87" actId="20577"/>
+      <pc:sldChg chg="addSp modSp mod">
+        <pc:chgData name="Will Brooks" userId="d4c2b272-852e-451d-80ba-d2f905b38211" providerId="ADAL" clId="{37A0AFB6-F6CA-4F11-9C33-0D7619B1449C}" dt="2022-09-21T13:45:36.674" v="6427"/>
         <pc:sldMkLst>
           <pc:docMk/>
           <pc:sldMk cId="3144119947" sldId="263"/>
@@ -179,6 +179,14 @@
             <ac:spMk id="3" creationId="{00000000-0000-0000-0000-000000000000}"/>
           </ac:spMkLst>
         </pc:spChg>
+        <pc:picChg chg="add mod">
+          <ac:chgData name="Will Brooks" userId="d4c2b272-852e-451d-80ba-d2f905b38211" providerId="ADAL" clId="{37A0AFB6-F6CA-4F11-9C33-0D7619B1449C}" dt="2022-09-21T13:45:36.674" v="6427"/>
+          <ac:picMkLst>
+            <pc:docMk/>
+            <pc:sldMk cId="3144119947" sldId="263"/>
+            <ac:picMk id="4" creationId="{D231037C-42C1-4B27-9A81-C457211D9005}"/>
+          </ac:picMkLst>
+        </pc:picChg>
       </pc:sldChg>
       <pc:sldChg chg="del">
         <pc:chgData name="Will Brooks" userId="d4c2b272-852e-451d-80ba-d2f905b38211" providerId="ADAL" clId="{37A0AFB6-F6CA-4F11-9C33-0D7619B1449C}" dt="2022-09-20T15:33:04.525" v="90" actId="47"/>
@@ -488,14 +496,14 @@
           <pc:sldMk cId="1020804935" sldId="315"/>
         </pc:sldMkLst>
       </pc:sldChg>
-      <pc:sldChg chg="modSp add del mod">
-        <pc:chgData name="Will Brooks" userId="d4c2b272-852e-451d-80ba-d2f905b38211" providerId="ADAL" clId="{37A0AFB6-F6CA-4F11-9C33-0D7619B1449C}" dt="2022-09-21T08:21:43.033" v="1000" actId="20577"/>
+      <pc:sldChg chg="addSp modSp add del mod">
+        <pc:chgData name="Will Brooks" userId="d4c2b272-852e-451d-80ba-d2f905b38211" providerId="ADAL" clId="{37A0AFB6-F6CA-4F11-9C33-0D7619B1449C}" dt="2022-09-21T13:45:28.282" v="6426" actId="20577"/>
         <pc:sldMkLst>
           <pc:docMk/>
           <pc:sldMk cId="3770664684" sldId="316"/>
         </pc:sldMkLst>
         <pc:spChg chg="mod">
-          <ac:chgData name="Will Brooks" userId="d4c2b272-852e-451d-80ba-d2f905b38211" providerId="ADAL" clId="{37A0AFB6-F6CA-4F11-9C33-0D7619B1449C}" dt="2022-09-21T08:21:43.033" v="1000" actId="20577"/>
+          <ac:chgData name="Will Brooks" userId="d4c2b272-852e-451d-80ba-d2f905b38211" providerId="ADAL" clId="{37A0AFB6-F6CA-4F11-9C33-0D7619B1449C}" dt="2022-09-21T13:45:28.282" v="6426" actId="20577"/>
           <ac:spMkLst>
             <pc:docMk/>
             <pc:sldMk cId="3770664684" sldId="316"/>
@@ -510,9 +518,17 @@
             <ac:spMk id="4" creationId="{42A5EA90-17C9-4BD5-BD0D-74A5419E18C7}"/>
           </ac:spMkLst>
         </pc:spChg>
+        <pc:picChg chg="add mod">
+          <ac:chgData name="Will Brooks" userId="d4c2b272-852e-451d-80ba-d2f905b38211" providerId="ADAL" clId="{37A0AFB6-F6CA-4F11-9C33-0D7619B1449C}" dt="2022-09-21T13:44:23.412" v="6337" actId="1076"/>
+          <ac:picMkLst>
+            <pc:docMk/>
+            <pc:sldMk cId="3770664684" sldId="316"/>
+            <ac:picMk id="1026" creationId="{EC21998A-F167-4B76-A1C5-254F27156F67}"/>
+          </ac:picMkLst>
+        </pc:picChg>
       </pc:sldChg>
-      <pc:sldChg chg="modSp add mod">
-        <pc:chgData name="Will Brooks" userId="d4c2b272-852e-451d-80ba-d2f905b38211" providerId="ADAL" clId="{37A0AFB6-F6CA-4F11-9C33-0D7619B1449C}" dt="2022-09-21T08:48:10.067" v="3634" actId="20577"/>
+      <pc:sldChg chg="addSp modSp add mod">
+        <pc:chgData name="Will Brooks" userId="d4c2b272-852e-451d-80ba-d2f905b38211" providerId="ADAL" clId="{37A0AFB6-F6CA-4F11-9C33-0D7619B1449C}" dt="2022-09-21T13:44:42.825" v="6338"/>
         <pc:sldMkLst>
           <pc:docMk/>
           <pc:sldMk cId="1180572286" sldId="317"/>
@@ -533,13 +549,29 @@
             <ac:spMk id="4" creationId="{42A5EA90-17C9-4BD5-BD0D-74A5419E18C7}"/>
           </ac:spMkLst>
         </pc:spChg>
+        <pc:picChg chg="add mod">
+          <ac:chgData name="Will Brooks" userId="d4c2b272-852e-451d-80ba-d2f905b38211" providerId="ADAL" clId="{37A0AFB6-F6CA-4F11-9C33-0D7619B1449C}" dt="2022-09-21T13:44:42.825" v="6338"/>
+          <ac:picMkLst>
+            <pc:docMk/>
+            <pc:sldMk cId="1180572286" sldId="317"/>
+            <ac:picMk id="5" creationId="{829CB498-2C9B-40A0-8968-E56765A79068}"/>
+          </ac:picMkLst>
+        </pc:picChg>
       </pc:sldChg>
-      <pc:sldChg chg="modSp add mod">
-        <pc:chgData name="Will Brooks" userId="d4c2b272-852e-451d-80ba-d2f905b38211" providerId="ADAL" clId="{37A0AFB6-F6CA-4F11-9C33-0D7619B1449C}" dt="2022-09-20T15:42:30.421" v="897" actId="20577"/>
+      <pc:sldChg chg="addSp modSp add mod">
+        <pc:chgData name="Will Brooks" userId="d4c2b272-852e-451d-80ba-d2f905b38211" providerId="ADAL" clId="{37A0AFB6-F6CA-4F11-9C33-0D7619B1449C}" dt="2022-09-21T13:44:53.334" v="6342" actId="167"/>
         <pc:sldMkLst>
           <pc:docMk/>
           <pc:sldMk cId="2310298358" sldId="318"/>
         </pc:sldMkLst>
+        <pc:spChg chg="mod">
+          <ac:chgData name="Will Brooks" userId="d4c2b272-852e-451d-80ba-d2f905b38211" providerId="ADAL" clId="{37A0AFB6-F6CA-4F11-9C33-0D7619B1449C}" dt="2022-09-21T13:43:39.160" v="6334" actId="20577"/>
+          <ac:spMkLst>
+            <pc:docMk/>
+            <pc:sldMk cId="2310298358" sldId="318"/>
+            <ac:spMk id="2" creationId="{48869F42-6D93-4C35-8FA5-AE406994C1E3}"/>
+          </ac:spMkLst>
+        </pc:spChg>
         <pc:spChg chg="mod">
           <ac:chgData name="Will Brooks" userId="d4c2b272-852e-451d-80ba-d2f905b38211" providerId="ADAL" clId="{37A0AFB6-F6CA-4F11-9C33-0D7619B1449C}" dt="2022-09-20T15:42:30.421" v="897" actId="20577"/>
           <ac:spMkLst>
@@ -548,9 +580,17 @@
             <ac:spMk id="4" creationId="{42A5EA90-17C9-4BD5-BD0D-74A5419E18C7}"/>
           </ac:spMkLst>
         </pc:spChg>
+        <pc:picChg chg="add mod">
+          <ac:chgData name="Will Brooks" userId="d4c2b272-852e-451d-80ba-d2f905b38211" providerId="ADAL" clId="{37A0AFB6-F6CA-4F11-9C33-0D7619B1449C}" dt="2022-09-21T13:44:53.334" v="6342" actId="167"/>
+          <ac:picMkLst>
+            <pc:docMk/>
+            <pc:sldMk cId="2310298358" sldId="318"/>
+            <ac:picMk id="5" creationId="{0ED5EA98-2928-4140-96E4-BCECB454AD2D}"/>
+          </ac:picMkLst>
+        </pc:picChg>
       </pc:sldChg>
-      <pc:sldChg chg="modSp add mod">
-        <pc:chgData name="Will Brooks" userId="d4c2b272-852e-451d-80ba-d2f905b38211" providerId="ADAL" clId="{37A0AFB6-F6CA-4F11-9C33-0D7619B1449C}" dt="2022-09-21T08:47:59.311" v="3601" actId="20577"/>
+      <pc:sldChg chg="addSp modSp add mod">
+        <pc:chgData name="Will Brooks" userId="d4c2b272-852e-451d-80ba-d2f905b38211" providerId="ADAL" clId="{37A0AFB6-F6CA-4F11-9C33-0D7619B1449C}" dt="2022-09-21T13:44:44.540" v="6339"/>
         <pc:sldMkLst>
           <pc:docMk/>
           <pc:sldMk cId="4006080756" sldId="319"/>
@@ -571,15 +611,23 @@
             <ac:spMk id="4" creationId="{42A5EA90-17C9-4BD5-BD0D-74A5419E18C7}"/>
           </ac:spMkLst>
         </pc:spChg>
+        <pc:picChg chg="add mod">
+          <ac:chgData name="Will Brooks" userId="d4c2b272-852e-451d-80ba-d2f905b38211" providerId="ADAL" clId="{37A0AFB6-F6CA-4F11-9C33-0D7619B1449C}" dt="2022-09-21T13:44:44.540" v="6339"/>
+          <ac:picMkLst>
+            <pc:docMk/>
+            <pc:sldMk cId="4006080756" sldId="319"/>
+            <ac:picMk id="5" creationId="{62E3031D-4D8D-4299-BC07-A474B9B7732C}"/>
+          </ac:picMkLst>
+        </pc:picChg>
       </pc:sldChg>
-      <pc:sldChg chg="modSp add mod">
-        <pc:chgData name="Will Brooks" userId="d4c2b272-852e-451d-80ba-d2f905b38211" providerId="ADAL" clId="{37A0AFB6-F6CA-4F11-9C33-0D7619B1449C}" dt="2022-09-21T08:48:31.834" v="3650" actId="20577"/>
+      <pc:sldChg chg="addSp modSp add mod">
+        <pc:chgData name="Will Brooks" userId="d4c2b272-852e-451d-80ba-d2f905b38211" providerId="ADAL" clId="{37A0AFB6-F6CA-4F11-9C33-0D7619B1449C}" dt="2022-09-21T13:44:46.383" v="6340"/>
         <pc:sldMkLst>
           <pc:docMk/>
           <pc:sldMk cId="3118825995" sldId="320"/>
         </pc:sldMkLst>
         <pc:spChg chg="mod">
-          <ac:chgData name="Will Brooks" userId="d4c2b272-852e-451d-80ba-d2f905b38211" providerId="ADAL" clId="{37A0AFB6-F6CA-4F11-9C33-0D7619B1449C}" dt="2022-09-21T08:48:31.834" v="3650" actId="20577"/>
+          <ac:chgData name="Will Brooks" userId="d4c2b272-852e-451d-80ba-d2f905b38211" providerId="ADAL" clId="{37A0AFB6-F6CA-4F11-9C33-0D7619B1449C}" dt="2022-09-21T13:36:43.888" v="4746" actId="20577"/>
           <ac:spMkLst>
             <pc:docMk/>
             <pc:sldMk cId="3118825995" sldId="320"/>
@@ -594,6 +642,14 @@
             <ac:spMk id="4" creationId="{42A5EA90-17C9-4BD5-BD0D-74A5419E18C7}"/>
           </ac:spMkLst>
         </pc:spChg>
+        <pc:picChg chg="add mod">
+          <ac:chgData name="Will Brooks" userId="d4c2b272-852e-451d-80ba-d2f905b38211" providerId="ADAL" clId="{37A0AFB6-F6CA-4F11-9C33-0D7619B1449C}" dt="2022-09-21T13:44:46.383" v="6340"/>
+          <ac:picMkLst>
+            <pc:docMk/>
+            <pc:sldMk cId="3118825995" sldId="320"/>
+            <ac:picMk id="5" creationId="{DA37BB83-A404-466E-AF5B-9DECFAADE798}"/>
+          </ac:picMkLst>
+        </pc:picChg>
       </pc:sldChg>
     </pc:docChg>
   </pc:docChgLst>
@@ -12555,6 +12611,53 @@
           </a:p>
         </p:txBody>
       </p:sp>
+      <p:pic>
+        <p:nvPicPr>
+          <p:cNvPr id="4" name="Picture 2" descr="See the source image">
+            <a:extLst>
+              <a:ext uri="{FF2B5EF4-FFF2-40B4-BE49-F238E27FC236}">
+                <a16:creationId xmlns:a16="http://schemas.microsoft.com/office/drawing/2014/main" id="{D231037C-42C1-4B27-9A81-C457211D9005}"/>
+              </a:ext>
+            </a:extLst>
+          </p:cNvPr>
+          <p:cNvPicPr>
+            <a:picLocks noChangeAspect="1" noChangeArrowheads="1"/>
+          </p:cNvPicPr>
+          <p:nvPr/>
+        </p:nvPicPr>
+        <p:blipFill>
+          <a:blip r:embed="rId2">
+            <a:extLst>
+              <a:ext uri="{28A0092B-C50C-407E-A947-70E740481C1C}">
+                <a14:useLocalDpi xmlns:a14="http://schemas.microsoft.com/office/drawing/2010/main" val="0"/>
+              </a:ext>
+            </a:extLst>
+          </a:blip>
+          <a:srcRect/>
+          <a:stretch>
+            <a:fillRect/>
+          </a:stretch>
+        </p:blipFill>
+        <p:spPr bwMode="auto">
+          <a:xfrm>
+            <a:off x="7338694" y="5450056"/>
+            <a:ext cx="1382318" cy="1248508"/>
+          </a:xfrm>
+          <a:prstGeom prst="rect">
+            <a:avLst/>
+          </a:prstGeom>
+          <a:noFill/>
+          <a:extLst>
+            <a:ext uri="{909E8E84-426E-40DD-AFC4-6F175D3DCCD1}">
+              <a14:hiddenFill xmlns:a14="http://schemas.microsoft.com/office/drawing/2010/main">
+                <a:solidFill>
+                  <a:srgbClr val="FFFFFF"/>
+                </a:solidFill>
+              </a14:hiddenFill>
+            </a:ext>
+          </a:extLst>
+        </p:spPr>
+      </p:pic>
     </p:spTree>
     <p:extLst>
       <p:ext uri="{BB962C8B-B14F-4D97-AF65-F5344CB8AC3E}">
@@ -12700,7 +12803,7 @@
             </a:pPr>
             <a:r>
               <a:rPr lang="en-GB" dirty="0"/>
-              <a:t>GitHub is an online repository which acts as your remote. This is accessible across teams</a:t>
+              <a:t>GitHub is an online repository which acts as your remote. This is accessible across teams, and can be duplicated into a ‘local’ folder, which acts as a personal repository</a:t>
             </a:r>
           </a:p>
           <a:p>
@@ -12798,6 +12901,53 @@
           </a:p>
         </p:txBody>
       </p:sp>
+      <p:pic>
+        <p:nvPicPr>
+          <p:cNvPr id="1026" name="Picture 2" descr="See the source image">
+            <a:extLst>
+              <a:ext uri="{FF2B5EF4-FFF2-40B4-BE49-F238E27FC236}">
+                <a16:creationId xmlns:a16="http://schemas.microsoft.com/office/drawing/2014/main" id="{EC21998A-F167-4B76-A1C5-254F27156F67}"/>
+              </a:ext>
+            </a:extLst>
+          </p:cNvPr>
+          <p:cNvPicPr>
+            <a:picLocks noChangeAspect="1" noChangeArrowheads="1"/>
+          </p:cNvPicPr>
+          <p:nvPr/>
+        </p:nvPicPr>
+        <p:blipFill>
+          <a:blip r:embed="rId3">
+            <a:extLst>
+              <a:ext uri="{28A0092B-C50C-407E-A947-70E740481C1C}">
+                <a14:useLocalDpi xmlns:a14="http://schemas.microsoft.com/office/drawing/2010/main" val="0"/>
+              </a:ext>
+            </a:extLst>
+          </a:blip>
+          <a:srcRect/>
+          <a:stretch>
+            <a:fillRect/>
+          </a:stretch>
+        </p:blipFill>
+        <p:spPr bwMode="auto">
+          <a:xfrm>
+            <a:off x="7338694" y="5450056"/>
+            <a:ext cx="1382318" cy="1248508"/>
+          </a:xfrm>
+          <a:prstGeom prst="rect">
+            <a:avLst/>
+          </a:prstGeom>
+          <a:noFill/>
+          <a:extLst>
+            <a:ext uri="{909E8E84-426E-40DD-AFC4-6F175D3DCCD1}">
+              <a14:hiddenFill xmlns:a14="http://schemas.microsoft.com/office/drawing/2010/main">
+                <a:solidFill>
+                  <a:srgbClr val="FFFFFF"/>
+                </a:solidFill>
+              </a14:hiddenFill>
+            </a:ext>
+          </a:extLst>
+        </p:spPr>
+      </p:pic>
     </p:spTree>
     <p:extLst>
       <p:ext uri="{BB962C8B-B14F-4D97-AF65-F5344CB8AC3E}">
@@ -13093,6 +13243,53 @@
           </a:p>
         </p:txBody>
       </p:sp>
+      <p:pic>
+        <p:nvPicPr>
+          <p:cNvPr id="5" name="Picture 2" descr="See the source image">
+            <a:extLst>
+              <a:ext uri="{FF2B5EF4-FFF2-40B4-BE49-F238E27FC236}">
+                <a16:creationId xmlns:a16="http://schemas.microsoft.com/office/drawing/2014/main" id="{829CB498-2C9B-40A0-8968-E56765A79068}"/>
+              </a:ext>
+            </a:extLst>
+          </p:cNvPr>
+          <p:cNvPicPr>
+            <a:picLocks noChangeAspect="1" noChangeArrowheads="1"/>
+          </p:cNvPicPr>
+          <p:nvPr/>
+        </p:nvPicPr>
+        <p:blipFill>
+          <a:blip r:embed="rId3">
+            <a:extLst>
+              <a:ext uri="{28A0092B-C50C-407E-A947-70E740481C1C}">
+                <a14:useLocalDpi xmlns:a14="http://schemas.microsoft.com/office/drawing/2010/main" val="0"/>
+              </a:ext>
+            </a:extLst>
+          </a:blip>
+          <a:srcRect/>
+          <a:stretch>
+            <a:fillRect/>
+          </a:stretch>
+        </p:blipFill>
+        <p:spPr bwMode="auto">
+          <a:xfrm>
+            <a:off x="7338694" y="5450056"/>
+            <a:ext cx="1382318" cy="1248508"/>
+          </a:xfrm>
+          <a:prstGeom prst="rect">
+            <a:avLst/>
+          </a:prstGeom>
+          <a:noFill/>
+          <a:extLst>
+            <a:ext uri="{909E8E84-426E-40DD-AFC4-6F175D3DCCD1}">
+              <a14:hiddenFill xmlns:a14="http://schemas.microsoft.com/office/drawing/2010/main">
+                <a:solidFill>
+                  <a:srgbClr val="FFFFFF"/>
+                </a:solidFill>
+              </a14:hiddenFill>
+            </a:ext>
+          </a:extLst>
+        </p:spPr>
+      </p:pic>
     </p:spTree>
     <p:extLst>
       <p:ext uri="{BB962C8B-B14F-4D97-AF65-F5344CB8AC3E}">
@@ -13341,6 +13538,53 @@
           </a:p>
         </p:txBody>
       </p:sp>
+      <p:pic>
+        <p:nvPicPr>
+          <p:cNvPr id="5" name="Picture 2" descr="See the source image">
+            <a:extLst>
+              <a:ext uri="{FF2B5EF4-FFF2-40B4-BE49-F238E27FC236}">
+                <a16:creationId xmlns:a16="http://schemas.microsoft.com/office/drawing/2014/main" id="{62E3031D-4D8D-4299-BC07-A474B9B7732C}"/>
+              </a:ext>
+            </a:extLst>
+          </p:cNvPr>
+          <p:cNvPicPr>
+            <a:picLocks noChangeAspect="1" noChangeArrowheads="1"/>
+          </p:cNvPicPr>
+          <p:nvPr/>
+        </p:nvPicPr>
+        <p:blipFill>
+          <a:blip r:embed="rId4">
+            <a:extLst>
+              <a:ext uri="{28A0092B-C50C-407E-A947-70E740481C1C}">
+                <a14:useLocalDpi xmlns:a14="http://schemas.microsoft.com/office/drawing/2010/main" val="0"/>
+              </a:ext>
+            </a:extLst>
+          </a:blip>
+          <a:srcRect/>
+          <a:stretch>
+            <a:fillRect/>
+          </a:stretch>
+        </p:blipFill>
+        <p:spPr bwMode="auto">
+          <a:xfrm>
+            <a:off x="7338694" y="5450056"/>
+            <a:ext cx="1382318" cy="1248508"/>
+          </a:xfrm>
+          <a:prstGeom prst="rect">
+            <a:avLst/>
+          </a:prstGeom>
+          <a:noFill/>
+          <a:extLst>
+            <a:ext uri="{909E8E84-426E-40DD-AFC4-6F175D3DCCD1}">
+              <a14:hiddenFill xmlns:a14="http://schemas.microsoft.com/office/drawing/2010/main">
+                <a:solidFill>
+                  <a:srgbClr val="FFFFFF"/>
+                </a:solidFill>
+              </a14:hiddenFill>
+            </a:ext>
+          </a:extLst>
+        </p:spPr>
+      </p:pic>
     </p:spTree>
     <p:extLst>
       <p:ext uri="{BB962C8B-B14F-4D97-AF65-F5344CB8AC3E}">
@@ -13392,6 +13636,32 @@
           <a:bodyPr/>
           <a:lstStyle/>
           <a:p>
+            <a:r>
+              <a:rPr lang="en-GB" dirty="0"/>
+              <a:t>Branches are an independent line of development, away from the main branch</a:t>
+            </a:r>
+          </a:p>
+          <a:p>
+            <a:pPr lvl="1">
+              <a:buFont typeface="Courier New" panose="02070309020205020404" pitchFamily="49" charset="0"/>
+              <a:buChar char="o"/>
+            </a:pPr>
+            <a:r>
+              <a:rPr lang="en-GB" dirty="0"/>
+              <a:t>Files are identical to the main branch, but adding and committing new files, or changes, do not automatically affect the main branch</a:t>
+            </a:r>
+          </a:p>
+          <a:p>
+            <a:pPr lvl="1">
+              <a:buFont typeface="Courier New" panose="02070309020205020404" pitchFamily="49" charset="0"/>
+              <a:buChar char="o"/>
+            </a:pPr>
+            <a:r>
+              <a:rPr lang="en-GB" dirty="0"/>
+              <a:t>You could name branches v1, v1.1 etc. as change are made, which keeps a log of all changes made</a:t>
+            </a:r>
+          </a:p>
+          <a:p>
             <a:pPr lvl="1">
               <a:buFont typeface="Courier New" panose="02070309020205020404" pitchFamily="49" charset="0"/>
               <a:buChar char="o"/>
@@ -13399,10 +13669,77 @@
             <a:endParaRPr lang="en-GB" dirty="0"/>
           </a:p>
           <a:p>
-            <a:pPr marL="457200" lvl="1" indent="0">
-              <a:buNone/>
+            <a:r>
+              <a:rPr lang="en-GB" i="1" dirty="0"/>
+              <a:t>git checkout –b </a:t>
+            </a:r>
+            <a:r>
+              <a:rPr lang="en-GB" i="1" dirty="0" err="1"/>
+              <a:t>edit_branch</a:t>
+            </a:r>
+            <a:r>
+              <a:rPr lang="en-GB" i="1" dirty="0"/>
+              <a:t> </a:t>
+            </a:r>
+            <a:r>
+              <a:rPr lang="en-GB" dirty="0"/>
+              <a:t>-&gt; Creating a new branch ‘</a:t>
+            </a:r>
+            <a:r>
+              <a:rPr lang="en-GB" dirty="0" err="1"/>
+              <a:t>edit_branch</a:t>
+            </a:r>
+            <a:r>
+              <a:rPr lang="en-GB" dirty="0"/>
+              <a:t>’ and moving to that branch</a:t>
+            </a:r>
+          </a:p>
+          <a:p>
+            <a:pPr lvl="1">
+              <a:buFont typeface="Courier New" panose="02070309020205020404" pitchFamily="49" charset="0"/>
+              <a:buChar char="o"/>
+            </a:pPr>
+            <a:r>
+              <a:rPr lang="en-GB" dirty="0"/>
+              <a:t>Here we can make the required changes that can be proposed, but not necessarily merged to the main branch</a:t>
+            </a:r>
+          </a:p>
+          <a:p>
+            <a:pPr lvl="1">
+              <a:buFont typeface="Courier New" panose="02070309020205020404" pitchFamily="49" charset="0"/>
+              <a:buChar char="o"/>
+            </a:pPr>
+            <a:r>
+              <a:rPr lang="en-GB" i="1" dirty="0"/>
+              <a:t>git checkout master </a:t>
+            </a:r>
+            <a:r>
+              <a:rPr lang="en-GB" dirty="0"/>
+              <a:t>would move you back to the main branch</a:t>
+            </a:r>
+          </a:p>
+          <a:p>
+            <a:pPr lvl="1">
+              <a:buFont typeface="Courier New" panose="02070309020205020404" pitchFamily="49" charset="0"/>
+              <a:buChar char="o"/>
             </a:pPr>
             <a:endParaRPr lang="en-GB" dirty="0"/>
+          </a:p>
+          <a:p>
+            <a:r>
+              <a:rPr lang="en-GB" dirty="0"/>
+              <a:t>Switching between branches allows you to compare the versions and assess the changes made. This means that further alterations can be made before the branches are merged, and the master then contains the latest version</a:t>
+            </a:r>
+          </a:p>
+          <a:p>
+            <a:pPr lvl="1">
+              <a:buFont typeface="Courier New" panose="02070309020205020404" pitchFamily="49" charset="0"/>
+              <a:buChar char="o"/>
+            </a:pPr>
+            <a:endParaRPr lang="en-GB" i="1" dirty="0"/>
+          </a:p>
+          <a:p>
+            <a:endParaRPr lang="en-GB" i="1" dirty="0"/>
           </a:p>
         </p:txBody>
       </p:sp>
@@ -13463,6 +13800,53 @@
           </a:p>
         </p:txBody>
       </p:sp>
+      <p:pic>
+        <p:nvPicPr>
+          <p:cNvPr id="5" name="Picture 2" descr="See the source image">
+            <a:extLst>
+              <a:ext uri="{FF2B5EF4-FFF2-40B4-BE49-F238E27FC236}">
+                <a16:creationId xmlns:a16="http://schemas.microsoft.com/office/drawing/2014/main" id="{DA37BB83-A404-466E-AF5B-9DECFAADE798}"/>
+              </a:ext>
+            </a:extLst>
+          </p:cNvPr>
+          <p:cNvPicPr>
+            <a:picLocks noChangeAspect="1" noChangeArrowheads="1"/>
+          </p:cNvPicPr>
+          <p:nvPr/>
+        </p:nvPicPr>
+        <p:blipFill>
+          <a:blip r:embed="rId3">
+            <a:extLst>
+              <a:ext uri="{28A0092B-C50C-407E-A947-70E740481C1C}">
+                <a14:useLocalDpi xmlns:a14="http://schemas.microsoft.com/office/drawing/2010/main" val="0"/>
+              </a:ext>
+            </a:extLst>
+          </a:blip>
+          <a:srcRect/>
+          <a:stretch>
+            <a:fillRect/>
+          </a:stretch>
+        </p:blipFill>
+        <p:spPr bwMode="auto">
+          <a:xfrm>
+            <a:off x="7338694" y="5450056"/>
+            <a:ext cx="1382318" cy="1248508"/>
+          </a:xfrm>
+          <a:prstGeom prst="rect">
+            <a:avLst/>
+          </a:prstGeom>
+          <a:noFill/>
+          <a:extLst>
+            <a:ext uri="{909E8E84-426E-40DD-AFC4-6F175D3DCCD1}">
+              <a14:hiddenFill xmlns:a14="http://schemas.microsoft.com/office/drawing/2010/main">
+                <a:solidFill>
+                  <a:srgbClr val="FFFFFF"/>
+                </a:solidFill>
+              </a14:hiddenFill>
+            </a:ext>
+          </a:extLst>
+        </p:spPr>
+      </p:pic>
     </p:spTree>
     <p:extLst>
       <p:ext uri="{BB962C8B-B14F-4D97-AF65-F5344CB8AC3E}">
@@ -13493,6 +13877,53 @@
           <a:chExt cx="0" cy="0"/>
         </a:xfrm>
       </p:grpSpPr>
+      <p:pic>
+        <p:nvPicPr>
+          <p:cNvPr id="5" name="Picture 2" descr="See the source image">
+            <a:extLst>
+              <a:ext uri="{FF2B5EF4-FFF2-40B4-BE49-F238E27FC236}">
+                <a16:creationId xmlns:a16="http://schemas.microsoft.com/office/drawing/2014/main" id="{0ED5EA98-2928-4140-96E4-BCECB454AD2D}"/>
+              </a:ext>
+            </a:extLst>
+          </p:cNvPr>
+          <p:cNvPicPr>
+            <a:picLocks noChangeAspect="1" noChangeArrowheads="1"/>
+          </p:cNvPicPr>
+          <p:nvPr/>
+        </p:nvPicPr>
+        <p:blipFill>
+          <a:blip r:embed="rId3">
+            <a:extLst>
+              <a:ext uri="{28A0092B-C50C-407E-A947-70E740481C1C}">
+                <a14:useLocalDpi xmlns:a14="http://schemas.microsoft.com/office/drawing/2010/main" val="0"/>
+              </a:ext>
+            </a:extLst>
+          </a:blip>
+          <a:srcRect/>
+          <a:stretch>
+            <a:fillRect/>
+          </a:stretch>
+        </p:blipFill>
+        <p:spPr bwMode="auto">
+          <a:xfrm>
+            <a:off x="7338694" y="5450056"/>
+            <a:ext cx="1382318" cy="1248508"/>
+          </a:xfrm>
+          <a:prstGeom prst="rect">
+            <a:avLst/>
+          </a:prstGeom>
+          <a:noFill/>
+          <a:extLst>
+            <a:ext uri="{909E8E84-426E-40DD-AFC4-6F175D3DCCD1}">
+              <a14:hiddenFill xmlns:a14="http://schemas.microsoft.com/office/drawing/2010/main">
+                <a:solidFill>
+                  <a:srgbClr val="FFFFFF"/>
+                </a:solidFill>
+              </a14:hiddenFill>
+            </a:ext>
+          </a:extLst>
+        </p:spPr>
+      </p:pic>
       <p:sp>
         <p:nvSpPr>
           <p:cNvPr id="2" name="Content Placeholder 1">
@@ -13514,6 +13945,129 @@
           <a:bodyPr/>
           <a:lstStyle/>
           <a:p>
+            <a:r>
+              <a:rPr lang="en-GB" dirty="0"/>
+              <a:t>Version Control -&gt; Version Control can be something that is difficult/time consuming to complete</a:t>
+            </a:r>
+          </a:p>
+          <a:p>
+            <a:pPr lvl="1">
+              <a:buFont typeface="Courier New" panose="02070309020205020404" pitchFamily="49" charset="0"/>
+              <a:buChar char="o"/>
+            </a:pPr>
+            <a:r>
+              <a:rPr lang="en-GB" dirty="0"/>
+              <a:t>There are often small changes that may seem meaningless to record</a:t>
+            </a:r>
+          </a:p>
+          <a:p>
+            <a:pPr lvl="1">
+              <a:buFont typeface="Courier New" panose="02070309020205020404" pitchFamily="49" charset="0"/>
+              <a:buChar char="o"/>
+            </a:pPr>
+            <a:r>
+              <a:rPr lang="en-GB" dirty="0"/>
+              <a:t>There can be large changes that change the landscape of a file</a:t>
+            </a:r>
+          </a:p>
+          <a:p>
+            <a:pPr lvl="1">
+              <a:buFont typeface="Courier New" panose="02070309020205020404" pitchFamily="49" charset="0"/>
+              <a:buChar char="o"/>
+            </a:pPr>
+            <a:r>
+              <a:rPr lang="en-GB" dirty="0"/>
+              <a:t>Branching allows small and large changes to be tracked, and files to be archived without clutter</a:t>
+            </a:r>
+          </a:p>
+          <a:p>
+            <a:pPr lvl="1">
+              <a:buFont typeface="Courier New" panose="02070309020205020404" pitchFamily="49" charset="0"/>
+              <a:buChar char="o"/>
+            </a:pPr>
+            <a:endParaRPr lang="en-GB" dirty="0"/>
+          </a:p>
+          <a:p>
+            <a:r>
+              <a:rPr lang="en-GB" dirty="0"/>
+              <a:t>Collaborative Working -&gt; The team often works on large R scripts / SQL queries that may constantly change over the process of producing a product</a:t>
+            </a:r>
+          </a:p>
+          <a:p>
+            <a:pPr lvl="1">
+              <a:buFont typeface="Courier New" panose="02070309020205020404" pitchFamily="49" charset="0"/>
+              <a:buChar char="o"/>
+            </a:pPr>
+            <a:r>
+              <a:rPr lang="en-GB" dirty="0"/>
+              <a:t>Multiple colleagues can access scripts, make changes, </a:t>
+            </a:r>
+            <a:r>
+              <a:rPr lang="en-GB" i="1" dirty="0"/>
+              <a:t>push</a:t>
+            </a:r>
+            <a:r>
+              <a:rPr lang="en-GB" dirty="0"/>
+              <a:t> them to the remote, and pull the changes that others have made</a:t>
+            </a:r>
+          </a:p>
+          <a:p>
+            <a:pPr lvl="1">
+              <a:buFont typeface="Courier New" panose="02070309020205020404" pitchFamily="49" charset="0"/>
+              <a:buChar char="o"/>
+            </a:pPr>
+            <a:r>
+              <a:rPr lang="en-GB" dirty="0"/>
+              <a:t>These changes can be reviewed centrally, and commits and merges can be made where we are confident that change is necessary</a:t>
+            </a:r>
+          </a:p>
+          <a:p>
+            <a:pPr lvl="1">
+              <a:buFont typeface="Courier New" panose="02070309020205020404" pitchFamily="49" charset="0"/>
+              <a:buChar char="o"/>
+            </a:pPr>
+            <a:r>
+              <a:rPr lang="en-GB" dirty="0"/>
+              <a:t>This would be useful for future iterations of PLICS where the R code will likely become much larger, and more people will work on it</a:t>
+            </a:r>
+          </a:p>
+          <a:p>
+            <a:pPr lvl="1">
+              <a:buFont typeface="Courier New" panose="02070309020205020404" pitchFamily="49" charset="0"/>
+              <a:buChar char="o"/>
+            </a:pPr>
+            <a:endParaRPr lang="en-GB" dirty="0"/>
+          </a:p>
+          <a:p>
+            <a:r>
+              <a:rPr lang="en-GB" dirty="0"/>
+              <a:t>Transparency and Schematics -&gt; Schematics can sometimes be difficult to produce as lots of processes have taken place</a:t>
+            </a:r>
+          </a:p>
+          <a:p>
+            <a:pPr lvl="1">
+              <a:buFont typeface="Courier New" panose="02070309020205020404" pitchFamily="49" charset="0"/>
+              <a:buChar char="o"/>
+            </a:pPr>
+            <a:r>
+              <a:rPr lang="en-GB" dirty="0"/>
+              <a:t>This nature of version control allows the steps of change for production documents to be followed easily, if an appropriate naming system is adopted</a:t>
+            </a:r>
+          </a:p>
+          <a:p>
+            <a:pPr lvl="1">
+              <a:buFont typeface="Courier New" panose="02070309020205020404" pitchFamily="49" charset="0"/>
+              <a:buChar char="o"/>
+            </a:pPr>
+            <a:r>
+              <a:rPr lang="en-GB" dirty="0"/>
+              <a:t>The –m messaging feature allows colleagues to label their changes, e.g. ‘lines added for MFF values’</a:t>
+            </a:r>
+          </a:p>
+          <a:p>
+            <a:pPr marL="457200" lvl="1" indent="0">
+              <a:buNone/>
+            </a:pPr>
             <a:endParaRPr lang="en-GB" dirty="0"/>
           </a:p>
         </p:txBody>
@@ -14420,15 +14974,6 @@
 </file>
 
 <file path=customXml/item1.xml><?xml version="1.0" encoding="utf-8"?>
-<?mso-contentType ?>
-<FormTemplates xmlns="http://schemas.microsoft.com/sharepoint/v3/contenttype/forms">
-  <Display>DocumentLibraryForm</Display>
-  <Edit>DocumentLibraryForm</Edit>
-  <New>DocumentLibraryForm</New>
-</FormTemplates>
-</file>
-
-<file path=customXml/item2.xml><?xml version="1.0" encoding="utf-8"?>
 <ct:contentTypeSchema xmlns:ct="http://schemas.microsoft.com/office/2006/metadata/contentType" xmlns:ma="http://schemas.microsoft.com/office/2006/metadata/properties/metaAttributes" ct:_="" ma:_="" ma:contentTypeName="Document" ma:contentTypeID="0x010100308E40E706C7A346904F58642B7D1969" ma:contentTypeVersion="0" ma:contentTypeDescription="Create a new document." ma:contentTypeScope="" ma:versionID="0ea485b46902d4f7e49967f1b2c25a65">
   <xsd:schema xmlns:xsd="http://www.w3.org/2001/XMLSchema" xmlns:xs="http://www.w3.org/2001/XMLSchema" xmlns:p="http://schemas.microsoft.com/office/2006/metadata/properties" targetNamespace="http://schemas.microsoft.com/office/2006/metadata/properties" ma:root="true" ma:fieldsID="90078a0fe6c183ae62661f67b7399e8a">
     <xsd:element name="properties">
@@ -14542,6 +15087,15 @@
 </ct:contentTypeSchema>
 </file>
 
+<file path=customXml/item2.xml><?xml version="1.0" encoding="utf-8"?>
+<?mso-contentType ?>
+<FormTemplates xmlns="http://schemas.microsoft.com/sharepoint/v3/contenttype/forms">
+  <Display>DocumentLibraryForm</Display>
+  <Edit>DocumentLibraryForm</Edit>
+  <New>DocumentLibraryForm</New>
+</FormTemplates>
+</file>
+
 <file path=customXml/item3.xml><?xml version="1.0" encoding="utf-8"?>
 <p:properties xmlns:p="http://schemas.microsoft.com/office/2006/metadata/properties" xmlns:xsi="http://www.w3.org/2001/XMLSchema-instance" xmlns:pc="http://schemas.microsoft.com/office/infopath/2007/PartnerControls">
   <documentManagement/>
@@ -14549,14 +15103,6 @@
 </file>
 
 <file path=customXml/itemProps1.xml><?xml version="1.0" encoding="utf-8"?>
-<ds:datastoreItem xmlns:ds="http://schemas.openxmlformats.org/officeDocument/2006/customXml" ds:itemID="{A6333066-D95F-4DC9-8F45-8431A5C3C76B}">
-  <ds:schemaRefs>
-    <ds:schemaRef ds:uri="http://schemas.microsoft.com/sharepoint/v3/contenttype/forms"/>
-  </ds:schemaRefs>
-</ds:datastoreItem>
-</file>
-
-<file path=customXml/itemProps2.xml><?xml version="1.0" encoding="utf-8"?>
 <ds:datastoreItem xmlns:ds="http://schemas.openxmlformats.org/officeDocument/2006/customXml" ds:itemID="{08DD32EF-F09C-4573-9C23-B48EA7D5886E}">
   <ds:schemaRefs>
     <ds:schemaRef ds:uri="http://schemas.microsoft.com/office/2006/metadata/contentType"/>
@@ -14568,6 +15114,14 @@
     <ds:schemaRef ds:uri="http://purl.org/dc/terms/"/>
     <ds:schemaRef ds:uri="http://schemas.microsoft.com/internal/obd"/>
     <ds:schemaRef ds:uri="http://schemas.microsoft.com/office/infopath/2007/PartnerControls"/>
+  </ds:schemaRefs>
+</ds:datastoreItem>
+</file>
+
+<file path=customXml/itemProps2.xml><?xml version="1.0" encoding="utf-8"?>
+<ds:datastoreItem xmlns:ds="http://schemas.openxmlformats.org/officeDocument/2006/customXml" ds:itemID="{A6333066-D95F-4DC9-8F45-8431A5C3C76B}">
+  <ds:schemaRefs>
+    <ds:schemaRef ds:uri="http://schemas.microsoft.com/sharepoint/v3/contenttype/forms"/>
   </ds:schemaRefs>
 </ds:datastoreItem>
 </file>

</xml_diff>

<commit_message>
PPT Before sending to Johan
</commit_message>
<xml_diff>
--- a/GitIntro.pptx
+++ b/GitIntro.pptx
@@ -158,7 +158,7 @@
   <pc:docChgLst>
     <pc:chgData name="Will Brooks" userId="d4c2b272-852e-451d-80ba-d2f905b38211" providerId="ADAL" clId="{37A0AFB6-F6CA-4F11-9C33-0D7619B1449C}"/>
     <pc:docChg chg="undo custSel addSld delSld modSld">
-      <pc:chgData name="Will Brooks" userId="d4c2b272-852e-451d-80ba-d2f905b38211" providerId="ADAL" clId="{37A0AFB6-F6CA-4F11-9C33-0D7619B1449C}" dt="2022-09-22T08:17:58.751" v="7699" actId="20577"/>
+      <pc:chgData name="Will Brooks" userId="d4c2b272-852e-451d-80ba-d2f905b38211" providerId="ADAL" clId="{37A0AFB6-F6CA-4F11-9C33-0D7619B1449C}" dt="2022-09-22T10:35:20.565" v="7742" actId="20577"/>
       <pc:docMkLst>
         <pc:docMk/>
       </pc:docMkLst>
@@ -502,13 +502,13 @@
         </pc:sldMkLst>
       </pc:sldChg>
       <pc:sldChg chg="addSp modSp add del mod">
-        <pc:chgData name="Will Brooks" userId="d4c2b272-852e-451d-80ba-d2f905b38211" providerId="ADAL" clId="{37A0AFB6-F6CA-4F11-9C33-0D7619B1449C}" dt="2022-09-21T13:45:28.282" v="6426" actId="20577"/>
+        <pc:chgData name="Will Brooks" userId="d4c2b272-852e-451d-80ba-d2f905b38211" providerId="ADAL" clId="{37A0AFB6-F6CA-4F11-9C33-0D7619B1449C}" dt="2022-09-22T10:34:20.997" v="7729" actId="20577"/>
         <pc:sldMkLst>
           <pc:docMk/>
           <pc:sldMk cId="3770664684" sldId="316"/>
         </pc:sldMkLst>
         <pc:spChg chg="mod">
-          <ac:chgData name="Will Brooks" userId="d4c2b272-852e-451d-80ba-d2f905b38211" providerId="ADAL" clId="{37A0AFB6-F6CA-4F11-9C33-0D7619B1449C}" dt="2022-09-21T13:45:28.282" v="6426" actId="20577"/>
+          <ac:chgData name="Will Brooks" userId="d4c2b272-852e-451d-80ba-d2f905b38211" providerId="ADAL" clId="{37A0AFB6-F6CA-4F11-9C33-0D7619B1449C}" dt="2022-09-22T10:34:20.997" v="7729" actId="20577"/>
           <ac:spMkLst>
             <pc:docMk/>
             <pc:sldMk cId="3770664684" sldId="316"/>
@@ -657,13 +657,13 @@
         </pc:picChg>
       </pc:sldChg>
       <pc:sldChg chg="addSp delSp modSp add mod">
-        <pc:chgData name="Will Brooks" userId="d4c2b272-852e-451d-80ba-d2f905b38211" providerId="ADAL" clId="{37A0AFB6-F6CA-4F11-9C33-0D7619B1449C}" dt="2022-09-22T08:10:13.867" v="6999" actId="20577"/>
+        <pc:chgData name="Will Brooks" userId="d4c2b272-852e-451d-80ba-d2f905b38211" providerId="ADAL" clId="{37A0AFB6-F6CA-4F11-9C33-0D7619B1449C}" dt="2022-09-22T10:34:49.583" v="7732" actId="1076"/>
         <pc:sldMkLst>
           <pc:docMk/>
           <pc:sldMk cId="1632702149" sldId="321"/>
         </pc:sldMkLst>
         <pc:spChg chg="add mod">
-          <ac:chgData name="Will Brooks" userId="d4c2b272-852e-451d-80ba-d2f905b38211" providerId="ADAL" clId="{37A0AFB6-F6CA-4F11-9C33-0D7619B1449C}" dt="2022-09-22T08:10:10.456" v="6996" actId="20577"/>
+          <ac:chgData name="Will Brooks" userId="d4c2b272-852e-451d-80ba-d2f905b38211" providerId="ADAL" clId="{37A0AFB6-F6CA-4F11-9C33-0D7619B1449C}" dt="2022-09-22T10:34:49.583" v="7732" actId="1076"/>
           <ac:spMkLst>
             <pc:docMk/>
             <pc:sldMk cId="1632702149" sldId="321"/>
@@ -687,7 +687,7 @@
           </ac:spMkLst>
         </pc:spChg>
         <pc:spChg chg="add mod">
-          <ac:chgData name="Will Brooks" userId="d4c2b272-852e-451d-80ba-d2f905b38211" providerId="ADAL" clId="{37A0AFB6-F6CA-4F11-9C33-0D7619B1449C}" dt="2022-09-22T08:10:13.867" v="6999" actId="20577"/>
+          <ac:chgData name="Will Brooks" userId="d4c2b272-852e-451d-80ba-d2f905b38211" providerId="ADAL" clId="{37A0AFB6-F6CA-4F11-9C33-0D7619B1449C}" dt="2022-09-22T10:34:42.734" v="7731" actId="1076"/>
           <ac:spMkLst>
             <pc:docMk/>
             <pc:sldMk cId="1632702149" sldId="321"/>
@@ -703,7 +703,7 @@
           </ac:picMkLst>
         </pc:picChg>
         <pc:picChg chg="add mod">
-          <ac:chgData name="Will Brooks" userId="d4c2b272-852e-451d-80ba-d2f905b38211" providerId="ADAL" clId="{37A0AFB6-F6CA-4F11-9C33-0D7619B1449C}" dt="2022-09-21T15:05:07.183" v="6551" actId="1076"/>
+          <ac:chgData name="Will Brooks" userId="d4c2b272-852e-451d-80ba-d2f905b38211" providerId="ADAL" clId="{37A0AFB6-F6CA-4F11-9C33-0D7619B1449C}" dt="2022-09-22T10:34:37.143" v="7730" actId="1076"/>
           <ac:picMkLst>
             <pc:docMk/>
             <pc:sldMk cId="1632702149" sldId="321"/>
@@ -886,7 +886,7 @@
         </pc:picChg>
       </pc:sldChg>
       <pc:sldChg chg="addSp modSp add mod">
-        <pc:chgData name="Will Brooks" userId="d4c2b272-852e-451d-80ba-d2f905b38211" providerId="ADAL" clId="{37A0AFB6-F6CA-4F11-9C33-0D7619B1449C}" dt="2022-09-22T08:16:57.485" v="7584" actId="14100"/>
+        <pc:chgData name="Will Brooks" userId="d4c2b272-852e-451d-80ba-d2f905b38211" providerId="ADAL" clId="{37A0AFB6-F6CA-4F11-9C33-0D7619B1449C}" dt="2022-09-22T10:35:12.918" v="7738" actId="20577"/>
         <pc:sldMkLst>
           <pc:docMk/>
           <pc:sldMk cId="3536564236" sldId="324"/>
@@ -900,7 +900,7 @@
           </ac:spMkLst>
         </pc:spChg>
         <pc:spChg chg="add mod">
-          <ac:chgData name="Will Brooks" userId="d4c2b272-852e-451d-80ba-d2f905b38211" providerId="ADAL" clId="{37A0AFB6-F6CA-4F11-9C33-0D7619B1449C}" dt="2022-09-22T08:14:39.538" v="7358" actId="14100"/>
+          <ac:chgData name="Will Brooks" userId="d4c2b272-852e-451d-80ba-d2f905b38211" providerId="ADAL" clId="{37A0AFB6-F6CA-4F11-9C33-0D7619B1449C}" dt="2022-09-22T10:35:07.476" v="7734" actId="20577"/>
           <ac:spMkLst>
             <pc:docMk/>
             <pc:sldMk cId="3536564236" sldId="324"/>
@@ -908,7 +908,7 @@
           </ac:spMkLst>
         </pc:spChg>
         <pc:spChg chg="add mod">
-          <ac:chgData name="Will Brooks" userId="d4c2b272-852e-451d-80ba-d2f905b38211" providerId="ADAL" clId="{37A0AFB6-F6CA-4F11-9C33-0D7619B1449C}" dt="2022-09-22T08:15:30.421" v="7431" actId="14100"/>
+          <ac:chgData name="Will Brooks" userId="d4c2b272-852e-451d-80ba-d2f905b38211" providerId="ADAL" clId="{37A0AFB6-F6CA-4F11-9C33-0D7619B1449C}" dt="2022-09-22T10:35:09.906" v="7736" actId="20577"/>
           <ac:spMkLst>
             <pc:docMk/>
             <pc:sldMk cId="3536564236" sldId="324"/>
@@ -916,7 +916,7 @@
           </ac:spMkLst>
         </pc:spChg>
         <pc:spChg chg="add mod">
-          <ac:chgData name="Will Brooks" userId="d4c2b272-852e-451d-80ba-d2f905b38211" providerId="ADAL" clId="{37A0AFB6-F6CA-4F11-9C33-0D7619B1449C}" dt="2022-09-22T08:16:57.485" v="7584" actId="14100"/>
+          <ac:chgData name="Will Brooks" userId="d4c2b272-852e-451d-80ba-d2f905b38211" providerId="ADAL" clId="{37A0AFB6-F6CA-4F11-9C33-0D7619B1449C}" dt="2022-09-22T10:35:12.918" v="7738" actId="20577"/>
           <ac:spMkLst>
             <pc:docMk/>
             <pc:sldMk cId="3536564236" sldId="324"/>
@@ -965,7 +965,7 @@
         </pc:picChg>
       </pc:sldChg>
       <pc:sldChg chg="addSp modSp add mod">
-        <pc:chgData name="Will Brooks" userId="d4c2b272-852e-451d-80ba-d2f905b38211" providerId="ADAL" clId="{37A0AFB6-F6CA-4F11-9C33-0D7619B1449C}" dt="2022-09-22T08:17:58.751" v="7699" actId="20577"/>
+        <pc:chgData name="Will Brooks" userId="d4c2b272-852e-451d-80ba-d2f905b38211" providerId="ADAL" clId="{37A0AFB6-F6CA-4F11-9C33-0D7619B1449C}" dt="2022-09-22T10:35:20.565" v="7742" actId="20577"/>
         <pc:sldMkLst>
           <pc:docMk/>
           <pc:sldMk cId="2406069309" sldId="325"/>
@@ -979,7 +979,7 @@
           </ac:spMkLst>
         </pc:spChg>
         <pc:spChg chg="add mod">
-          <ac:chgData name="Will Brooks" userId="d4c2b272-852e-451d-80ba-d2f905b38211" providerId="ADAL" clId="{37A0AFB6-F6CA-4F11-9C33-0D7619B1449C}" dt="2022-09-22T08:17:32.013" v="7655" actId="14100"/>
+          <ac:chgData name="Will Brooks" userId="d4c2b272-852e-451d-80ba-d2f905b38211" providerId="ADAL" clId="{37A0AFB6-F6CA-4F11-9C33-0D7619B1449C}" dt="2022-09-22T10:35:17.604" v="7740" actId="20577"/>
           <ac:spMkLst>
             <pc:docMk/>
             <pc:sldMk cId="2406069309" sldId="325"/>
@@ -987,7 +987,7 @@
           </ac:spMkLst>
         </pc:spChg>
         <pc:spChg chg="add mod">
-          <ac:chgData name="Will Brooks" userId="d4c2b272-852e-451d-80ba-d2f905b38211" providerId="ADAL" clId="{37A0AFB6-F6CA-4F11-9C33-0D7619B1449C}" dt="2022-09-22T08:17:58.751" v="7699" actId="20577"/>
+          <ac:chgData name="Will Brooks" userId="d4c2b272-852e-451d-80ba-d2f905b38211" providerId="ADAL" clId="{37A0AFB6-F6CA-4F11-9C33-0D7619B1449C}" dt="2022-09-22T10:35:20.565" v="7742" actId="20577"/>
           <ac:spMkLst>
             <pc:docMk/>
             <pc:sldMk cId="2406069309" sldId="325"/>
@@ -13866,7 +13866,7 @@
           <a:p>
             <a:r>
               <a:rPr lang="en-GB" sz="1400" dirty="0"/>
-              <a:t>12. Check log to see commits</a:t>
+              <a:t>11. Check log to see commits</a:t>
             </a:r>
           </a:p>
         </p:txBody>
@@ -13901,7 +13901,7 @@
           <a:p>
             <a:r>
               <a:rPr lang="en-GB" sz="1400" dirty="0"/>
-              <a:t>13. Move back to Master branch, see that the file is ‘as was’</a:t>
+              <a:t>12. Move back to Master branch, see that the file is ‘as was’</a:t>
             </a:r>
           </a:p>
         </p:txBody>
@@ -13936,7 +13936,7 @@
           <a:p>
             <a:r>
               <a:rPr lang="en-GB" sz="1400" dirty="0"/>
-              <a:t>14. Merge Master with </a:t>
+              <a:t>13. Merge Master with </a:t>
             </a:r>
             <a:r>
               <a:rPr lang="en-GB" sz="1400" dirty="0" err="1"/>
@@ -14173,7 +14173,7 @@
           <a:p>
             <a:r>
               <a:rPr lang="en-GB" sz="1400" dirty="0"/>
-              <a:t>15. Push these changes, from both branches, to the remote repo</a:t>
+              <a:t>14. Push these changes, from both branches, to the remote repo</a:t>
             </a:r>
           </a:p>
         </p:txBody>
@@ -14208,7 +14208,7 @@
           <a:p>
             <a:r>
               <a:rPr lang="en-GB" sz="1400" dirty="0"/>
-              <a:t>16. Check the changes have been made</a:t>
+              <a:t>15. Check the changes have been made</a:t>
             </a:r>
           </a:p>
         </p:txBody>
@@ -14298,7 +14298,7 @@
             </a:pPr>
             <a:r>
               <a:rPr lang="en-GB" dirty="0"/>
-              <a:t>Use your system, another system and remotes (GitHub). Full history on repositories carried</a:t>
+              <a:t>Use your system (local repository), another system and remotes (GitHub). Full history on repositories carried in the log</a:t>
             </a:r>
           </a:p>
           <a:p>
@@ -15878,7 +15878,7 @@
         </p:blipFill>
         <p:spPr>
           <a:xfrm>
-            <a:off x="3282378" y="3294047"/>
+            <a:off x="3282378" y="3483130"/>
             <a:ext cx="5563376" cy="1914792"/>
           </a:xfrm>
           <a:prstGeom prst="rect">
@@ -15900,7 +15900,7 @@
         </p:nvSpPr>
         <p:spPr>
           <a:xfrm>
-            <a:off x="5372100" y="1288865"/>
+            <a:off x="533227" y="4621158"/>
             <a:ext cx="2250830" cy="523220"/>
           </a:xfrm>
           <a:prstGeom prst="rect">
@@ -15935,7 +15935,7 @@
         </p:nvSpPr>
         <p:spPr>
           <a:xfrm>
-            <a:off x="3212123" y="5230520"/>
+            <a:off x="3282378" y="5497324"/>
             <a:ext cx="2250830" cy="738664"/>
           </a:xfrm>
           <a:prstGeom prst="rect">
@@ -17589,6 +17589,15 @@
 </file>
 
 <file path=customXml/item1.xml><?xml version="1.0" encoding="utf-8"?>
+<?mso-contentType ?>
+<FormTemplates xmlns="http://schemas.microsoft.com/sharepoint/v3/contenttype/forms">
+  <Display>DocumentLibraryForm</Display>
+  <Edit>DocumentLibraryForm</Edit>
+  <New>DocumentLibraryForm</New>
+</FormTemplates>
+</file>
+
+<file path=customXml/item2.xml><?xml version="1.0" encoding="utf-8"?>
 <ct:contentTypeSchema xmlns:ct="http://schemas.microsoft.com/office/2006/metadata/contentType" xmlns:ma="http://schemas.microsoft.com/office/2006/metadata/properties/metaAttributes" ct:_="" ma:_="" ma:contentTypeName="Document" ma:contentTypeID="0x010100308E40E706C7A346904F58642B7D1969" ma:contentTypeVersion="0" ma:contentTypeDescription="Create a new document." ma:contentTypeScope="" ma:versionID="0ea485b46902d4f7e49967f1b2c25a65">
   <xsd:schema xmlns:xsd="http://www.w3.org/2001/XMLSchema" xmlns:xs="http://www.w3.org/2001/XMLSchema" xmlns:p="http://schemas.microsoft.com/office/2006/metadata/properties" targetNamespace="http://schemas.microsoft.com/office/2006/metadata/properties" ma:root="true" ma:fieldsID="90078a0fe6c183ae62661f67b7399e8a">
     <xsd:element name="properties">
@@ -17702,15 +17711,6 @@
 </ct:contentTypeSchema>
 </file>
 
-<file path=customXml/item2.xml><?xml version="1.0" encoding="utf-8"?>
-<?mso-contentType ?>
-<FormTemplates xmlns="http://schemas.microsoft.com/sharepoint/v3/contenttype/forms">
-  <Display>DocumentLibraryForm</Display>
-  <Edit>DocumentLibraryForm</Edit>
-  <New>DocumentLibraryForm</New>
-</FormTemplates>
-</file>
-
 <file path=customXml/item3.xml><?xml version="1.0" encoding="utf-8"?>
 <p:properties xmlns:p="http://schemas.microsoft.com/office/2006/metadata/properties" xmlns:xsi="http://www.w3.org/2001/XMLSchema-instance" xmlns:pc="http://schemas.microsoft.com/office/infopath/2007/PartnerControls">
   <documentManagement/>
@@ -17718,6 +17718,14 @@
 </file>
 
 <file path=customXml/itemProps1.xml><?xml version="1.0" encoding="utf-8"?>
+<ds:datastoreItem xmlns:ds="http://schemas.openxmlformats.org/officeDocument/2006/customXml" ds:itemID="{A6333066-D95F-4DC9-8F45-8431A5C3C76B}">
+  <ds:schemaRefs>
+    <ds:schemaRef ds:uri="http://schemas.microsoft.com/sharepoint/v3/contenttype/forms"/>
+  </ds:schemaRefs>
+</ds:datastoreItem>
+</file>
+
+<file path=customXml/itemProps2.xml><?xml version="1.0" encoding="utf-8"?>
 <ds:datastoreItem xmlns:ds="http://schemas.openxmlformats.org/officeDocument/2006/customXml" ds:itemID="{08DD32EF-F09C-4573-9C23-B48EA7D5886E}">
   <ds:schemaRefs>
     <ds:schemaRef ds:uri="http://schemas.microsoft.com/office/2006/metadata/contentType"/>
@@ -17729,14 +17737,6 @@
     <ds:schemaRef ds:uri="http://purl.org/dc/terms/"/>
     <ds:schemaRef ds:uri="http://schemas.microsoft.com/internal/obd"/>
     <ds:schemaRef ds:uri="http://schemas.microsoft.com/office/infopath/2007/PartnerControls"/>
-  </ds:schemaRefs>
-</ds:datastoreItem>
-</file>
-
-<file path=customXml/itemProps2.xml><?xml version="1.0" encoding="utf-8"?>
-<ds:datastoreItem xmlns:ds="http://schemas.openxmlformats.org/officeDocument/2006/customXml" ds:itemID="{A6333066-D95F-4DC9-8F45-8431A5C3C76B}">
-  <ds:schemaRefs>
-    <ds:schemaRef ds:uri="http://schemas.microsoft.com/sharepoint/v3/contenttype/forms"/>
   </ds:schemaRefs>
 </ds:datastoreItem>
 </file>

</xml_diff>

<commit_message>
Edits after JA comments
</commit_message>
<xml_diff>
--- a/GitIntro.pptx
+++ b/GitIntro.pptx
@@ -158,18 +158,18 @@
   <pc:docChgLst>
     <pc:chgData name="Will Brooks" userId="d4c2b272-852e-451d-80ba-d2f905b38211" providerId="ADAL" clId="{37A0AFB6-F6CA-4F11-9C33-0D7619B1449C}"/>
     <pc:docChg chg="undo custSel addSld delSld modSld">
-      <pc:chgData name="Will Brooks" userId="d4c2b272-852e-451d-80ba-d2f905b38211" providerId="ADAL" clId="{37A0AFB6-F6CA-4F11-9C33-0D7619B1449C}" dt="2022-09-22T12:34:26.649" v="7942" actId="20577"/>
+      <pc:chgData name="Will Brooks" userId="d4c2b272-852e-451d-80ba-d2f905b38211" providerId="ADAL" clId="{37A0AFB6-F6CA-4F11-9C33-0D7619B1449C}" dt="2022-09-26T09:43:49.099" v="8769" actId="208"/>
       <pc:docMkLst>
         <pc:docMk/>
       </pc:docMkLst>
       <pc:sldChg chg="addSp modSp mod">
-        <pc:chgData name="Will Brooks" userId="d4c2b272-852e-451d-80ba-d2f905b38211" providerId="ADAL" clId="{37A0AFB6-F6CA-4F11-9C33-0D7619B1449C}" dt="2022-09-21T13:45:36.674" v="6427"/>
+        <pc:chgData name="Will Brooks" userId="d4c2b272-852e-451d-80ba-d2f905b38211" providerId="ADAL" clId="{37A0AFB6-F6CA-4F11-9C33-0D7619B1449C}" dt="2022-09-26T09:10:00.491" v="8582" actId="20577"/>
         <pc:sldMkLst>
           <pc:docMk/>
           <pc:sldMk cId="3144119947" sldId="263"/>
         </pc:sldMkLst>
         <pc:spChg chg="mod">
-          <ac:chgData name="Will Brooks" userId="d4c2b272-852e-451d-80ba-d2f905b38211" providerId="ADAL" clId="{37A0AFB6-F6CA-4F11-9C33-0D7619B1449C}" dt="2022-09-20T15:32:35.691" v="74" actId="20577"/>
+          <ac:chgData name="Will Brooks" userId="d4c2b272-852e-451d-80ba-d2f905b38211" providerId="ADAL" clId="{37A0AFB6-F6CA-4F11-9C33-0D7619B1449C}" dt="2022-09-26T09:10:00.491" v="8582" actId="20577"/>
           <ac:spMkLst>
             <pc:docMk/>
             <pc:sldMk cId="3144119947" sldId="263"/>
@@ -502,13 +502,13 @@
         </pc:sldMkLst>
       </pc:sldChg>
       <pc:sldChg chg="addSp modSp add del mod">
-        <pc:chgData name="Will Brooks" userId="d4c2b272-852e-451d-80ba-d2f905b38211" providerId="ADAL" clId="{37A0AFB6-F6CA-4F11-9C33-0D7619B1449C}" dt="2022-09-22T12:32:02.898" v="7747" actId="1076"/>
+        <pc:chgData name="Will Brooks" userId="d4c2b272-852e-451d-80ba-d2f905b38211" providerId="ADAL" clId="{37A0AFB6-F6CA-4F11-9C33-0D7619B1449C}" dt="2022-09-26T09:40:09.467" v="8761" actId="20577"/>
         <pc:sldMkLst>
           <pc:docMk/>
           <pc:sldMk cId="3770664684" sldId="316"/>
         </pc:sldMkLst>
         <pc:spChg chg="mod">
-          <ac:chgData name="Will Brooks" userId="d4c2b272-852e-451d-80ba-d2f905b38211" providerId="ADAL" clId="{37A0AFB6-F6CA-4F11-9C33-0D7619B1449C}" dt="2022-09-22T10:34:20.997" v="7729" actId="20577"/>
+          <ac:chgData name="Will Brooks" userId="d4c2b272-852e-451d-80ba-d2f905b38211" providerId="ADAL" clId="{37A0AFB6-F6CA-4F11-9C33-0D7619B1449C}" dt="2022-09-26T09:40:09.467" v="8761" actId="20577"/>
           <ac:spMkLst>
             <pc:docMk/>
             <pc:sldMk cId="3770664684" sldId="316"/>
@@ -524,7 +524,7 @@
           </ac:spMkLst>
         </pc:spChg>
         <pc:picChg chg="add mod">
-          <ac:chgData name="Will Brooks" userId="d4c2b272-852e-451d-80ba-d2f905b38211" providerId="ADAL" clId="{37A0AFB6-F6CA-4F11-9C33-0D7619B1449C}" dt="2022-09-22T12:32:02.898" v="7747" actId="1076"/>
+          <ac:chgData name="Will Brooks" userId="d4c2b272-852e-451d-80ba-d2f905b38211" providerId="ADAL" clId="{37A0AFB6-F6CA-4F11-9C33-0D7619B1449C}" dt="2022-09-26T08:59:36.534" v="8062" actId="14100"/>
           <ac:picMkLst>
             <pc:docMk/>
             <pc:sldMk cId="3770664684" sldId="316"/>
@@ -541,13 +541,13 @@
         </pc:picChg>
       </pc:sldChg>
       <pc:sldChg chg="addSp modSp add mod">
-        <pc:chgData name="Will Brooks" userId="d4c2b272-852e-451d-80ba-d2f905b38211" providerId="ADAL" clId="{37A0AFB6-F6CA-4F11-9C33-0D7619B1449C}" dt="2022-09-21T13:44:42.825" v="6338"/>
+        <pc:chgData name="Will Brooks" userId="d4c2b272-852e-451d-80ba-d2f905b38211" providerId="ADAL" clId="{37A0AFB6-F6CA-4F11-9C33-0D7619B1449C}" dt="2022-09-26T09:43:49.099" v="8769" actId="208"/>
         <pc:sldMkLst>
           <pc:docMk/>
           <pc:sldMk cId="1180572286" sldId="317"/>
         </pc:sldMkLst>
         <pc:spChg chg="mod">
-          <ac:chgData name="Will Brooks" userId="d4c2b272-852e-451d-80ba-d2f905b38211" providerId="ADAL" clId="{37A0AFB6-F6CA-4F11-9C33-0D7619B1449C}" dt="2022-09-21T08:35:45.266" v="2503" actId="5793"/>
+          <ac:chgData name="Will Brooks" userId="d4c2b272-852e-451d-80ba-d2f905b38211" providerId="ADAL" clId="{37A0AFB6-F6CA-4F11-9C33-0D7619B1449C}" dt="2022-09-26T09:43:22.010" v="8765" actId="20577"/>
           <ac:spMkLst>
             <pc:docMk/>
             <pc:sldMk cId="1180572286" sldId="317"/>
@@ -570,6 +570,22 @@
             <ac:picMk id="5" creationId="{829CB498-2C9B-40A0-8968-E56765A79068}"/>
           </ac:picMkLst>
         </pc:picChg>
+        <pc:picChg chg="add mod">
+          <ac:chgData name="Will Brooks" userId="d4c2b272-852e-451d-80ba-d2f905b38211" providerId="ADAL" clId="{37A0AFB6-F6CA-4F11-9C33-0D7619B1449C}" dt="2022-09-26T09:43:28.175" v="8766" actId="1076"/>
+          <ac:picMkLst>
+            <pc:docMk/>
+            <pc:sldMk cId="1180572286" sldId="317"/>
+            <ac:picMk id="7" creationId="{50E69D16-A100-4D48-B741-6A67D65860D7}"/>
+          </ac:picMkLst>
+        </pc:picChg>
+        <pc:cxnChg chg="add mod">
+          <ac:chgData name="Will Brooks" userId="d4c2b272-852e-451d-80ba-d2f905b38211" providerId="ADAL" clId="{37A0AFB6-F6CA-4F11-9C33-0D7619B1449C}" dt="2022-09-26T09:43:49.099" v="8769" actId="208"/>
+          <ac:cxnSpMkLst>
+            <pc:docMk/>
+            <pc:sldMk cId="1180572286" sldId="317"/>
+            <ac:cxnSpMk id="9" creationId="{10304ADC-1890-4C4C-81E4-0A128772DE0F}"/>
+          </ac:cxnSpMkLst>
+        </pc:cxnChg>
       </pc:sldChg>
       <pc:sldChg chg="addSp modSp add mod">
         <pc:chgData name="Will Brooks" userId="d4c2b272-852e-451d-80ba-d2f905b38211" providerId="ADAL" clId="{37A0AFB6-F6CA-4F11-9C33-0D7619B1449C}" dt="2022-09-21T14:55:45.288" v="6518" actId="114"/>
@@ -1106,7 +1122,7 @@
           <a:p>
             <a:fld id="{1790A331-7ADD-4391-8CA5-606C9BFD26F5}" type="datetimeFigureOut">
               <a:rPr lang="en-GB" smtClean="0"/>
-              <a:t>22/09/2022</a:t>
+              <a:t>26/09/2022</a:t>
             </a:fld>
             <a:endParaRPr lang="en-GB" dirty="0"/>
           </a:p>
@@ -1275,7 +1291,7 @@
           <a:p>
             <a:fld id="{002AE991-F138-4FD8-982E-957F3CA6A0F6}" type="datetimeFigureOut">
               <a:rPr lang="en-GB" smtClean="0"/>
-              <a:t>22/09/2022</a:t>
+              <a:t>26/09/2022</a:t>
             </a:fld>
             <a:endParaRPr lang="en-GB" dirty="0"/>
           </a:p>
@@ -13482,8 +13498,13 @@
           <a:p>
             <a:r>
               <a:rPr lang="en-GB" dirty="0"/>
-              <a:t>Introduction to GitHub</a:t>
-            </a:r>
+              <a:t>Introduction to GitHub and </a:t>
+            </a:r>
+            <a:r>
+              <a:rPr lang="en-GB" dirty="0" err="1"/>
+              <a:t>GitBash</a:t>
+            </a:r>
+            <a:endParaRPr lang="en-GB" dirty="0"/>
           </a:p>
         </p:txBody>
       </p:sp>
@@ -14274,6 +14295,12 @@
           <a:p>
             <a:r>
               <a:rPr lang="en-GB" dirty="0"/>
+              <a:t>Git was designed and developed in 2005 on the Linux kernel, which is know for being free, open source, multitasking and distributed. It shares these qualities with Git</a:t>
+            </a:r>
+          </a:p>
+          <a:p>
+            <a:r>
+              <a:rPr lang="en-GB" dirty="0"/>
               <a:t>Git is an open-source, distributed, Version Control System</a:t>
             </a:r>
           </a:p>
@@ -14284,19 +14311,7 @@
             </a:pPr>
             <a:r>
               <a:rPr lang="en-GB" dirty="0"/>
-              <a:t>Version Control -&gt; Tracking changes, contributions from multiple users</a:t>
-            </a:r>
-          </a:p>
-          <a:p>
-            <a:pPr marL="457200" lvl="1" indent="0">
-              <a:buNone/>
-            </a:pPr>
-            <a:endParaRPr lang="en-GB" dirty="0"/>
-          </a:p>
-          <a:p>
-            <a:r>
-              <a:rPr lang="en-GB" dirty="0"/>
-              <a:t>Distributed </a:t>
+              <a:t>Seamlessly tracking changes and versions, branches allow versions to be stored without clutter</a:t>
             </a:r>
           </a:p>
           <a:p>
@@ -14306,7 +14321,7 @@
             </a:pPr>
             <a:r>
               <a:rPr lang="en-GB" dirty="0"/>
-              <a:t>Use your system (local repository), another system and remotes (GitHub). Full history on repositories carried in the log</a:t>
+              <a:t>Contributions from multiple users, pulling content from and pushing content to the shared remote repository</a:t>
             </a:r>
           </a:p>
           <a:p>
@@ -14318,7 +14333,7 @@
           <a:p>
             <a:r>
               <a:rPr lang="en-GB" dirty="0"/>
-              <a:t>Open Source </a:t>
+              <a:t>Distributed </a:t>
             </a:r>
           </a:p>
           <a:p>
@@ -14328,17 +14343,7 @@
             </a:pPr>
             <a:r>
               <a:rPr lang="en-GB" dirty="0"/>
-              <a:t>Source code can be inspected by anyone</a:t>
-            </a:r>
-          </a:p>
-          <a:p>
-            <a:pPr lvl="1">
-              <a:buFont typeface="Courier New" panose="02070309020205020404" pitchFamily="49" charset="0"/>
-              <a:buChar char="o"/>
-            </a:pPr>
-            <a:r>
-              <a:rPr lang="en-GB" dirty="0"/>
-              <a:t>Used for scripts, not data</a:t>
+              <a:t>Use your system (local repository) and remotes (GitHub). </a:t>
             </a:r>
           </a:p>
           <a:p>
@@ -14351,13 +14356,8 @@
           <a:p>
             <a:r>
               <a:rPr lang="en-GB" dirty="0"/>
-              <a:t>GitHub and </a:t>
-            </a:r>
-            <a:r>
-              <a:rPr lang="en-GB" dirty="0" err="1"/>
-              <a:t>GitBash</a:t>
-            </a:r>
-            <a:endParaRPr lang="en-GB" dirty="0"/>
+              <a:t>Open Source </a:t>
+            </a:r>
           </a:p>
           <a:p>
             <a:pPr lvl="1">
@@ -14366,7 +14366,7 @@
             </a:pPr>
             <a:r>
               <a:rPr lang="en-GB" dirty="0"/>
-              <a:t>GitHub is an online repository which acts as your remote. This is accessible across teams, and can be duplicated into a ‘local’ folder, which acts as a personal repository</a:t>
+              <a:t>Source code can be inspected by anyone on the remote (GitHub)</a:t>
             </a:r>
           </a:p>
           <a:p>
@@ -14376,24 +14376,19 @@
             </a:pPr>
             <a:r>
               <a:rPr lang="en-GB" dirty="0"/>
-              <a:t>Git Bash on UDAL – Local repository, linked to GitHub via </a:t>
-            </a:r>
-            <a:r>
-              <a:rPr lang="en-GB" i="1" dirty="0"/>
-              <a:t>push</a:t>
-            </a:r>
+              <a:t>Would have implications for what Git can be used for (Non-sensitive)</a:t>
+            </a:r>
+          </a:p>
+          <a:p>
             <a:r>
               <a:rPr lang="en-GB" dirty="0"/>
-              <a:t> commands, can </a:t>
-            </a:r>
-            <a:r>
-              <a:rPr lang="en-GB" i="1" dirty="0"/>
-              <a:t>pull</a:t>
-            </a:r>
-            <a:r>
-              <a:rPr lang="en-GB" dirty="0"/>
-              <a:t> from ‘remote’. Makes changes accessible to all working in a repository</a:t>
-            </a:r>
+              <a:t>GitHub and </a:t>
+            </a:r>
+            <a:r>
+              <a:rPr lang="en-GB" dirty="0" err="1"/>
+              <a:t>GitBash</a:t>
+            </a:r>
+            <a:endParaRPr lang="en-GB" dirty="0"/>
           </a:p>
           <a:p>
             <a:pPr lvl="1">
@@ -14402,8 +14397,50 @@
             </a:pPr>
             <a:r>
               <a:rPr lang="en-GB" dirty="0"/>
-              <a:t>Strong admin and team management</a:t>
-            </a:r>
+              <a:t>GitHub is an online repository which acts as your remote. This is accessible across teams, and can be duplicated into a ‘local’ folder, which acts as a personal repository</a:t>
+            </a:r>
+          </a:p>
+          <a:p>
+            <a:pPr lvl="1">
+              <a:buFont typeface="Courier New" panose="02070309020205020404" pitchFamily="49" charset="0"/>
+              <a:buChar char="o"/>
+            </a:pPr>
+            <a:r>
+              <a:rPr lang="en-GB" dirty="0"/>
+              <a:t>Git Bash on UDAL – Local repository, linked to GitHub via </a:t>
+            </a:r>
+            <a:r>
+              <a:rPr lang="en-GB" i="1" dirty="0"/>
+              <a:t>push</a:t>
+            </a:r>
+            <a:r>
+              <a:rPr lang="en-GB" dirty="0"/>
+              <a:t> commands, can </a:t>
+            </a:r>
+            <a:r>
+              <a:rPr lang="en-GB" i="1" dirty="0"/>
+              <a:t>pull</a:t>
+            </a:r>
+            <a:r>
+              <a:rPr lang="en-GB" dirty="0"/>
+              <a:t> from ‘remote’. Makes changes accessible to all working in a remote repository</a:t>
+            </a:r>
+          </a:p>
+          <a:p>
+            <a:pPr lvl="1">
+              <a:buFont typeface="Courier New" panose="02070309020205020404" pitchFamily="49" charset="0"/>
+              <a:buChar char="o"/>
+            </a:pPr>
+            <a:r>
+              <a:rPr lang="en-GB" dirty="0"/>
+              <a:t>Strong admin and team management, members can leave comments on issues</a:t>
+            </a:r>
+          </a:p>
+          <a:p>
+            <a:pPr marL="914400" lvl="2" indent="0">
+              <a:buNone/>
+            </a:pPr>
+            <a:endParaRPr lang="en-GB" dirty="0"/>
           </a:p>
         </p:txBody>
       </p:sp>
@@ -14540,8 +14577,8 @@
         </p:blipFill>
         <p:spPr bwMode="auto">
           <a:xfrm>
-            <a:off x="6089592" y="2650327"/>
-            <a:ext cx="2498203" cy="1875210"/>
+            <a:off x="6582839" y="2639007"/>
+            <a:ext cx="2329204" cy="1748355"/>
           </a:xfrm>
           <a:prstGeom prst="rect">
             <a:avLst/>
@@ -14609,6 +14646,9 @@
           <a:bodyPr/>
           <a:lstStyle/>
           <a:p>
+            <a:endParaRPr lang="en-GB" dirty="0"/>
+          </a:p>
+          <a:p>
             <a:r>
               <a:rPr lang="en-GB" dirty="0"/>
               <a:t>Choose a repository -&gt; A local folder in which you are going to work</a:t>
@@ -14900,6 +14940,80 @@
           </a:extLst>
         </p:spPr>
       </p:pic>
+      <p:pic>
+        <p:nvPicPr>
+          <p:cNvPr id="7" name="Picture 6">
+            <a:extLst>
+              <a:ext uri="{FF2B5EF4-FFF2-40B4-BE49-F238E27FC236}">
+                <a16:creationId xmlns:a16="http://schemas.microsoft.com/office/drawing/2014/main" id="{50E69D16-A100-4D48-B741-6A67D65860D7}"/>
+              </a:ext>
+            </a:extLst>
+          </p:cNvPr>
+          <p:cNvPicPr>
+            <a:picLocks noChangeAspect="1"/>
+          </p:cNvPicPr>
+          <p:nvPr/>
+        </p:nvPicPr>
+        <p:blipFill>
+          <a:blip r:embed="rId4"/>
+          <a:stretch>
+            <a:fillRect/>
+          </a:stretch>
+        </p:blipFill>
+        <p:spPr>
+          <a:xfrm>
+            <a:off x="6152078" y="760845"/>
+            <a:ext cx="1634462" cy="1625305"/>
+          </a:xfrm>
+          <a:prstGeom prst="rect">
+            <a:avLst/>
+          </a:prstGeom>
+        </p:spPr>
+      </p:pic>
+      <p:cxnSp>
+        <p:nvCxnSpPr>
+          <p:cNvPr id="9" name="Straight Arrow Connector 8">
+            <a:extLst>
+              <a:ext uri="{FF2B5EF4-FFF2-40B4-BE49-F238E27FC236}">
+                <a16:creationId xmlns:a16="http://schemas.microsoft.com/office/drawing/2014/main" id="{10304ADC-1890-4C4C-81E4-0A128772DE0F}"/>
+              </a:ext>
+            </a:extLst>
+          </p:cNvPr>
+          <p:cNvCxnSpPr>
+            <a:cxnSpLocks/>
+          </p:cNvCxnSpPr>
+          <p:nvPr/>
+        </p:nvCxnSpPr>
+        <p:spPr>
+          <a:xfrm flipV="1">
+            <a:off x="3214540" y="1894788"/>
+            <a:ext cx="3318235" cy="160255"/>
+          </a:xfrm>
+          <a:prstGeom prst="straightConnector1">
+            <a:avLst/>
+          </a:prstGeom>
+          <a:ln>
+            <a:solidFill>
+              <a:schemeClr val="tx1"/>
+            </a:solidFill>
+            <a:tailEnd type="triangle"/>
+          </a:ln>
+        </p:spPr>
+        <p:style>
+          <a:lnRef idx="1">
+            <a:schemeClr val="accent1"/>
+          </a:lnRef>
+          <a:fillRef idx="0">
+            <a:schemeClr val="accent1"/>
+          </a:fillRef>
+          <a:effectRef idx="0">
+            <a:schemeClr val="accent1"/>
+          </a:effectRef>
+          <a:fontRef idx="minor">
+            <a:schemeClr val="tx1"/>
+          </a:fontRef>
+        </p:style>
+      </p:cxnSp>
     </p:spTree>
     <p:extLst>
       <p:ext uri="{BB962C8B-B14F-4D97-AF65-F5344CB8AC3E}">
@@ -17654,6 +17768,15 @@
 </file>
 
 <file path=customXml/item1.xml><?xml version="1.0" encoding="utf-8"?>
+<?mso-contentType ?>
+<FormTemplates xmlns="http://schemas.microsoft.com/sharepoint/v3/contenttype/forms">
+  <Display>DocumentLibraryForm</Display>
+  <Edit>DocumentLibraryForm</Edit>
+  <New>DocumentLibraryForm</New>
+</FormTemplates>
+</file>
+
+<file path=customXml/item2.xml><?xml version="1.0" encoding="utf-8"?>
 <ct:contentTypeSchema xmlns:ct="http://schemas.microsoft.com/office/2006/metadata/contentType" xmlns:ma="http://schemas.microsoft.com/office/2006/metadata/properties/metaAttributes" ct:_="" ma:_="" ma:contentTypeName="Document" ma:contentTypeID="0x010100308E40E706C7A346904F58642B7D1969" ma:contentTypeVersion="0" ma:contentTypeDescription="Create a new document." ma:contentTypeScope="" ma:versionID="0ea485b46902d4f7e49967f1b2c25a65">
   <xsd:schema xmlns:xsd="http://www.w3.org/2001/XMLSchema" xmlns:xs="http://www.w3.org/2001/XMLSchema" xmlns:p="http://schemas.microsoft.com/office/2006/metadata/properties" targetNamespace="http://schemas.microsoft.com/office/2006/metadata/properties" ma:root="true" ma:fieldsID="90078a0fe6c183ae62661f67b7399e8a">
     <xsd:element name="properties">
@@ -17767,15 +17890,6 @@
 </ct:contentTypeSchema>
 </file>
 
-<file path=customXml/item2.xml><?xml version="1.0" encoding="utf-8"?>
-<?mso-contentType ?>
-<FormTemplates xmlns="http://schemas.microsoft.com/sharepoint/v3/contenttype/forms">
-  <Display>DocumentLibraryForm</Display>
-  <Edit>DocumentLibraryForm</Edit>
-  <New>DocumentLibraryForm</New>
-</FormTemplates>
-</file>
-
 <file path=customXml/item3.xml><?xml version="1.0" encoding="utf-8"?>
 <p:properties xmlns:p="http://schemas.microsoft.com/office/2006/metadata/properties" xmlns:xsi="http://www.w3.org/2001/XMLSchema-instance" xmlns:pc="http://schemas.microsoft.com/office/infopath/2007/PartnerControls">
   <documentManagement/>
@@ -17783,6 +17897,14 @@
 </file>
 
 <file path=customXml/itemProps1.xml><?xml version="1.0" encoding="utf-8"?>
+<ds:datastoreItem xmlns:ds="http://schemas.openxmlformats.org/officeDocument/2006/customXml" ds:itemID="{A6333066-D95F-4DC9-8F45-8431A5C3C76B}">
+  <ds:schemaRefs>
+    <ds:schemaRef ds:uri="http://schemas.microsoft.com/sharepoint/v3/contenttype/forms"/>
+  </ds:schemaRefs>
+</ds:datastoreItem>
+</file>
+
+<file path=customXml/itemProps2.xml><?xml version="1.0" encoding="utf-8"?>
 <ds:datastoreItem xmlns:ds="http://schemas.openxmlformats.org/officeDocument/2006/customXml" ds:itemID="{08DD32EF-F09C-4573-9C23-B48EA7D5886E}">
   <ds:schemaRefs>
     <ds:schemaRef ds:uri="http://schemas.microsoft.com/office/2006/metadata/contentType"/>
@@ -17794,14 +17916,6 @@
     <ds:schemaRef ds:uri="http://purl.org/dc/terms/"/>
     <ds:schemaRef ds:uri="http://schemas.microsoft.com/internal/obd"/>
     <ds:schemaRef ds:uri="http://schemas.microsoft.com/office/infopath/2007/PartnerControls"/>
-  </ds:schemaRefs>
-</ds:datastoreItem>
-</file>
-
-<file path=customXml/itemProps2.xml><?xml version="1.0" encoding="utf-8"?>
-<ds:datastoreItem xmlns:ds="http://schemas.openxmlformats.org/officeDocument/2006/customXml" ds:itemID="{A6333066-D95F-4DC9-8F45-8431A5C3C76B}">
-  <ds:schemaRefs>
-    <ds:schemaRef ds:uri="http://schemas.microsoft.com/sharepoint/v3/contenttype/forms"/>
   </ds:schemaRefs>
 </ds:datastoreItem>
 </file>

</xml_diff>

<commit_message>
update to ppt before merge
</commit_message>
<xml_diff>
--- a/GitIntro.pptx
+++ b/GitIntro.pptx
@@ -5,23 +5,24 @@
     <p:sldMasterId id="2147483660" r:id="rId4"/>
   </p:sldMasterIdLst>
   <p:notesMasterIdLst>
-    <p:notesMasterId r:id="rId16"/>
+    <p:notesMasterId r:id="rId17"/>
   </p:notesMasterIdLst>
   <p:handoutMasterIdLst>
-    <p:handoutMasterId r:id="rId17"/>
+    <p:handoutMasterId r:id="rId18"/>
   </p:handoutMasterIdLst>
   <p:sldIdLst>
     <p:sldId id="263" r:id="rId5"/>
     <p:sldId id="316" r:id="rId6"/>
     <p:sldId id="317" r:id="rId7"/>
-    <p:sldId id="319" r:id="rId8"/>
-    <p:sldId id="320" r:id="rId9"/>
-    <p:sldId id="318" r:id="rId10"/>
-    <p:sldId id="321" r:id="rId11"/>
-    <p:sldId id="322" r:id="rId12"/>
-    <p:sldId id="323" r:id="rId13"/>
-    <p:sldId id="324" r:id="rId14"/>
-    <p:sldId id="325" r:id="rId15"/>
+    <p:sldId id="326" r:id="rId8"/>
+    <p:sldId id="319" r:id="rId9"/>
+    <p:sldId id="320" r:id="rId10"/>
+    <p:sldId id="318" r:id="rId11"/>
+    <p:sldId id="321" r:id="rId12"/>
+    <p:sldId id="322" r:id="rId13"/>
+    <p:sldId id="323" r:id="rId14"/>
+    <p:sldId id="324" r:id="rId15"/>
+    <p:sldId id="325" r:id="rId16"/>
   </p:sldIdLst>
   <p:sldSz cx="9144000" cy="6858000" type="screen4x3"/>
   <p:notesSz cx="6858000" cy="9144000"/>
@@ -158,7 +159,7 @@
   <pc:docChgLst>
     <pc:chgData name="Will Brooks" userId="d4c2b272-852e-451d-80ba-d2f905b38211" providerId="ADAL" clId="{37A0AFB6-F6CA-4F11-9C33-0D7619B1449C}"/>
     <pc:docChg chg="undo custSel addSld delSld modSld">
-      <pc:chgData name="Will Brooks" userId="d4c2b272-852e-451d-80ba-d2f905b38211" providerId="ADAL" clId="{37A0AFB6-F6CA-4F11-9C33-0D7619B1449C}" dt="2022-09-26T09:43:49.099" v="8769" actId="208"/>
+      <pc:chgData name="Will Brooks" userId="d4c2b272-852e-451d-80ba-d2f905b38211" providerId="ADAL" clId="{37A0AFB6-F6CA-4F11-9C33-0D7619B1449C}" dt="2022-09-27T08:15:49.708" v="9506" actId="20577"/>
       <pc:docMkLst>
         <pc:docMk/>
       </pc:docMkLst>
@@ -1035,6 +1036,29 @@
           </ac:picMkLst>
         </pc:picChg>
       </pc:sldChg>
+      <pc:sldChg chg="modSp new mod">
+        <pc:chgData name="Will Brooks" userId="d4c2b272-852e-451d-80ba-d2f905b38211" providerId="ADAL" clId="{37A0AFB6-F6CA-4F11-9C33-0D7619B1449C}" dt="2022-09-27T08:15:49.708" v="9506" actId="20577"/>
+        <pc:sldMkLst>
+          <pc:docMk/>
+          <pc:sldMk cId="4151486386" sldId="326"/>
+        </pc:sldMkLst>
+        <pc:spChg chg="mod">
+          <ac:chgData name="Will Brooks" userId="d4c2b272-852e-451d-80ba-d2f905b38211" providerId="ADAL" clId="{37A0AFB6-F6CA-4F11-9C33-0D7619B1449C}" dt="2022-09-27T08:15:49.708" v="9506" actId="20577"/>
+          <ac:spMkLst>
+            <pc:docMk/>
+            <pc:sldMk cId="4151486386" sldId="326"/>
+            <ac:spMk id="2" creationId="{262F1CBE-38D5-4BDE-9901-1B6C36F76960}"/>
+          </ac:spMkLst>
+        </pc:spChg>
+        <pc:spChg chg="mod">
+          <ac:chgData name="Will Brooks" userId="d4c2b272-852e-451d-80ba-d2f905b38211" providerId="ADAL" clId="{37A0AFB6-F6CA-4F11-9C33-0D7619B1449C}" dt="2022-09-27T08:03:34.171" v="8832" actId="20577"/>
+          <ac:spMkLst>
+            <pc:docMk/>
+            <pc:sldMk cId="4151486386" sldId="326"/>
+            <ac:spMk id="4" creationId="{12FFB6D8-3053-4E55-BAE8-AFCC0592C8E7}"/>
+          </ac:spMkLst>
+        </pc:spChg>
+      </pc:sldChg>
     </pc:docChg>
   </pc:docChgLst>
 </pc:chgInfo>
@@ -1122,7 +1146,7 @@
           <a:p>
             <a:fld id="{1790A331-7ADD-4391-8CA5-606C9BFD26F5}" type="datetimeFigureOut">
               <a:rPr lang="en-GB" smtClean="0"/>
-              <a:t>26/09/2022</a:t>
+              <a:t>27/09/2022</a:t>
             </a:fld>
             <a:endParaRPr lang="en-GB" dirty="0"/>
           </a:p>
@@ -1291,7 +1315,7 @@
           <a:p>
             <a:fld id="{002AE991-F138-4FD8-982E-957F3CA6A0F6}" type="datetimeFigureOut">
               <a:rPr lang="en-GB" smtClean="0"/>
-              <a:t>26/09/2022</a:t>
+              <a:t>27/09/2022</a:t>
             </a:fld>
             <a:endParaRPr lang="en-GB" dirty="0"/>
           </a:p>
@@ -1758,7 +1782,7 @@
           <a:p>
             <a:fld id="{7890AB7D-FC04-41BF-88F7-E47891A06283}" type="slidenum">
               <a:rPr lang="en-GB" smtClean="0"/>
-              <a:t>11</a:t>
+              <a:t>12</a:t>
             </a:fld>
             <a:endParaRPr lang="en-GB" dirty="0"/>
           </a:p>
@@ -1972,7 +1996,7 @@
           <a:p>
             <a:fld id="{7890AB7D-FC04-41BF-88F7-E47891A06283}" type="slidenum">
               <a:rPr lang="en-GB" smtClean="0"/>
-              <a:t>4</a:t>
+              <a:t>5</a:t>
             </a:fld>
             <a:endParaRPr lang="en-GB" dirty="0"/>
           </a:p>
@@ -2079,7 +2103,7 @@
           <a:p>
             <a:fld id="{7890AB7D-FC04-41BF-88F7-E47891A06283}" type="slidenum">
               <a:rPr lang="en-GB" smtClean="0"/>
-              <a:t>5</a:t>
+              <a:t>6</a:t>
             </a:fld>
             <a:endParaRPr lang="en-GB" dirty="0"/>
           </a:p>
@@ -2186,7 +2210,7 @@
           <a:p>
             <a:fld id="{7890AB7D-FC04-41BF-88F7-E47891A06283}" type="slidenum">
               <a:rPr lang="en-GB" smtClean="0"/>
-              <a:t>6</a:t>
+              <a:t>7</a:t>
             </a:fld>
             <a:endParaRPr lang="en-GB" dirty="0"/>
           </a:p>
@@ -2293,7 +2317,7 @@
           <a:p>
             <a:fld id="{7890AB7D-FC04-41BF-88F7-E47891A06283}" type="slidenum">
               <a:rPr lang="en-GB" smtClean="0"/>
-              <a:t>7</a:t>
+              <a:t>8</a:t>
             </a:fld>
             <a:endParaRPr lang="en-GB" dirty="0"/>
           </a:p>
@@ -2400,7 +2424,7 @@
           <a:p>
             <a:fld id="{7890AB7D-FC04-41BF-88F7-E47891A06283}" type="slidenum">
               <a:rPr lang="en-GB" smtClean="0"/>
-              <a:t>8</a:t>
+              <a:t>9</a:t>
             </a:fld>
             <a:endParaRPr lang="en-GB" dirty="0"/>
           </a:p>
@@ -2507,7 +2531,7 @@
           <a:p>
             <a:fld id="{7890AB7D-FC04-41BF-88F7-E47891A06283}" type="slidenum">
               <a:rPr lang="en-GB" smtClean="0"/>
-              <a:t>9</a:t>
+              <a:t>10</a:t>
             </a:fld>
             <a:endParaRPr lang="en-GB" dirty="0"/>
           </a:p>
@@ -2614,7 +2638,7 @@
           <a:p>
             <a:fld id="{7890AB7D-FC04-41BF-88F7-E47891A06283}" type="slidenum">
               <a:rPr lang="en-GB" smtClean="0"/>
-              <a:t>10</a:t>
+              <a:t>11</a:t>
             </a:fld>
             <a:endParaRPr lang="en-GB" dirty="0"/>
           </a:p>
@@ -13711,6 +13735,335 @@
           <a:p>
             <a:r>
               <a:rPr lang="en-GB" dirty="0"/>
+              <a:t>Visual Run: Creating Branches</a:t>
+            </a:r>
+          </a:p>
+        </p:txBody>
+      </p:sp>
+      <p:pic>
+        <p:nvPicPr>
+          <p:cNvPr id="6" name="Picture 5">
+            <a:extLst>
+              <a:ext uri="{FF2B5EF4-FFF2-40B4-BE49-F238E27FC236}">
+                <a16:creationId xmlns:a16="http://schemas.microsoft.com/office/drawing/2014/main" id="{F7EA2DAB-6838-47F9-8C37-D66B5970B4A0}"/>
+              </a:ext>
+            </a:extLst>
+          </p:cNvPr>
+          <p:cNvPicPr>
+            <a:picLocks noChangeAspect="1"/>
+          </p:cNvPicPr>
+          <p:nvPr/>
+        </p:nvPicPr>
+        <p:blipFill>
+          <a:blip r:embed="rId4"/>
+          <a:stretch>
+            <a:fillRect/>
+          </a:stretch>
+        </p:blipFill>
+        <p:spPr>
+          <a:xfrm>
+            <a:off x="188976" y="1050282"/>
+            <a:ext cx="6449325" cy="466790"/>
+          </a:xfrm>
+          <a:prstGeom prst="rect">
+            <a:avLst/>
+          </a:prstGeom>
+        </p:spPr>
+      </p:pic>
+      <p:pic>
+        <p:nvPicPr>
+          <p:cNvPr id="8" name="Picture 7">
+            <a:extLst>
+              <a:ext uri="{FF2B5EF4-FFF2-40B4-BE49-F238E27FC236}">
+                <a16:creationId xmlns:a16="http://schemas.microsoft.com/office/drawing/2014/main" id="{2B786FDD-9868-44C0-A890-CA9AFF167533}"/>
+              </a:ext>
+            </a:extLst>
+          </p:cNvPr>
+          <p:cNvPicPr>
+            <a:picLocks noChangeAspect="1"/>
+          </p:cNvPicPr>
+          <p:nvPr/>
+        </p:nvPicPr>
+        <p:blipFill>
+          <a:blip r:embed="rId5"/>
+          <a:stretch>
+            <a:fillRect/>
+          </a:stretch>
+        </p:blipFill>
+        <p:spPr>
+          <a:xfrm>
+            <a:off x="188976" y="1626204"/>
+            <a:ext cx="2174485" cy="1983971"/>
+          </a:xfrm>
+          <a:prstGeom prst="rect">
+            <a:avLst/>
+          </a:prstGeom>
+        </p:spPr>
+      </p:pic>
+      <p:pic>
+        <p:nvPicPr>
+          <p:cNvPr id="10" name="Picture 9">
+            <a:extLst>
+              <a:ext uri="{FF2B5EF4-FFF2-40B4-BE49-F238E27FC236}">
+                <a16:creationId xmlns:a16="http://schemas.microsoft.com/office/drawing/2014/main" id="{EA2BE417-1870-4DEC-B25E-857EC7903C7D}"/>
+              </a:ext>
+            </a:extLst>
+          </p:cNvPr>
+          <p:cNvPicPr>
+            <a:picLocks noChangeAspect="1"/>
+          </p:cNvPicPr>
+          <p:nvPr/>
+        </p:nvPicPr>
+        <p:blipFill>
+          <a:blip r:embed="rId6"/>
+          <a:stretch>
+            <a:fillRect/>
+          </a:stretch>
+        </p:blipFill>
+        <p:spPr>
+          <a:xfrm>
+            <a:off x="188976" y="3719307"/>
+            <a:ext cx="6449325" cy="2400635"/>
+          </a:xfrm>
+          <a:prstGeom prst="rect">
+            <a:avLst/>
+          </a:prstGeom>
+        </p:spPr>
+      </p:pic>
+      <p:sp>
+        <p:nvSpPr>
+          <p:cNvPr id="9" name="TextBox 8">
+            <a:extLst>
+              <a:ext uri="{FF2B5EF4-FFF2-40B4-BE49-F238E27FC236}">
+                <a16:creationId xmlns:a16="http://schemas.microsoft.com/office/drawing/2014/main" id="{EB6E1195-F03C-4D26-B8CC-E97C1D419112}"/>
+              </a:ext>
+            </a:extLst>
+          </p:cNvPr>
+          <p:cNvSpPr txBox="1"/>
+          <p:nvPr/>
+        </p:nvSpPr>
+        <p:spPr>
+          <a:xfrm>
+            <a:off x="6638301" y="1036561"/>
+            <a:ext cx="2422984" cy="523220"/>
+          </a:xfrm>
+          <a:prstGeom prst="rect">
+            <a:avLst/>
+          </a:prstGeom>
+          <a:noFill/>
+        </p:spPr>
+        <p:txBody>
+          <a:bodyPr wrap="square" rtlCol="0">
+            <a:spAutoFit/>
+          </a:bodyPr>
+          <a:lstStyle/>
+          <a:p>
+            <a:r>
+              <a:rPr lang="en-GB" sz="1400" dirty="0"/>
+              <a:t>8. Create and move to new branch</a:t>
+            </a:r>
+          </a:p>
+        </p:txBody>
+      </p:sp>
+      <p:sp>
+        <p:nvSpPr>
+          <p:cNvPr id="11" name="TextBox 10">
+            <a:extLst>
+              <a:ext uri="{FF2B5EF4-FFF2-40B4-BE49-F238E27FC236}">
+                <a16:creationId xmlns:a16="http://schemas.microsoft.com/office/drawing/2014/main" id="{32F1990D-C26F-4050-957A-3FF8640573A8}"/>
+              </a:ext>
+            </a:extLst>
+          </p:cNvPr>
+          <p:cNvSpPr txBox="1"/>
+          <p:nvPr/>
+        </p:nvSpPr>
+        <p:spPr>
+          <a:xfrm>
+            <a:off x="3168269" y="2356579"/>
+            <a:ext cx="3587761" cy="307777"/>
+          </a:xfrm>
+          <a:prstGeom prst="rect">
+            <a:avLst/>
+          </a:prstGeom>
+          <a:noFill/>
+        </p:spPr>
+        <p:txBody>
+          <a:bodyPr wrap="square" rtlCol="0">
+            <a:spAutoFit/>
+          </a:bodyPr>
+          <a:lstStyle/>
+          <a:p>
+            <a:r>
+              <a:rPr lang="en-GB" sz="1400" dirty="0"/>
+              <a:t>9. Edit file within the new branch and save</a:t>
+            </a:r>
+          </a:p>
+        </p:txBody>
+      </p:sp>
+      <p:sp>
+        <p:nvSpPr>
+          <p:cNvPr id="12" name="TextBox 11">
+            <a:extLst>
+              <a:ext uri="{FF2B5EF4-FFF2-40B4-BE49-F238E27FC236}">
+                <a16:creationId xmlns:a16="http://schemas.microsoft.com/office/drawing/2014/main" id="{10CE4C5C-EDFB-4AC2-909C-75EF358030A5}"/>
+              </a:ext>
+            </a:extLst>
+          </p:cNvPr>
+          <p:cNvSpPr txBox="1"/>
+          <p:nvPr/>
+        </p:nvSpPr>
+        <p:spPr>
+          <a:xfrm>
+            <a:off x="6638301" y="4660971"/>
+            <a:ext cx="2422984" cy="738664"/>
+          </a:xfrm>
+          <a:prstGeom prst="rect">
+            <a:avLst/>
+          </a:prstGeom>
+          <a:noFill/>
+        </p:spPr>
+        <p:txBody>
+          <a:bodyPr wrap="square" rtlCol="0">
+            <a:spAutoFit/>
+          </a:bodyPr>
+          <a:lstStyle/>
+          <a:p>
+            <a:r>
+              <a:rPr lang="en-GB" sz="1400" dirty="0"/>
+              <a:t>10. Check status, add changes and commit with message</a:t>
+            </a:r>
+          </a:p>
+        </p:txBody>
+      </p:sp>
+    </p:spTree>
+    <p:extLst>
+      <p:ext uri="{BB962C8B-B14F-4D97-AF65-F5344CB8AC3E}">
+        <p14:creationId xmlns:p14="http://schemas.microsoft.com/office/powerpoint/2010/main" val="98407624"/>
+      </p:ext>
+    </p:extLst>
+  </p:cSld>
+  <p:clrMapOvr>
+    <a:masterClrMapping/>
+  </p:clrMapOvr>
+</p:sld>
+</file>
+
+<file path=ppt/slides/slide11.xml><?xml version="1.0" encoding="utf-8"?>
+<p:sld xmlns:a="http://schemas.openxmlformats.org/drawingml/2006/main" xmlns:r="http://schemas.openxmlformats.org/officeDocument/2006/relationships" xmlns:p="http://schemas.openxmlformats.org/presentationml/2006/main">
+  <p:cSld>
+    <p:spTree>
+      <p:nvGrpSpPr>
+        <p:cNvPr id="1" name=""/>
+        <p:cNvGrpSpPr/>
+        <p:nvPr/>
+      </p:nvGrpSpPr>
+      <p:grpSpPr>
+        <a:xfrm>
+          <a:off x="0" y="0"/>
+          <a:ext cx="0" cy="0"/>
+          <a:chOff x="0" y="0"/>
+          <a:chExt cx="0" cy="0"/>
+        </a:xfrm>
+      </p:grpSpPr>
+      <p:pic>
+        <p:nvPicPr>
+          <p:cNvPr id="5" name="Picture 2" descr="See the source image">
+            <a:extLst>
+              <a:ext uri="{FF2B5EF4-FFF2-40B4-BE49-F238E27FC236}">
+                <a16:creationId xmlns:a16="http://schemas.microsoft.com/office/drawing/2014/main" id="{0ED5EA98-2928-4140-96E4-BCECB454AD2D}"/>
+              </a:ext>
+            </a:extLst>
+          </p:cNvPr>
+          <p:cNvPicPr>
+            <a:picLocks noChangeAspect="1" noChangeArrowheads="1"/>
+          </p:cNvPicPr>
+          <p:nvPr/>
+        </p:nvPicPr>
+        <p:blipFill>
+          <a:blip r:embed="rId3">
+            <a:extLst>
+              <a:ext uri="{28A0092B-C50C-407E-A947-70E740481C1C}">
+                <a14:useLocalDpi xmlns:a14="http://schemas.microsoft.com/office/drawing/2010/main" val="0"/>
+              </a:ext>
+            </a:extLst>
+          </a:blip>
+          <a:srcRect/>
+          <a:stretch>
+            <a:fillRect/>
+          </a:stretch>
+        </p:blipFill>
+        <p:spPr bwMode="auto">
+          <a:xfrm>
+            <a:off x="7338694" y="5450056"/>
+            <a:ext cx="1382318" cy="1248508"/>
+          </a:xfrm>
+          <a:prstGeom prst="rect">
+            <a:avLst/>
+          </a:prstGeom>
+          <a:noFill/>
+          <a:extLst>
+            <a:ext uri="{909E8E84-426E-40DD-AFC4-6F175D3DCCD1}">
+              <a14:hiddenFill xmlns:a14="http://schemas.microsoft.com/office/drawing/2010/main">
+                <a:solidFill>
+                  <a:srgbClr val="FFFFFF"/>
+                </a:solidFill>
+              </a14:hiddenFill>
+            </a:ext>
+          </a:extLst>
+        </p:spPr>
+      </p:pic>
+      <p:sp>
+        <p:nvSpPr>
+          <p:cNvPr id="3" name="Footer Placeholder 2">
+            <a:extLst>
+              <a:ext uri="{FF2B5EF4-FFF2-40B4-BE49-F238E27FC236}">
+                <a16:creationId xmlns:a16="http://schemas.microsoft.com/office/drawing/2014/main" id="{6942939B-7B0C-42A5-8BC5-642B25324167}"/>
+              </a:ext>
+            </a:extLst>
+          </p:cNvPr>
+          <p:cNvSpPr>
+            <a:spLocks noGrp="1"/>
+          </p:cNvSpPr>
+          <p:nvPr>
+            <p:ph type="ftr" sz="quarter" idx="3"/>
+          </p:nvPr>
+        </p:nvSpPr>
+        <p:spPr/>
+        <p:txBody>
+          <a:bodyPr/>
+          <a:lstStyle/>
+          <a:p>
+            <a:r>
+              <a:rPr lang="en-GB"/>
+              <a:t>PowerPoint Style Guide / Supporting Templates</a:t>
+            </a:r>
+            <a:endParaRPr lang="en-US" dirty="0"/>
+          </a:p>
+        </p:txBody>
+      </p:sp>
+      <p:sp>
+        <p:nvSpPr>
+          <p:cNvPr id="4" name="Title 3">
+            <a:extLst>
+              <a:ext uri="{FF2B5EF4-FFF2-40B4-BE49-F238E27FC236}">
+                <a16:creationId xmlns:a16="http://schemas.microsoft.com/office/drawing/2014/main" id="{42A5EA90-17C9-4BD5-BD0D-74A5419E18C7}"/>
+              </a:ext>
+            </a:extLst>
+          </p:cNvPr>
+          <p:cNvSpPr>
+            <a:spLocks noGrp="1"/>
+          </p:cNvSpPr>
+          <p:nvPr>
+            <p:ph type="title"/>
+          </p:nvPr>
+        </p:nvSpPr>
+        <p:spPr/>
+        <p:txBody>
+          <a:bodyPr/>
+          <a:lstStyle/>
+          <a:p>
+            <a:r>
+              <a:rPr lang="en-GB" dirty="0"/>
               <a:t>Visual Run: Merging</a:t>
             </a:r>
           </a:p>
@@ -13991,7 +14344,7 @@
 </p:sld>
 </file>
 
-<file path=ppt/slides/slide11.xml><?xml version="1.0" encoding="utf-8"?>
+<file path=ppt/slides/slide12.xml><?xml version="1.0" encoding="utf-8"?>
 <p:sld xmlns:a="http://schemas.openxmlformats.org/drawingml/2006/main" xmlns:r="http://schemas.openxmlformats.org/officeDocument/2006/relationships" xmlns:p="http://schemas.openxmlformats.org/presentationml/2006/main">
   <p:cSld>
     <p:spTree>
@@ -15049,7 +15402,7 @@
           <p:cNvPr id="2" name="Content Placeholder 1">
             <a:extLst>
               <a:ext uri="{FF2B5EF4-FFF2-40B4-BE49-F238E27FC236}">
-                <a16:creationId xmlns:a16="http://schemas.microsoft.com/office/drawing/2014/main" id="{48869F42-6D93-4C35-8FA5-AE406994C1E3}"/>
+                <a16:creationId xmlns:a16="http://schemas.microsoft.com/office/drawing/2014/main" id="{262F1CBE-38D5-4BDE-9901-1B6C36F76960}"/>
               </a:ext>
             </a:extLst>
           </p:cNvPr>
@@ -15067,7 +15420,16 @@
           <a:p>
             <a:r>
               <a:rPr lang="en-GB" dirty="0"/>
-              <a:t>Create a ‘remote’ repository</a:t>
+              <a:t>GitHub is already used widely within the NHS for code/file based storage and collaboration</a:t>
+            </a:r>
+          </a:p>
+          <a:p>
+            <a:endParaRPr lang="en-GB" dirty="0"/>
+          </a:p>
+          <a:p>
+            <a:r>
+              <a:rPr lang="en-GB" dirty="0"/>
+              <a:t>Mental Health &amp; Dementia Analytical Team </a:t>
             </a:r>
           </a:p>
           <a:p>
@@ -15076,16 +15438,9 @@
               <a:buChar char="o"/>
             </a:pPr>
             <a:r>
-              <a:rPr lang="en-GB" i="1" dirty="0"/>
-              <a:t>Create a GitHub account on </a:t>
-            </a:r>
-            <a:r>
-              <a:rPr lang="en-GB" dirty="0">
-                <a:hlinkClick r:id="rId3"/>
-              </a:rPr>
-              <a:t>GitHub</a:t>
-            </a:r>
-            <a:endParaRPr lang="en-GB" dirty="0"/>
+              <a:rPr lang="en-GB" dirty="0"/>
+              <a:t>Online, open-access repository to upload SQL files rather than losing them in emails/SharePoint, working collaboratively within the team or across teams</a:t>
+            </a:r>
           </a:p>
           <a:p>
             <a:pPr lvl="1">
@@ -15094,7 +15449,16 @@
             </a:pPr>
             <a:r>
               <a:rPr lang="en-GB" dirty="0"/>
-              <a:t>Click ‘create a new repository’</a:t>
+              <a:t>Benefits: Easily track changes to code, simple to share due to open-access, and transparent, so improves confidence in own published analysis</a:t>
+            </a:r>
+          </a:p>
+          <a:p>
+            <a:endParaRPr lang="en-GB" dirty="0"/>
+          </a:p>
+          <a:p>
+            <a:r>
+              <a:rPr lang="en-GB" dirty="0"/>
+              <a:t>A&amp;E Admissions Forecasting Tool</a:t>
             </a:r>
           </a:p>
           <a:p>
@@ -15104,7 +15468,7 @@
             </a:pPr>
             <a:r>
               <a:rPr lang="en-GB" dirty="0"/>
-              <a:t>Name it consistently with your local file</a:t>
+              <a:t>Describes the Master branch as the ‘single source of truth’</a:t>
             </a:r>
           </a:p>
           <a:p>
@@ -15114,80 +15478,11 @@
             </a:pPr>
             <a:r>
               <a:rPr lang="en-GB" dirty="0"/>
-              <a:t>You can add a README.md which explains to outside users what the project is (usually HTML). Licences can also be added which control what users can/can’t do with code. Would be helpful to establish what others use within NHSE</a:t>
-            </a:r>
-          </a:p>
-          <a:p>
-            <a:pPr marL="457200" lvl="1" indent="0">
-              <a:buNone/>
-            </a:pPr>
-            <a:endParaRPr lang="en-GB" dirty="0"/>
-          </a:p>
-          <a:p>
-            <a:r>
-              <a:rPr lang="en-GB" dirty="0"/>
-              <a:t>Connect ‘remote’ to ‘local’ repository</a:t>
-            </a:r>
-          </a:p>
-          <a:p>
-            <a:pPr lvl="1">
-              <a:buFont typeface="Courier New" panose="02070309020205020404" pitchFamily="49" charset="0"/>
-              <a:buChar char="o"/>
-            </a:pPr>
-            <a:r>
-              <a:rPr lang="en-GB" dirty="0"/>
-              <a:t>Using </a:t>
-            </a:r>
-            <a:r>
-              <a:rPr lang="en-GB" dirty="0" err="1"/>
-              <a:t>GitBash</a:t>
-            </a:r>
-            <a:r>
-              <a:rPr lang="en-GB" dirty="0"/>
-              <a:t> -&gt; </a:t>
-            </a:r>
-            <a:r>
-              <a:rPr lang="en-GB" i="1" dirty="0"/>
-              <a:t>git remote add origin &lt;link to GitHub repo&gt;</a:t>
-            </a:r>
-          </a:p>
-          <a:p>
-            <a:pPr lvl="1">
-              <a:buFont typeface="Courier New" panose="02070309020205020404" pitchFamily="49" charset="0"/>
-              <a:buChar char="o"/>
-            </a:pPr>
-            <a:endParaRPr lang="en-GB" i="1" dirty="0"/>
-          </a:p>
-          <a:p>
-            <a:r>
-              <a:rPr lang="en-GB" dirty="0"/>
-              <a:t>Push your files to the remote repo</a:t>
-            </a:r>
-          </a:p>
-          <a:p>
-            <a:pPr lvl="1">
-              <a:buFont typeface="Courier New" panose="02070309020205020404" pitchFamily="49" charset="0"/>
-              <a:buChar char="o"/>
-            </a:pPr>
-            <a:r>
-              <a:rPr lang="en-GB" i="1" dirty="0"/>
-              <a:t>git push –u origin master </a:t>
-            </a:r>
-            <a:r>
-              <a:rPr lang="en-GB" dirty="0"/>
-              <a:t>-&gt; here, Master is the name of the main branch, and origin is the remote repo. If you were operating on a different branch, you would use that name, e.g. –u origin branch_1</a:t>
-            </a:r>
-          </a:p>
-          <a:p>
-            <a:pPr marL="457200" lvl="1" indent="0">
-              <a:buNone/>
-            </a:pPr>
-            <a:endParaRPr lang="en-GB" i="1" dirty="0"/>
-          </a:p>
-          <a:p>
-            <a:r>
-              <a:rPr lang="en-GB" i="1" dirty="0"/>
-              <a:t>Check GitHub to see if the changes have been made, and are up to date</a:t>
+              <a:t>Using a few different repositories for </a:t>
+            </a:r>
+            <a:r>
+              <a:rPr lang="en-GB"/>
+              <a:t>different areas of a project</a:t>
             </a:r>
           </a:p>
           <a:p>
@@ -15197,12 +15492,6 @@
             </a:pPr>
             <a:endParaRPr lang="en-GB" dirty="0"/>
           </a:p>
-          <a:p>
-            <a:pPr marL="457200" lvl="1" indent="0">
-              <a:buNone/>
-            </a:pPr>
-            <a:endParaRPr lang="en-GB" dirty="0"/>
-          </a:p>
         </p:txBody>
       </p:sp>
       <p:sp>
@@ -15210,7 +15499,7 @@
           <p:cNvPr id="3" name="Footer Placeholder 2">
             <a:extLst>
               <a:ext uri="{FF2B5EF4-FFF2-40B4-BE49-F238E27FC236}">
-                <a16:creationId xmlns:a16="http://schemas.microsoft.com/office/drawing/2014/main" id="{6942939B-7B0C-42A5-8BC5-642B25324167}"/>
+                <a16:creationId xmlns:a16="http://schemas.microsoft.com/office/drawing/2014/main" id="{A7AC4494-DC7F-426D-B5BF-14F0BA385522}"/>
               </a:ext>
             </a:extLst>
           </p:cNvPr>
@@ -15227,7 +15516,7 @@
           <a:lstStyle/>
           <a:p>
             <a:r>
-              <a:rPr lang="en-GB" dirty="0"/>
+              <a:rPr lang="en-GB"/>
               <a:t>PowerPoint Style Guide / Supporting Templates</a:t>
             </a:r>
             <a:endParaRPr lang="en-US" dirty="0"/>
@@ -15239,7 +15528,7 @@
           <p:cNvPr id="4" name="Title 3">
             <a:extLst>
               <a:ext uri="{FF2B5EF4-FFF2-40B4-BE49-F238E27FC236}">
-                <a16:creationId xmlns:a16="http://schemas.microsoft.com/office/drawing/2014/main" id="{42A5EA90-17C9-4BD5-BD0D-74A5419E18C7}"/>
+                <a16:creationId xmlns:a16="http://schemas.microsoft.com/office/drawing/2014/main" id="{12FFB6D8-3053-4E55-BAE8-AFCC0592C8E7}"/>
               </a:ext>
             </a:extLst>
           </p:cNvPr>
@@ -15257,62 +15546,15 @@
           <a:p>
             <a:r>
               <a:rPr lang="en-GB" dirty="0"/>
-              <a:t>Connecting to GitHub</a:t>
-            </a:r>
-          </a:p>
-        </p:txBody>
-      </p:sp>
-      <p:pic>
-        <p:nvPicPr>
-          <p:cNvPr id="5" name="Picture 2" descr="See the source image">
-            <a:extLst>
-              <a:ext uri="{FF2B5EF4-FFF2-40B4-BE49-F238E27FC236}">
-                <a16:creationId xmlns:a16="http://schemas.microsoft.com/office/drawing/2014/main" id="{62E3031D-4D8D-4299-BC07-A474B9B7732C}"/>
-              </a:ext>
-            </a:extLst>
-          </p:cNvPr>
-          <p:cNvPicPr>
-            <a:picLocks noChangeAspect="1" noChangeArrowheads="1"/>
-          </p:cNvPicPr>
-          <p:nvPr/>
-        </p:nvPicPr>
-        <p:blipFill>
-          <a:blip r:embed="rId4">
-            <a:extLst>
-              <a:ext uri="{28A0092B-C50C-407E-A947-70E740481C1C}">
-                <a14:useLocalDpi xmlns:a14="http://schemas.microsoft.com/office/drawing/2010/main" val="0"/>
-              </a:ext>
-            </a:extLst>
-          </a:blip>
-          <a:srcRect/>
-          <a:stretch>
-            <a:fillRect/>
-          </a:stretch>
-        </p:blipFill>
-        <p:spPr bwMode="auto">
-          <a:xfrm>
-            <a:off x="7338694" y="5450056"/>
-            <a:ext cx="1382318" cy="1248508"/>
-          </a:xfrm>
-          <a:prstGeom prst="rect">
-            <a:avLst/>
-          </a:prstGeom>
-          <a:noFill/>
-          <a:extLst>
-            <a:ext uri="{909E8E84-426E-40DD-AFC4-6F175D3DCCD1}">
-              <a14:hiddenFill xmlns:a14="http://schemas.microsoft.com/office/drawing/2010/main">
-                <a:solidFill>
-                  <a:srgbClr val="FFFFFF"/>
-                </a:solidFill>
-              </a14:hiddenFill>
-            </a:ext>
-          </a:extLst>
-        </p:spPr>
-      </p:pic>
+              <a:t>Learning From Others</a:t>
+            </a:r>
+          </a:p>
+        </p:txBody>
+      </p:sp>
     </p:spTree>
     <p:extLst>
       <p:ext uri="{BB962C8B-B14F-4D97-AF65-F5344CB8AC3E}">
-        <p14:creationId xmlns:p14="http://schemas.microsoft.com/office/powerpoint/2010/main" val="4006080756"/>
+        <p14:creationId xmlns:p14="http://schemas.microsoft.com/office/powerpoint/2010/main" val="4151486386"/>
       </p:ext>
     </p:extLst>
   </p:cSld>
@@ -15362,7 +15604,7 @@
           <a:p>
             <a:r>
               <a:rPr lang="en-GB" dirty="0"/>
-              <a:t>Branches are an independent line of development, away from the main branch</a:t>
+              <a:t>Create a ‘remote’ repository</a:t>
             </a:r>
           </a:p>
           <a:p>
@@ -15371,9 +15613,16 @@
               <a:buChar char="o"/>
             </a:pPr>
             <a:r>
-              <a:rPr lang="en-GB" dirty="0"/>
-              <a:t>Files are identical to the main branch, but adding and committing new files, or changes, do not automatically affect the main branch</a:t>
-            </a:r>
+              <a:rPr lang="en-GB" i="1" dirty="0"/>
+              <a:t>Create a GitHub account on </a:t>
+            </a:r>
+            <a:r>
+              <a:rPr lang="en-GB" dirty="0">
+                <a:hlinkClick r:id="rId3"/>
+              </a:rPr>
+              <a:t>GitHub</a:t>
+            </a:r>
+            <a:endParaRPr lang="en-GB" dirty="0"/>
           </a:p>
           <a:p>
             <a:pPr lvl="1">
@@ -15382,7 +15631,7 @@
             </a:pPr>
             <a:r>
               <a:rPr lang="en-GB" dirty="0"/>
-              <a:t>The latest edited branch can be merged with the master branch, meaning that the master always contains production quality code</a:t>
+              <a:t>Click ‘create a new repository’</a:t>
             </a:r>
           </a:p>
           <a:p>
@@ -15392,7 +15641,90 @@
             </a:pPr>
             <a:r>
               <a:rPr lang="en-GB" dirty="0"/>
-              <a:t>Name branches v1, v1.1 etc. as change are made, which keeps a log of all changes made</a:t>
+              <a:t>Name it consistently with your local file</a:t>
+            </a:r>
+          </a:p>
+          <a:p>
+            <a:pPr lvl="1">
+              <a:buFont typeface="Courier New" panose="02070309020205020404" pitchFamily="49" charset="0"/>
+              <a:buChar char="o"/>
+            </a:pPr>
+            <a:r>
+              <a:rPr lang="en-GB" dirty="0"/>
+              <a:t>You can add a README.md which explains to outside users what the project is (usually HTML). Licences can also be added which control what users can/can’t do with code. Would be helpful to establish what others use within NHSE</a:t>
+            </a:r>
+          </a:p>
+          <a:p>
+            <a:pPr marL="457200" lvl="1" indent="0">
+              <a:buNone/>
+            </a:pPr>
+            <a:endParaRPr lang="en-GB" dirty="0"/>
+          </a:p>
+          <a:p>
+            <a:r>
+              <a:rPr lang="en-GB" dirty="0"/>
+              <a:t>Connect ‘remote’ to ‘local’ repository</a:t>
+            </a:r>
+          </a:p>
+          <a:p>
+            <a:pPr lvl="1">
+              <a:buFont typeface="Courier New" panose="02070309020205020404" pitchFamily="49" charset="0"/>
+              <a:buChar char="o"/>
+            </a:pPr>
+            <a:r>
+              <a:rPr lang="en-GB" dirty="0"/>
+              <a:t>Using </a:t>
+            </a:r>
+            <a:r>
+              <a:rPr lang="en-GB" dirty="0" err="1"/>
+              <a:t>GitBash</a:t>
+            </a:r>
+            <a:r>
+              <a:rPr lang="en-GB" dirty="0"/>
+              <a:t> -&gt; </a:t>
+            </a:r>
+            <a:r>
+              <a:rPr lang="en-GB" i="1" dirty="0"/>
+              <a:t>git remote add origin &lt;link to GitHub repo&gt;</a:t>
+            </a:r>
+          </a:p>
+          <a:p>
+            <a:pPr lvl="1">
+              <a:buFont typeface="Courier New" panose="02070309020205020404" pitchFamily="49" charset="0"/>
+              <a:buChar char="o"/>
+            </a:pPr>
+            <a:endParaRPr lang="en-GB" i="1" dirty="0"/>
+          </a:p>
+          <a:p>
+            <a:r>
+              <a:rPr lang="en-GB" dirty="0"/>
+              <a:t>Push your files to the remote repo</a:t>
+            </a:r>
+          </a:p>
+          <a:p>
+            <a:pPr lvl="1">
+              <a:buFont typeface="Courier New" panose="02070309020205020404" pitchFamily="49" charset="0"/>
+              <a:buChar char="o"/>
+            </a:pPr>
+            <a:r>
+              <a:rPr lang="en-GB" i="1" dirty="0"/>
+              <a:t>git push –u origin master </a:t>
+            </a:r>
+            <a:r>
+              <a:rPr lang="en-GB" dirty="0"/>
+              <a:t>-&gt; here, Master is the name of the main branch, and origin is the remote repo. If you were operating on a different branch, you would use that name, e.g. –u origin branch_1</a:t>
+            </a:r>
+          </a:p>
+          <a:p>
+            <a:pPr marL="457200" lvl="1" indent="0">
+              <a:buNone/>
+            </a:pPr>
+            <a:endParaRPr lang="en-GB" i="1" dirty="0"/>
+          </a:p>
+          <a:p>
+            <a:r>
+              <a:rPr lang="en-GB" i="1" dirty="0"/>
+              <a:t>Check GitHub to see if the changes have been made, and are up to date</a:t>
             </a:r>
           </a:p>
           <a:p>
@@ -15403,77 +15735,10 @@
             <a:endParaRPr lang="en-GB" dirty="0"/>
           </a:p>
           <a:p>
-            <a:r>
-              <a:rPr lang="en-GB" i="1" dirty="0"/>
-              <a:t>git checkout –b </a:t>
-            </a:r>
-            <a:r>
-              <a:rPr lang="en-GB" i="1" dirty="0" err="1"/>
-              <a:t>edit_branch</a:t>
-            </a:r>
-            <a:r>
-              <a:rPr lang="en-GB" i="1" dirty="0"/>
-              <a:t> </a:t>
-            </a:r>
-            <a:r>
-              <a:rPr lang="en-GB" dirty="0"/>
-              <a:t>-&gt; Creating a new branch ‘</a:t>
-            </a:r>
-            <a:r>
-              <a:rPr lang="en-GB" dirty="0" err="1"/>
-              <a:t>edit_branch</a:t>
-            </a:r>
-            <a:r>
-              <a:rPr lang="en-GB" dirty="0"/>
-              <a:t>’ and moving to that branch</a:t>
-            </a:r>
-          </a:p>
-          <a:p>
-            <a:pPr lvl="1">
-              <a:buFont typeface="Courier New" panose="02070309020205020404" pitchFamily="49" charset="0"/>
-              <a:buChar char="o"/>
-            </a:pPr>
-            <a:r>
-              <a:rPr lang="en-GB" dirty="0"/>
-              <a:t>Here we can make the required changes that can be proposed, but not necessarily merged to the main branch</a:t>
-            </a:r>
-          </a:p>
-          <a:p>
-            <a:pPr lvl="1">
-              <a:buFont typeface="Courier New" panose="02070309020205020404" pitchFamily="49" charset="0"/>
-              <a:buChar char="o"/>
-            </a:pPr>
-            <a:r>
-              <a:rPr lang="en-GB" i="1" dirty="0"/>
-              <a:t>git checkout master </a:t>
-            </a:r>
-            <a:r>
-              <a:rPr lang="en-GB" dirty="0"/>
-              <a:t>would move you back to the main branch</a:t>
-            </a:r>
-          </a:p>
-          <a:p>
-            <a:pPr lvl="1">
-              <a:buFont typeface="Courier New" panose="02070309020205020404" pitchFamily="49" charset="0"/>
-              <a:buChar char="o"/>
+            <a:pPr marL="457200" lvl="1" indent="0">
+              <a:buNone/>
             </a:pPr>
             <a:endParaRPr lang="en-GB" dirty="0"/>
-          </a:p>
-          <a:p>
-            <a:r>
-              <a:rPr lang="en-GB" dirty="0"/>
-              <a:t>Switching between branches allows you to compare the versions and assess the changes made. This means that further alterations can be made before the branches are merged, and the master then contains the latest version</a:t>
-            </a:r>
-          </a:p>
-          <a:p>
-            <a:pPr lvl="1">
-              <a:buFont typeface="Courier New" panose="02070309020205020404" pitchFamily="49" charset="0"/>
-              <a:buChar char="o"/>
-            </a:pPr>
-            <a:endParaRPr lang="en-GB" i="1" dirty="0"/>
-          </a:p>
-          <a:p>
-            <a:endParaRPr lang="en-GB" i="1" dirty="0"/>
           </a:p>
         </p:txBody>
       </p:sp>
@@ -15529,7 +15794,7 @@
           <a:p>
             <a:r>
               <a:rPr lang="en-GB" dirty="0"/>
-              <a:t>Using Branches</a:t>
+              <a:t>Connecting to GitHub</a:t>
             </a:r>
           </a:p>
         </p:txBody>
@@ -15539,7 +15804,7 @@
           <p:cNvPr id="5" name="Picture 2" descr="See the source image">
             <a:extLst>
               <a:ext uri="{FF2B5EF4-FFF2-40B4-BE49-F238E27FC236}">
-                <a16:creationId xmlns:a16="http://schemas.microsoft.com/office/drawing/2014/main" id="{DA37BB83-A404-466E-AF5B-9DECFAADE798}"/>
+                <a16:creationId xmlns:a16="http://schemas.microsoft.com/office/drawing/2014/main" id="{62E3031D-4D8D-4299-BC07-A474B9B7732C}"/>
               </a:ext>
             </a:extLst>
           </p:cNvPr>
@@ -15549,7 +15814,7 @@
           <p:nvPr/>
         </p:nvPicPr>
         <p:blipFill>
-          <a:blip r:embed="rId3">
+          <a:blip r:embed="rId4">
             <a:extLst>
               <a:ext uri="{28A0092B-C50C-407E-A947-70E740481C1C}">
                 <a14:useLocalDpi xmlns:a14="http://schemas.microsoft.com/office/drawing/2010/main" val="0"/>
@@ -15584,7 +15849,7 @@
     </p:spTree>
     <p:extLst>
       <p:ext uri="{BB962C8B-B14F-4D97-AF65-F5344CB8AC3E}">
-        <p14:creationId xmlns:p14="http://schemas.microsoft.com/office/powerpoint/2010/main" val="3118825995"/>
+        <p14:creationId xmlns:p14="http://schemas.microsoft.com/office/powerpoint/2010/main" val="4006080756"/>
       </p:ext>
     </p:extLst>
   </p:cSld>
@@ -15611,12 +15876,207 @@
           <a:chExt cx="0" cy="0"/>
         </a:xfrm>
       </p:grpSpPr>
+      <p:sp>
+        <p:nvSpPr>
+          <p:cNvPr id="2" name="Content Placeholder 1">
+            <a:extLst>
+              <a:ext uri="{FF2B5EF4-FFF2-40B4-BE49-F238E27FC236}">
+                <a16:creationId xmlns:a16="http://schemas.microsoft.com/office/drawing/2014/main" id="{48869F42-6D93-4C35-8FA5-AE406994C1E3}"/>
+              </a:ext>
+            </a:extLst>
+          </p:cNvPr>
+          <p:cNvSpPr>
+            <a:spLocks noGrp="1"/>
+          </p:cNvSpPr>
+          <p:nvPr>
+            <p:ph sz="quarter" idx="10"/>
+          </p:nvPr>
+        </p:nvSpPr>
+        <p:spPr/>
+        <p:txBody>
+          <a:bodyPr/>
+          <a:lstStyle/>
+          <a:p>
+            <a:r>
+              <a:rPr lang="en-GB" dirty="0"/>
+              <a:t>Branches are an independent line of development, away from the main branch</a:t>
+            </a:r>
+          </a:p>
+          <a:p>
+            <a:pPr lvl="1">
+              <a:buFont typeface="Courier New" panose="02070309020205020404" pitchFamily="49" charset="0"/>
+              <a:buChar char="o"/>
+            </a:pPr>
+            <a:r>
+              <a:rPr lang="en-GB" dirty="0"/>
+              <a:t>Files are identical to the main branch, but adding and committing new files, or changes, do not automatically affect the main branch</a:t>
+            </a:r>
+          </a:p>
+          <a:p>
+            <a:pPr lvl="1">
+              <a:buFont typeface="Courier New" panose="02070309020205020404" pitchFamily="49" charset="0"/>
+              <a:buChar char="o"/>
+            </a:pPr>
+            <a:r>
+              <a:rPr lang="en-GB" dirty="0"/>
+              <a:t>The latest edited branch can be merged with the master branch, meaning that the master always contains production quality code</a:t>
+            </a:r>
+          </a:p>
+          <a:p>
+            <a:pPr lvl="1">
+              <a:buFont typeface="Courier New" panose="02070309020205020404" pitchFamily="49" charset="0"/>
+              <a:buChar char="o"/>
+            </a:pPr>
+            <a:r>
+              <a:rPr lang="en-GB" dirty="0"/>
+              <a:t>Name branches v1, v1.1 etc. as change are made, which keeps a log of all changes made</a:t>
+            </a:r>
+          </a:p>
+          <a:p>
+            <a:pPr lvl="1">
+              <a:buFont typeface="Courier New" panose="02070309020205020404" pitchFamily="49" charset="0"/>
+              <a:buChar char="o"/>
+            </a:pPr>
+            <a:endParaRPr lang="en-GB" dirty="0"/>
+          </a:p>
+          <a:p>
+            <a:r>
+              <a:rPr lang="en-GB" i="1" dirty="0"/>
+              <a:t>git checkout –b </a:t>
+            </a:r>
+            <a:r>
+              <a:rPr lang="en-GB" i="1" dirty="0" err="1"/>
+              <a:t>edit_branch</a:t>
+            </a:r>
+            <a:r>
+              <a:rPr lang="en-GB" i="1" dirty="0"/>
+              <a:t> </a:t>
+            </a:r>
+            <a:r>
+              <a:rPr lang="en-GB" dirty="0"/>
+              <a:t>-&gt; Creating a new branch ‘</a:t>
+            </a:r>
+            <a:r>
+              <a:rPr lang="en-GB" dirty="0" err="1"/>
+              <a:t>edit_branch</a:t>
+            </a:r>
+            <a:r>
+              <a:rPr lang="en-GB" dirty="0"/>
+              <a:t>’ and moving to that branch</a:t>
+            </a:r>
+          </a:p>
+          <a:p>
+            <a:pPr lvl="1">
+              <a:buFont typeface="Courier New" panose="02070309020205020404" pitchFamily="49" charset="0"/>
+              <a:buChar char="o"/>
+            </a:pPr>
+            <a:r>
+              <a:rPr lang="en-GB" dirty="0"/>
+              <a:t>Here we can make the required changes that can be proposed, but not necessarily merged to the main branch</a:t>
+            </a:r>
+          </a:p>
+          <a:p>
+            <a:pPr lvl="1">
+              <a:buFont typeface="Courier New" panose="02070309020205020404" pitchFamily="49" charset="0"/>
+              <a:buChar char="o"/>
+            </a:pPr>
+            <a:r>
+              <a:rPr lang="en-GB" i="1" dirty="0"/>
+              <a:t>git checkout master </a:t>
+            </a:r>
+            <a:r>
+              <a:rPr lang="en-GB" dirty="0"/>
+              <a:t>would move you back to the main branch</a:t>
+            </a:r>
+          </a:p>
+          <a:p>
+            <a:pPr lvl="1">
+              <a:buFont typeface="Courier New" panose="02070309020205020404" pitchFamily="49" charset="0"/>
+              <a:buChar char="o"/>
+            </a:pPr>
+            <a:endParaRPr lang="en-GB" dirty="0"/>
+          </a:p>
+          <a:p>
+            <a:r>
+              <a:rPr lang="en-GB" dirty="0"/>
+              <a:t>Switching between branches allows you to compare the versions and assess the changes made. This means that further alterations can be made before the branches are merged, and the master then contains the latest version</a:t>
+            </a:r>
+          </a:p>
+          <a:p>
+            <a:pPr lvl="1">
+              <a:buFont typeface="Courier New" panose="02070309020205020404" pitchFamily="49" charset="0"/>
+              <a:buChar char="o"/>
+            </a:pPr>
+            <a:endParaRPr lang="en-GB" i="1" dirty="0"/>
+          </a:p>
+          <a:p>
+            <a:endParaRPr lang="en-GB" i="1" dirty="0"/>
+          </a:p>
+        </p:txBody>
+      </p:sp>
+      <p:sp>
+        <p:nvSpPr>
+          <p:cNvPr id="3" name="Footer Placeholder 2">
+            <a:extLst>
+              <a:ext uri="{FF2B5EF4-FFF2-40B4-BE49-F238E27FC236}">
+                <a16:creationId xmlns:a16="http://schemas.microsoft.com/office/drawing/2014/main" id="{6942939B-7B0C-42A5-8BC5-642B25324167}"/>
+              </a:ext>
+            </a:extLst>
+          </p:cNvPr>
+          <p:cNvSpPr>
+            <a:spLocks noGrp="1"/>
+          </p:cNvSpPr>
+          <p:nvPr>
+            <p:ph type="ftr" sz="quarter" idx="3"/>
+          </p:nvPr>
+        </p:nvSpPr>
+        <p:spPr/>
+        <p:txBody>
+          <a:bodyPr/>
+          <a:lstStyle/>
+          <a:p>
+            <a:r>
+              <a:rPr lang="en-GB" dirty="0"/>
+              <a:t>PowerPoint Style Guide / Supporting Templates</a:t>
+            </a:r>
+            <a:endParaRPr lang="en-US" dirty="0"/>
+          </a:p>
+        </p:txBody>
+      </p:sp>
+      <p:sp>
+        <p:nvSpPr>
+          <p:cNvPr id="4" name="Title 3">
+            <a:extLst>
+              <a:ext uri="{FF2B5EF4-FFF2-40B4-BE49-F238E27FC236}">
+                <a16:creationId xmlns:a16="http://schemas.microsoft.com/office/drawing/2014/main" id="{42A5EA90-17C9-4BD5-BD0D-74A5419E18C7}"/>
+              </a:ext>
+            </a:extLst>
+          </p:cNvPr>
+          <p:cNvSpPr>
+            <a:spLocks noGrp="1"/>
+          </p:cNvSpPr>
+          <p:nvPr>
+            <p:ph type="title"/>
+          </p:nvPr>
+        </p:nvSpPr>
+        <p:spPr/>
+        <p:txBody>
+          <a:bodyPr/>
+          <a:lstStyle/>
+          <a:p>
+            <a:r>
+              <a:rPr lang="en-GB" dirty="0"/>
+              <a:t>Using Branches</a:t>
+            </a:r>
+          </a:p>
+        </p:txBody>
+      </p:sp>
       <p:pic>
         <p:nvPicPr>
           <p:cNvPr id="5" name="Picture 2" descr="See the source image">
             <a:extLst>
               <a:ext uri="{FF2B5EF4-FFF2-40B4-BE49-F238E27FC236}">
-                <a16:creationId xmlns:a16="http://schemas.microsoft.com/office/drawing/2014/main" id="{0ED5EA98-2928-4140-96E4-BCECB454AD2D}"/>
+                <a16:creationId xmlns:a16="http://schemas.microsoft.com/office/drawing/2014/main" id="{DA37BB83-A404-466E-AF5B-9DECFAADE798}"/>
               </a:ext>
             </a:extLst>
           </p:cNvPr>
@@ -15658,223 +16118,10 @@
           </a:extLst>
         </p:spPr>
       </p:pic>
-      <p:sp>
-        <p:nvSpPr>
-          <p:cNvPr id="2" name="Content Placeholder 1">
-            <a:extLst>
-              <a:ext uri="{FF2B5EF4-FFF2-40B4-BE49-F238E27FC236}">
-                <a16:creationId xmlns:a16="http://schemas.microsoft.com/office/drawing/2014/main" id="{48869F42-6D93-4C35-8FA5-AE406994C1E3}"/>
-              </a:ext>
-            </a:extLst>
-          </p:cNvPr>
-          <p:cNvSpPr>
-            <a:spLocks noGrp="1"/>
-          </p:cNvSpPr>
-          <p:nvPr>
-            <p:ph sz="quarter" idx="10"/>
-          </p:nvPr>
-        </p:nvSpPr>
-        <p:spPr/>
-        <p:txBody>
-          <a:bodyPr/>
-          <a:lstStyle/>
-          <a:p>
-            <a:r>
-              <a:rPr lang="en-GB" dirty="0"/>
-              <a:t>Version Control -&gt; Version Control can be something that is difficult/time consuming to complete</a:t>
-            </a:r>
-          </a:p>
-          <a:p>
-            <a:pPr lvl="1">
-              <a:buFont typeface="Courier New" panose="02070309020205020404" pitchFamily="49" charset="0"/>
-              <a:buChar char="o"/>
-            </a:pPr>
-            <a:r>
-              <a:rPr lang="en-GB" dirty="0"/>
-              <a:t>There are often small changes that may seem meaningless to record</a:t>
-            </a:r>
-          </a:p>
-          <a:p>
-            <a:pPr lvl="1">
-              <a:buFont typeface="Courier New" panose="02070309020205020404" pitchFamily="49" charset="0"/>
-              <a:buChar char="o"/>
-            </a:pPr>
-            <a:r>
-              <a:rPr lang="en-GB" dirty="0"/>
-              <a:t>There can be large changes that change the landscape of a file</a:t>
-            </a:r>
-          </a:p>
-          <a:p>
-            <a:pPr lvl="1">
-              <a:buFont typeface="Courier New" panose="02070309020205020404" pitchFamily="49" charset="0"/>
-              <a:buChar char="o"/>
-            </a:pPr>
-            <a:r>
-              <a:rPr lang="en-GB" dirty="0"/>
-              <a:t>Branching allows small and large changes to be tracked, and files to be archived without clutter</a:t>
-            </a:r>
-          </a:p>
-          <a:p>
-            <a:pPr lvl="1">
-              <a:buFont typeface="Courier New" panose="02070309020205020404" pitchFamily="49" charset="0"/>
-              <a:buChar char="o"/>
-            </a:pPr>
-            <a:endParaRPr lang="en-GB" dirty="0"/>
-          </a:p>
-          <a:p>
-            <a:r>
-              <a:rPr lang="en-GB" dirty="0"/>
-              <a:t>Collaborative Working -&gt; The team often works on large R scripts / SQL queries etc. that may constantly change over the process of producing a product</a:t>
-            </a:r>
-          </a:p>
-          <a:p>
-            <a:pPr lvl="1">
-              <a:buFont typeface="Courier New" panose="02070309020205020404" pitchFamily="49" charset="0"/>
-              <a:buChar char="o"/>
-            </a:pPr>
-            <a:r>
-              <a:rPr lang="en-GB" dirty="0"/>
-              <a:t>Multiple colleagues can access scripts, make changes, </a:t>
-            </a:r>
-            <a:r>
-              <a:rPr lang="en-GB" i="1" dirty="0"/>
-              <a:t>push</a:t>
-            </a:r>
-            <a:r>
-              <a:rPr lang="en-GB" dirty="0"/>
-              <a:t> them to the remote, and </a:t>
-            </a:r>
-            <a:r>
-              <a:rPr lang="en-GB" i="1" dirty="0"/>
-              <a:t>pull</a:t>
-            </a:r>
-            <a:r>
-              <a:rPr lang="en-GB" dirty="0"/>
-              <a:t> the changes that others have made</a:t>
-            </a:r>
-          </a:p>
-          <a:p>
-            <a:pPr lvl="1">
-              <a:buFont typeface="Courier New" panose="02070309020205020404" pitchFamily="49" charset="0"/>
-              <a:buChar char="o"/>
-            </a:pPr>
-            <a:r>
-              <a:rPr lang="en-GB" dirty="0"/>
-              <a:t>These changes can be reviewed centrally, and commits and merges can be made where we are confident that change is necessary</a:t>
-            </a:r>
-          </a:p>
-          <a:p>
-            <a:pPr lvl="1">
-              <a:buFont typeface="Courier New" panose="02070309020205020404" pitchFamily="49" charset="0"/>
-              <a:buChar char="o"/>
-            </a:pPr>
-            <a:r>
-              <a:rPr lang="en-GB" dirty="0"/>
-              <a:t>This would be useful for future iterations of PLICS where the R code will likely become much larger, and more people will work on it</a:t>
-            </a:r>
-          </a:p>
-          <a:p>
-            <a:pPr lvl="1">
-              <a:buFont typeface="Courier New" panose="02070309020205020404" pitchFamily="49" charset="0"/>
-              <a:buChar char="o"/>
-            </a:pPr>
-            <a:endParaRPr lang="en-GB" dirty="0"/>
-          </a:p>
-          <a:p>
-            <a:r>
-              <a:rPr lang="en-GB" dirty="0"/>
-              <a:t>Transparency and Schematics -&gt; Schematics can sometimes be difficult to produce as lots of processes have taken place</a:t>
-            </a:r>
-          </a:p>
-          <a:p>
-            <a:pPr lvl="1">
-              <a:buFont typeface="Courier New" panose="02070309020205020404" pitchFamily="49" charset="0"/>
-              <a:buChar char="o"/>
-            </a:pPr>
-            <a:r>
-              <a:rPr lang="en-GB" dirty="0"/>
-              <a:t>This nature of version control allows the steps of change for production documents to be followed easily, if an appropriate naming system is adopted</a:t>
-            </a:r>
-          </a:p>
-          <a:p>
-            <a:pPr lvl="1">
-              <a:buFont typeface="Courier New" panose="02070309020205020404" pitchFamily="49" charset="0"/>
-              <a:buChar char="o"/>
-            </a:pPr>
-            <a:r>
-              <a:rPr lang="en-GB" dirty="0"/>
-              <a:t>The –m messaging feature allows colleagues to label their changes, e.g. ‘lines added for MFF values’</a:t>
-            </a:r>
-          </a:p>
-          <a:p>
-            <a:pPr marL="457200" lvl="1" indent="0">
-              <a:buNone/>
-            </a:pPr>
-            <a:endParaRPr lang="en-GB" dirty="0"/>
-          </a:p>
-        </p:txBody>
-      </p:sp>
-      <p:sp>
-        <p:nvSpPr>
-          <p:cNvPr id="3" name="Footer Placeholder 2">
-            <a:extLst>
-              <a:ext uri="{FF2B5EF4-FFF2-40B4-BE49-F238E27FC236}">
-                <a16:creationId xmlns:a16="http://schemas.microsoft.com/office/drawing/2014/main" id="{6942939B-7B0C-42A5-8BC5-642B25324167}"/>
-              </a:ext>
-            </a:extLst>
-          </p:cNvPr>
-          <p:cNvSpPr>
-            <a:spLocks noGrp="1"/>
-          </p:cNvSpPr>
-          <p:nvPr>
-            <p:ph type="ftr" sz="quarter" idx="3"/>
-          </p:nvPr>
-        </p:nvSpPr>
-        <p:spPr/>
-        <p:txBody>
-          <a:bodyPr/>
-          <a:lstStyle/>
-          <a:p>
-            <a:r>
-              <a:rPr lang="en-GB"/>
-              <a:t>PowerPoint Style Guide / Supporting Templates</a:t>
-            </a:r>
-            <a:endParaRPr lang="en-US" dirty="0"/>
-          </a:p>
-        </p:txBody>
-      </p:sp>
-      <p:sp>
-        <p:nvSpPr>
-          <p:cNvPr id="4" name="Title 3">
-            <a:extLst>
-              <a:ext uri="{FF2B5EF4-FFF2-40B4-BE49-F238E27FC236}">
-                <a16:creationId xmlns:a16="http://schemas.microsoft.com/office/drawing/2014/main" id="{42A5EA90-17C9-4BD5-BD0D-74A5419E18C7}"/>
-              </a:ext>
-            </a:extLst>
-          </p:cNvPr>
-          <p:cNvSpPr>
-            <a:spLocks noGrp="1"/>
-          </p:cNvSpPr>
-          <p:nvPr>
-            <p:ph type="title"/>
-          </p:nvPr>
-        </p:nvSpPr>
-        <p:spPr/>
-        <p:txBody>
-          <a:bodyPr/>
-          <a:lstStyle/>
-          <a:p>
-            <a:r>
-              <a:rPr lang="en-GB" dirty="0"/>
-              <a:t>Why is this applicable to AIF Payments?</a:t>
-            </a:r>
-          </a:p>
-        </p:txBody>
-      </p:sp>
     </p:spTree>
     <p:extLst>
       <p:ext uri="{BB962C8B-B14F-4D97-AF65-F5344CB8AC3E}">
-        <p14:creationId xmlns:p14="http://schemas.microsoft.com/office/powerpoint/2010/main" val="2310298358"/>
+        <p14:creationId xmlns:p14="http://schemas.microsoft.com/office/powerpoint/2010/main" val="3118825995"/>
       </p:ext>
     </p:extLst>
   </p:cSld>
@@ -15950,6 +16197,162 @@
       </p:pic>
       <p:sp>
         <p:nvSpPr>
+          <p:cNvPr id="2" name="Content Placeholder 1">
+            <a:extLst>
+              <a:ext uri="{FF2B5EF4-FFF2-40B4-BE49-F238E27FC236}">
+                <a16:creationId xmlns:a16="http://schemas.microsoft.com/office/drawing/2014/main" id="{48869F42-6D93-4C35-8FA5-AE406994C1E3}"/>
+              </a:ext>
+            </a:extLst>
+          </p:cNvPr>
+          <p:cNvSpPr>
+            <a:spLocks noGrp="1"/>
+          </p:cNvSpPr>
+          <p:nvPr>
+            <p:ph sz="quarter" idx="10"/>
+          </p:nvPr>
+        </p:nvSpPr>
+        <p:spPr/>
+        <p:txBody>
+          <a:bodyPr/>
+          <a:lstStyle/>
+          <a:p>
+            <a:r>
+              <a:rPr lang="en-GB" dirty="0"/>
+              <a:t>Version Control -&gt; Version Control can be something that is difficult/time consuming to complete</a:t>
+            </a:r>
+          </a:p>
+          <a:p>
+            <a:pPr lvl="1">
+              <a:buFont typeface="Courier New" panose="02070309020205020404" pitchFamily="49" charset="0"/>
+              <a:buChar char="o"/>
+            </a:pPr>
+            <a:r>
+              <a:rPr lang="en-GB" dirty="0"/>
+              <a:t>There are often small changes that may seem meaningless to record</a:t>
+            </a:r>
+          </a:p>
+          <a:p>
+            <a:pPr lvl="1">
+              <a:buFont typeface="Courier New" panose="02070309020205020404" pitchFamily="49" charset="0"/>
+              <a:buChar char="o"/>
+            </a:pPr>
+            <a:r>
+              <a:rPr lang="en-GB" dirty="0"/>
+              <a:t>There can be large changes that change the landscape of a file</a:t>
+            </a:r>
+          </a:p>
+          <a:p>
+            <a:pPr lvl="1">
+              <a:buFont typeface="Courier New" panose="02070309020205020404" pitchFamily="49" charset="0"/>
+              <a:buChar char="o"/>
+            </a:pPr>
+            <a:r>
+              <a:rPr lang="en-GB" dirty="0"/>
+              <a:t>Branching allows small and large changes to be tracked, and files to be archived without clutter</a:t>
+            </a:r>
+          </a:p>
+          <a:p>
+            <a:pPr lvl="1">
+              <a:buFont typeface="Courier New" panose="02070309020205020404" pitchFamily="49" charset="0"/>
+              <a:buChar char="o"/>
+            </a:pPr>
+            <a:endParaRPr lang="en-GB" dirty="0"/>
+          </a:p>
+          <a:p>
+            <a:r>
+              <a:rPr lang="en-GB" dirty="0"/>
+              <a:t>Collaborative Working -&gt; The team often works on large R scripts / SQL queries etc. that may constantly change over the process of producing a product</a:t>
+            </a:r>
+          </a:p>
+          <a:p>
+            <a:pPr lvl="1">
+              <a:buFont typeface="Courier New" panose="02070309020205020404" pitchFamily="49" charset="0"/>
+              <a:buChar char="o"/>
+            </a:pPr>
+            <a:r>
+              <a:rPr lang="en-GB" dirty="0"/>
+              <a:t>Multiple colleagues can access scripts, make changes, </a:t>
+            </a:r>
+            <a:r>
+              <a:rPr lang="en-GB" i="1" dirty="0"/>
+              <a:t>push</a:t>
+            </a:r>
+            <a:r>
+              <a:rPr lang="en-GB" dirty="0"/>
+              <a:t> them to the remote, and </a:t>
+            </a:r>
+            <a:r>
+              <a:rPr lang="en-GB" i="1" dirty="0"/>
+              <a:t>pull</a:t>
+            </a:r>
+            <a:r>
+              <a:rPr lang="en-GB" dirty="0"/>
+              <a:t> the changes that others have made</a:t>
+            </a:r>
+          </a:p>
+          <a:p>
+            <a:pPr lvl="1">
+              <a:buFont typeface="Courier New" panose="02070309020205020404" pitchFamily="49" charset="0"/>
+              <a:buChar char="o"/>
+            </a:pPr>
+            <a:r>
+              <a:rPr lang="en-GB" dirty="0"/>
+              <a:t>These changes can be reviewed centrally, and commits and merges can be made where we are confident that change is necessary</a:t>
+            </a:r>
+          </a:p>
+          <a:p>
+            <a:pPr lvl="1">
+              <a:buFont typeface="Courier New" panose="02070309020205020404" pitchFamily="49" charset="0"/>
+              <a:buChar char="o"/>
+            </a:pPr>
+            <a:r>
+              <a:rPr lang="en-GB" dirty="0"/>
+              <a:t>This would be useful for future iterations of PLICS where the R code will likely become much larger, and more people will work on it</a:t>
+            </a:r>
+          </a:p>
+          <a:p>
+            <a:pPr lvl="1">
+              <a:buFont typeface="Courier New" panose="02070309020205020404" pitchFamily="49" charset="0"/>
+              <a:buChar char="o"/>
+            </a:pPr>
+            <a:endParaRPr lang="en-GB" dirty="0"/>
+          </a:p>
+          <a:p>
+            <a:r>
+              <a:rPr lang="en-GB" dirty="0"/>
+              <a:t>Transparency and Schematics -&gt; Schematics can sometimes be difficult to produce as lots of processes have taken place</a:t>
+            </a:r>
+          </a:p>
+          <a:p>
+            <a:pPr lvl="1">
+              <a:buFont typeface="Courier New" panose="02070309020205020404" pitchFamily="49" charset="0"/>
+              <a:buChar char="o"/>
+            </a:pPr>
+            <a:r>
+              <a:rPr lang="en-GB" dirty="0"/>
+              <a:t>This nature of version control allows the steps of change for production documents to be followed easily, if an appropriate naming system is adopted</a:t>
+            </a:r>
+          </a:p>
+          <a:p>
+            <a:pPr lvl="1">
+              <a:buFont typeface="Courier New" panose="02070309020205020404" pitchFamily="49" charset="0"/>
+              <a:buChar char="o"/>
+            </a:pPr>
+            <a:r>
+              <a:rPr lang="en-GB" dirty="0"/>
+              <a:t>The –m messaging feature allows colleagues to label their changes, e.g. ‘lines added for MFF values’</a:t>
+            </a:r>
+          </a:p>
+          <a:p>
+            <a:pPr marL="457200" lvl="1" indent="0">
+              <a:buNone/>
+            </a:pPr>
+            <a:endParaRPr lang="en-GB" dirty="0"/>
+          </a:p>
+        </p:txBody>
+      </p:sp>
+      <p:sp>
+        <p:nvSpPr>
           <p:cNvPr id="3" name="Footer Placeholder 2">
             <a:extLst>
               <a:ext uri="{FF2B5EF4-FFF2-40B4-BE49-F238E27FC236}">
@@ -16000,137 +16403,7 @@
           <a:p>
             <a:r>
               <a:rPr lang="en-GB" dirty="0"/>
-              <a:t>Visual Run: Initialisation</a:t>
-            </a:r>
-          </a:p>
-        </p:txBody>
-      </p:sp>
-      <p:pic>
-        <p:nvPicPr>
-          <p:cNvPr id="7" name="Picture 6">
-            <a:extLst>
-              <a:ext uri="{FF2B5EF4-FFF2-40B4-BE49-F238E27FC236}">
-                <a16:creationId xmlns:a16="http://schemas.microsoft.com/office/drawing/2014/main" id="{E1D8423B-2659-4FCA-865B-E9DFA4510990}"/>
-              </a:ext>
-            </a:extLst>
-          </p:cNvPr>
-          <p:cNvPicPr>
-            <a:picLocks noChangeAspect="1"/>
-          </p:cNvPicPr>
-          <p:nvPr/>
-        </p:nvPicPr>
-        <p:blipFill>
-          <a:blip r:embed="rId4"/>
-          <a:stretch>
-            <a:fillRect/>
-          </a:stretch>
-        </p:blipFill>
-        <p:spPr>
-          <a:xfrm>
-            <a:off x="533227" y="831105"/>
-            <a:ext cx="4838873" cy="3705228"/>
-          </a:xfrm>
-          <a:prstGeom prst="rect">
-            <a:avLst/>
-          </a:prstGeom>
-        </p:spPr>
-      </p:pic>
-      <p:pic>
-        <p:nvPicPr>
-          <p:cNvPr id="9" name="Picture 8">
-            <a:extLst>
-              <a:ext uri="{FF2B5EF4-FFF2-40B4-BE49-F238E27FC236}">
-                <a16:creationId xmlns:a16="http://schemas.microsoft.com/office/drawing/2014/main" id="{35B18837-73B4-49C2-9D15-47B5A2BCA344}"/>
-              </a:ext>
-            </a:extLst>
-          </p:cNvPr>
-          <p:cNvPicPr>
-            <a:picLocks noChangeAspect="1"/>
-          </p:cNvPicPr>
-          <p:nvPr/>
-        </p:nvPicPr>
-        <p:blipFill>
-          <a:blip r:embed="rId5"/>
-          <a:stretch>
-            <a:fillRect/>
-          </a:stretch>
-        </p:blipFill>
-        <p:spPr>
-          <a:xfrm>
-            <a:off x="3282378" y="3483130"/>
-            <a:ext cx="5563376" cy="1914792"/>
-          </a:xfrm>
-          <a:prstGeom prst="rect">
-            <a:avLst/>
-          </a:prstGeom>
-        </p:spPr>
-      </p:pic>
-      <p:sp>
-        <p:nvSpPr>
-          <p:cNvPr id="2" name="TextBox 1">
-            <a:extLst>
-              <a:ext uri="{FF2B5EF4-FFF2-40B4-BE49-F238E27FC236}">
-                <a16:creationId xmlns:a16="http://schemas.microsoft.com/office/drawing/2014/main" id="{112C730F-B8E3-48D8-96DD-B2D963FDE743}"/>
-              </a:ext>
-            </a:extLst>
-          </p:cNvPr>
-          <p:cNvSpPr txBox="1"/>
-          <p:nvPr/>
-        </p:nvSpPr>
-        <p:spPr>
-          <a:xfrm>
-            <a:off x="533227" y="4621158"/>
-            <a:ext cx="2250830" cy="523220"/>
-          </a:xfrm>
-          <a:prstGeom prst="rect">
-            <a:avLst/>
-          </a:prstGeom>
-          <a:noFill/>
-        </p:spPr>
-        <p:txBody>
-          <a:bodyPr wrap="square" rtlCol="0">
-            <a:spAutoFit/>
-          </a:bodyPr>
-          <a:lstStyle/>
-          <a:p>
-            <a:r>
-              <a:rPr lang="en-GB" sz="1400" dirty="0"/>
-              <a:t>1. Creating Local Repository</a:t>
-            </a:r>
-          </a:p>
-        </p:txBody>
-      </p:sp>
-      <p:sp>
-        <p:nvSpPr>
-          <p:cNvPr id="8" name="TextBox 7">
-            <a:extLst>
-              <a:ext uri="{FF2B5EF4-FFF2-40B4-BE49-F238E27FC236}">
-                <a16:creationId xmlns:a16="http://schemas.microsoft.com/office/drawing/2014/main" id="{41B2D551-8370-4ABD-90B0-59962D4915BC}"/>
-              </a:ext>
-            </a:extLst>
-          </p:cNvPr>
-          <p:cNvSpPr txBox="1"/>
-          <p:nvPr/>
-        </p:nvSpPr>
-        <p:spPr>
-          <a:xfrm>
-            <a:off x="3282378" y="5497324"/>
-            <a:ext cx="2250830" cy="738664"/>
-          </a:xfrm>
-          <a:prstGeom prst="rect">
-            <a:avLst/>
-          </a:prstGeom>
-          <a:noFill/>
-        </p:spPr>
-        <p:txBody>
-          <a:bodyPr wrap="square" rtlCol="0">
-            <a:spAutoFit/>
-          </a:bodyPr>
-          <a:lstStyle/>
-          <a:p>
-            <a:r>
-              <a:rPr lang="en-GB" sz="1400" dirty="0"/>
-              <a:t>2. Initialising Repository and Creating global User name/email</a:t>
+              <a:t>Why is this applicable to AIF Payments?</a:t>
             </a:r>
           </a:p>
         </p:txBody>
@@ -16138,7 +16411,7 @@
     </p:spTree>
     <p:extLst>
       <p:ext uri="{BB962C8B-B14F-4D97-AF65-F5344CB8AC3E}">
-        <p14:creationId xmlns:p14="http://schemas.microsoft.com/office/powerpoint/2010/main" val="1632702149"/>
+        <p14:creationId xmlns:p14="http://schemas.microsoft.com/office/powerpoint/2010/main" val="2310298358"/>
       </p:ext>
     </p:extLst>
   </p:cSld>
@@ -16263,18 +16536,18 @@
           <a:lstStyle/>
           <a:p>
             <a:r>
-              <a:rPr lang="en-GB" sz="2800" dirty="0"/>
-              <a:t>Visual Run: Adding Files and Remote</a:t>
+              <a:rPr lang="en-GB" dirty="0"/>
+              <a:t>Visual Run: Initialisation</a:t>
             </a:r>
           </a:p>
         </p:txBody>
       </p:sp>
       <p:pic>
         <p:nvPicPr>
-          <p:cNvPr id="6" name="Picture 5">
-            <a:extLst>
-              <a:ext uri="{FF2B5EF4-FFF2-40B4-BE49-F238E27FC236}">
-                <a16:creationId xmlns:a16="http://schemas.microsoft.com/office/drawing/2014/main" id="{A7280718-E562-4AC0-92E3-E37F575841D1}"/>
+          <p:cNvPr id="7" name="Picture 6">
+            <a:extLst>
+              <a:ext uri="{FF2B5EF4-FFF2-40B4-BE49-F238E27FC236}">
+                <a16:creationId xmlns:a16="http://schemas.microsoft.com/office/drawing/2014/main" id="{E1D8423B-2659-4FCA-865B-E9DFA4510990}"/>
               </a:ext>
             </a:extLst>
           </p:cNvPr>
@@ -16291,8 +16564,8 @@
         </p:blipFill>
         <p:spPr>
           <a:xfrm>
-            <a:off x="188976" y="831106"/>
-            <a:ext cx="2545432" cy="1795599"/>
+            <a:off x="533227" y="831105"/>
+            <a:ext cx="4838873" cy="3705228"/>
           </a:xfrm>
           <a:prstGeom prst="rect">
             <a:avLst/>
@@ -16301,10 +16574,10 @@
       </p:pic>
       <p:pic>
         <p:nvPicPr>
-          <p:cNvPr id="10" name="Picture 9">
-            <a:extLst>
-              <a:ext uri="{FF2B5EF4-FFF2-40B4-BE49-F238E27FC236}">
-                <a16:creationId xmlns:a16="http://schemas.microsoft.com/office/drawing/2014/main" id="{A209B4DA-B8E5-49DC-BF63-2858946E45DB}"/>
+          <p:cNvPr id="9" name="Picture 8">
+            <a:extLst>
+              <a:ext uri="{FF2B5EF4-FFF2-40B4-BE49-F238E27FC236}">
+                <a16:creationId xmlns:a16="http://schemas.microsoft.com/office/drawing/2014/main" id="{35B18837-73B4-49C2-9D15-47B5A2BCA344}"/>
               </a:ext>
             </a:extLst>
           </p:cNvPr>
@@ -16321,120 +16594,30 @@
         </p:blipFill>
         <p:spPr>
           <a:xfrm>
-            <a:off x="4337870" y="1088280"/>
-            <a:ext cx="4383141" cy="1538426"/>
+            <a:off x="3282378" y="3483130"/>
+            <a:ext cx="5563376" cy="1914792"/>
           </a:xfrm>
           <a:prstGeom prst="rect">
             <a:avLst/>
           </a:prstGeom>
         </p:spPr>
       </p:pic>
-      <p:pic>
-        <p:nvPicPr>
-          <p:cNvPr id="12" name="Picture 11">
-            <a:extLst>
-              <a:ext uri="{FF2B5EF4-FFF2-40B4-BE49-F238E27FC236}">
-                <a16:creationId xmlns:a16="http://schemas.microsoft.com/office/drawing/2014/main" id="{D17A6B68-97DC-4D77-A811-CA8F6D8ED9D2}"/>
-              </a:ext>
-            </a:extLst>
-          </p:cNvPr>
-          <p:cNvPicPr>
-            <a:picLocks noChangeAspect="1"/>
-          </p:cNvPicPr>
+      <p:sp>
+        <p:nvSpPr>
+          <p:cNvPr id="2" name="TextBox 1">
+            <a:extLst>
+              <a:ext uri="{FF2B5EF4-FFF2-40B4-BE49-F238E27FC236}">
+                <a16:creationId xmlns:a16="http://schemas.microsoft.com/office/drawing/2014/main" id="{112C730F-B8E3-48D8-96DD-B2D963FDE743}"/>
+              </a:ext>
+            </a:extLst>
+          </p:cNvPr>
+          <p:cNvSpPr txBox="1"/>
           <p:nvPr/>
-        </p:nvPicPr>
-        <p:blipFill>
-          <a:blip r:embed="rId6"/>
-          <a:stretch>
-            <a:fillRect/>
-          </a:stretch>
-        </p:blipFill>
+        </p:nvSpPr>
         <p:spPr>
           <a:xfrm>
-            <a:off x="188976" y="3153956"/>
-            <a:ext cx="3908239" cy="1795599"/>
-          </a:xfrm>
-          <a:prstGeom prst="rect">
-            <a:avLst/>
-          </a:prstGeom>
-        </p:spPr>
-      </p:pic>
-      <p:pic>
-        <p:nvPicPr>
-          <p:cNvPr id="14" name="Picture 13">
-            <a:extLst>
-              <a:ext uri="{FF2B5EF4-FFF2-40B4-BE49-F238E27FC236}">
-                <a16:creationId xmlns:a16="http://schemas.microsoft.com/office/drawing/2014/main" id="{99C37069-AE7F-41BF-AA1F-4BF811FC4FAC}"/>
-              </a:ext>
-            </a:extLst>
-          </p:cNvPr>
-          <p:cNvPicPr>
-            <a:picLocks noChangeAspect="1"/>
-          </p:cNvPicPr>
-          <p:nvPr/>
-        </p:nvPicPr>
-        <p:blipFill>
-          <a:blip r:embed="rId7"/>
-          <a:stretch>
-            <a:fillRect/>
-          </a:stretch>
-        </p:blipFill>
-        <p:spPr>
-          <a:xfrm>
-            <a:off x="4337871" y="3141052"/>
-            <a:ext cx="4383141" cy="1808503"/>
-          </a:xfrm>
-          <a:prstGeom prst="rect">
-            <a:avLst/>
-          </a:prstGeom>
-        </p:spPr>
-      </p:pic>
-      <p:pic>
-        <p:nvPicPr>
-          <p:cNvPr id="16" name="Picture 15">
-            <a:extLst>
-              <a:ext uri="{FF2B5EF4-FFF2-40B4-BE49-F238E27FC236}">
-                <a16:creationId xmlns:a16="http://schemas.microsoft.com/office/drawing/2014/main" id="{CD3239C5-75E0-471B-9A1E-85843CB60BBF}"/>
-              </a:ext>
-            </a:extLst>
-          </p:cNvPr>
-          <p:cNvPicPr>
-            <a:picLocks noChangeAspect="1"/>
-          </p:cNvPicPr>
-          <p:nvPr/>
-        </p:nvPicPr>
-        <p:blipFill>
-          <a:blip r:embed="rId8"/>
-          <a:stretch>
-            <a:fillRect/>
-          </a:stretch>
-        </p:blipFill>
-        <p:spPr>
-          <a:xfrm>
-            <a:off x="2066193" y="5519221"/>
-            <a:ext cx="4383142" cy="523220"/>
-          </a:xfrm>
-          <a:prstGeom prst="rect">
-            <a:avLst/>
-          </a:prstGeom>
-        </p:spPr>
-      </p:pic>
-      <p:sp>
-        <p:nvSpPr>
-          <p:cNvPr id="11" name="TextBox 10">
-            <a:extLst>
-              <a:ext uri="{FF2B5EF4-FFF2-40B4-BE49-F238E27FC236}">
-                <a16:creationId xmlns:a16="http://schemas.microsoft.com/office/drawing/2014/main" id="{F720F03E-342D-4381-8F4D-43B3561662A0}"/>
-              </a:ext>
-            </a:extLst>
-          </p:cNvPr>
-          <p:cNvSpPr txBox="1"/>
-          <p:nvPr/>
-        </p:nvSpPr>
-        <p:spPr>
-          <a:xfrm>
-            <a:off x="232293" y="2659141"/>
-            <a:ext cx="2422984" cy="523220"/>
+            <a:off x="533227" y="4621158"/>
+            <a:ext cx="2250830" cy="523220"/>
           </a:xfrm>
           <a:prstGeom prst="rect">
             <a:avLst/>
@@ -16449,17 +16632,17 @@
           <a:p>
             <a:r>
               <a:rPr lang="en-GB" sz="1400" dirty="0"/>
-              <a:t>3. Create first file for repository</a:t>
-            </a:r>
-          </a:p>
-        </p:txBody>
-      </p:sp>
-      <p:sp>
-        <p:nvSpPr>
-          <p:cNvPr id="13" name="TextBox 12">
-            <a:extLst>
-              <a:ext uri="{FF2B5EF4-FFF2-40B4-BE49-F238E27FC236}">
-                <a16:creationId xmlns:a16="http://schemas.microsoft.com/office/drawing/2014/main" id="{9AC92111-7EBB-4255-B2A9-A9F0278CE46B}"/>
+              <a:t>1. Creating Local Repository</a:t>
+            </a:r>
+          </a:p>
+        </p:txBody>
+      </p:sp>
+      <p:sp>
+        <p:nvSpPr>
+          <p:cNvPr id="8" name="TextBox 7">
+            <a:extLst>
+              <a:ext uri="{FF2B5EF4-FFF2-40B4-BE49-F238E27FC236}">
+                <a16:creationId xmlns:a16="http://schemas.microsoft.com/office/drawing/2014/main" id="{41B2D551-8370-4ABD-90B0-59962D4915BC}"/>
               </a:ext>
             </a:extLst>
           </p:cNvPr>
@@ -16468,8 +16651,8 @@
         </p:nvSpPr>
         <p:spPr>
           <a:xfrm>
-            <a:off x="4337871" y="2659141"/>
-            <a:ext cx="4032406" cy="523220"/>
+            <a:off x="3282378" y="5497324"/>
+            <a:ext cx="2250830" cy="738664"/>
           </a:xfrm>
           <a:prstGeom prst="rect">
             <a:avLst/>
@@ -16484,112 +16667,7 @@
           <a:p>
             <a:r>
               <a:rPr lang="en-GB" sz="1400" dirty="0"/>
-              <a:t>4. Check status, add and commit file with message</a:t>
-            </a:r>
-          </a:p>
-        </p:txBody>
-      </p:sp>
-      <p:sp>
-        <p:nvSpPr>
-          <p:cNvPr id="15" name="TextBox 14">
-            <a:extLst>
-              <a:ext uri="{FF2B5EF4-FFF2-40B4-BE49-F238E27FC236}">
-                <a16:creationId xmlns:a16="http://schemas.microsoft.com/office/drawing/2014/main" id="{35C79EAA-B192-46CA-A8B0-C2EA949CB849}"/>
-              </a:ext>
-            </a:extLst>
-          </p:cNvPr>
-          <p:cNvSpPr txBox="1"/>
-          <p:nvPr/>
-        </p:nvSpPr>
-        <p:spPr>
-          <a:xfrm>
-            <a:off x="188976" y="5059052"/>
-            <a:ext cx="2967462" cy="307777"/>
-          </a:xfrm>
-          <a:prstGeom prst="rect">
-            <a:avLst/>
-          </a:prstGeom>
-          <a:noFill/>
-        </p:spPr>
-        <p:txBody>
-          <a:bodyPr wrap="square" rtlCol="0">
-            <a:spAutoFit/>
-          </a:bodyPr>
-          <a:lstStyle/>
-          <a:p>
-            <a:r>
-              <a:rPr lang="en-GB" sz="1400" dirty="0"/>
-              <a:t>5. Create ‘remote’ repo on GitHub</a:t>
-            </a:r>
-          </a:p>
-        </p:txBody>
-      </p:sp>
-      <p:sp>
-        <p:nvSpPr>
-          <p:cNvPr id="17" name="TextBox 16">
-            <a:extLst>
-              <a:ext uri="{FF2B5EF4-FFF2-40B4-BE49-F238E27FC236}">
-                <a16:creationId xmlns:a16="http://schemas.microsoft.com/office/drawing/2014/main" id="{1931B312-AB1C-4F0B-9F6F-BAEDE0155D4C}"/>
-              </a:ext>
-            </a:extLst>
-          </p:cNvPr>
-          <p:cNvSpPr txBox="1"/>
-          <p:nvPr/>
-        </p:nvSpPr>
-        <p:spPr>
-          <a:xfrm>
-            <a:off x="4333046" y="5012885"/>
-            <a:ext cx="4621977" cy="307777"/>
-          </a:xfrm>
-          <a:prstGeom prst="rect">
-            <a:avLst/>
-          </a:prstGeom>
-          <a:noFill/>
-        </p:spPr>
-        <p:txBody>
-          <a:bodyPr wrap="square" rtlCol="0">
-            <a:spAutoFit/>
-          </a:bodyPr>
-          <a:lstStyle/>
-          <a:p>
-            <a:r>
-              <a:rPr lang="en-GB" sz="1400" dirty="0"/>
-              <a:t>6. Connect local and remote repos, push files</a:t>
-            </a:r>
-          </a:p>
-        </p:txBody>
-      </p:sp>
-      <p:sp>
-        <p:nvSpPr>
-          <p:cNvPr id="18" name="TextBox 17">
-            <a:extLst>
-              <a:ext uri="{FF2B5EF4-FFF2-40B4-BE49-F238E27FC236}">
-                <a16:creationId xmlns:a16="http://schemas.microsoft.com/office/drawing/2014/main" id="{2CB3F09B-1A7D-4587-890E-7DFD87024F9D}"/>
-              </a:ext>
-            </a:extLst>
-          </p:cNvPr>
-          <p:cNvSpPr txBox="1"/>
-          <p:nvPr/>
-        </p:nvSpPr>
-        <p:spPr>
-          <a:xfrm>
-            <a:off x="232293" y="6034052"/>
-            <a:ext cx="3618738" cy="307777"/>
-          </a:xfrm>
-          <a:prstGeom prst="rect">
-            <a:avLst/>
-          </a:prstGeom>
-          <a:noFill/>
-        </p:spPr>
-        <p:txBody>
-          <a:bodyPr wrap="square" rtlCol="0">
-            <a:spAutoFit/>
-          </a:bodyPr>
-          <a:lstStyle/>
-          <a:p>
-            <a:r>
-              <a:rPr lang="en-GB" sz="1400" dirty="0"/>
-              <a:t>7. Check GitHub to see files and branches</a:t>
+              <a:t>2. Initialising Repository and Creating global User name/email</a:t>
             </a:r>
           </a:p>
         </p:txBody>
@@ -16597,7 +16675,7 @@
     </p:spTree>
     <p:extLst>
       <p:ext uri="{BB962C8B-B14F-4D97-AF65-F5344CB8AC3E}">
-        <p14:creationId xmlns:p14="http://schemas.microsoft.com/office/powerpoint/2010/main" val="3909519556"/>
+        <p14:creationId xmlns:p14="http://schemas.microsoft.com/office/powerpoint/2010/main" val="1632702149"/>
       </p:ext>
     </p:extLst>
   </p:cSld>
@@ -16722,8 +16800,8 @@
           <a:lstStyle/>
           <a:p>
             <a:r>
-              <a:rPr lang="en-GB" dirty="0"/>
-              <a:t>Visual Run: Creating Branches</a:t>
+              <a:rPr lang="en-GB" sz="2800" dirty="0"/>
+              <a:t>Visual Run: Adding Files and Remote</a:t>
             </a:r>
           </a:p>
         </p:txBody>
@@ -16733,7 +16811,7 @@
           <p:cNvPr id="6" name="Picture 5">
             <a:extLst>
               <a:ext uri="{FF2B5EF4-FFF2-40B4-BE49-F238E27FC236}">
-                <a16:creationId xmlns:a16="http://schemas.microsoft.com/office/drawing/2014/main" id="{F7EA2DAB-6838-47F9-8C37-D66B5970B4A0}"/>
+                <a16:creationId xmlns:a16="http://schemas.microsoft.com/office/drawing/2014/main" id="{A7280718-E562-4AC0-92E3-E37F575841D1}"/>
               </a:ext>
             </a:extLst>
           </p:cNvPr>
@@ -16750,8 +16828,8 @@
         </p:blipFill>
         <p:spPr>
           <a:xfrm>
-            <a:off x="188976" y="1050282"/>
-            <a:ext cx="6449325" cy="466790"/>
+            <a:off x="188976" y="831106"/>
+            <a:ext cx="2545432" cy="1795599"/>
           </a:xfrm>
           <a:prstGeom prst="rect">
             <a:avLst/>
@@ -16760,10 +16838,10 @@
       </p:pic>
       <p:pic>
         <p:nvPicPr>
-          <p:cNvPr id="8" name="Picture 7">
-            <a:extLst>
-              <a:ext uri="{FF2B5EF4-FFF2-40B4-BE49-F238E27FC236}">
-                <a16:creationId xmlns:a16="http://schemas.microsoft.com/office/drawing/2014/main" id="{2B786FDD-9868-44C0-A890-CA9AFF167533}"/>
+          <p:cNvPr id="10" name="Picture 9">
+            <a:extLst>
+              <a:ext uri="{FF2B5EF4-FFF2-40B4-BE49-F238E27FC236}">
+                <a16:creationId xmlns:a16="http://schemas.microsoft.com/office/drawing/2014/main" id="{A209B4DA-B8E5-49DC-BF63-2858946E45DB}"/>
               </a:ext>
             </a:extLst>
           </p:cNvPr>
@@ -16780,8 +16858,8 @@
         </p:blipFill>
         <p:spPr>
           <a:xfrm>
-            <a:off x="188976" y="1626204"/>
-            <a:ext cx="2174485" cy="1983971"/>
+            <a:off x="4337870" y="1088280"/>
+            <a:ext cx="4383141" cy="1538426"/>
           </a:xfrm>
           <a:prstGeom prst="rect">
             <a:avLst/>
@@ -16790,10 +16868,10 @@
       </p:pic>
       <p:pic>
         <p:nvPicPr>
-          <p:cNvPr id="10" name="Picture 9">
-            <a:extLst>
-              <a:ext uri="{FF2B5EF4-FFF2-40B4-BE49-F238E27FC236}">
-                <a16:creationId xmlns:a16="http://schemas.microsoft.com/office/drawing/2014/main" id="{EA2BE417-1870-4DEC-B25E-857EC7903C7D}"/>
+          <p:cNvPr id="12" name="Picture 11">
+            <a:extLst>
+              <a:ext uri="{FF2B5EF4-FFF2-40B4-BE49-F238E27FC236}">
+                <a16:creationId xmlns:a16="http://schemas.microsoft.com/office/drawing/2014/main" id="{D17A6B68-97DC-4D77-A811-CA8F6D8ED9D2}"/>
               </a:ext>
             </a:extLst>
           </p:cNvPr>
@@ -16810,20 +16888,80 @@
         </p:blipFill>
         <p:spPr>
           <a:xfrm>
-            <a:off x="188976" y="3719307"/>
-            <a:ext cx="6449325" cy="2400635"/>
+            <a:off x="188976" y="3153956"/>
+            <a:ext cx="3908239" cy="1795599"/>
           </a:xfrm>
           <a:prstGeom prst="rect">
             <a:avLst/>
           </a:prstGeom>
         </p:spPr>
       </p:pic>
-      <p:sp>
-        <p:nvSpPr>
-          <p:cNvPr id="9" name="TextBox 8">
-            <a:extLst>
-              <a:ext uri="{FF2B5EF4-FFF2-40B4-BE49-F238E27FC236}">
-                <a16:creationId xmlns:a16="http://schemas.microsoft.com/office/drawing/2014/main" id="{EB6E1195-F03C-4D26-B8CC-E97C1D419112}"/>
+      <p:pic>
+        <p:nvPicPr>
+          <p:cNvPr id="14" name="Picture 13">
+            <a:extLst>
+              <a:ext uri="{FF2B5EF4-FFF2-40B4-BE49-F238E27FC236}">
+                <a16:creationId xmlns:a16="http://schemas.microsoft.com/office/drawing/2014/main" id="{99C37069-AE7F-41BF-AA1F-4BF811FC4FAC}"/>
+              </a:ext>
+            </a:extLst>
+          </p:cNvPr>
+          <p:cNvPicPr>
+            <a:picLocks noChangeAspect="1"/>
+          </p:cNvPicPr>
+          <p:nvPr/>
+        </p:nvPicPr>
+        <p:blipFill>
+          <a:blip r:embed="rId7"/>
+          <a:stretch>
+            <a:fillRect/>
+          </a:stretch>
+        </p:blipFill>
+        <p:spPr>
+          <a:xfrm>
+            <a:off x="4337871" y="3141052"/>
+            <a:ext cx="4383141" cy="1808503"/>
+          </a:xfrm>
+          <a:prstGeom prst="rect">
+            <a:avLst/>
+          </a:prstGeom>
+        </p:spPr>
+      </p:pic>
+      <p:pic>
+        <p:nvPicPr>
+          <p:cNvPr id="16" name="Picture 15">
+            <a:extLst>
+              <a:ext uri="{FF2B5EF4-FFF2-40B4-BE49-F238E27FC236}">
+                <a16:creationId xmlns:a16="http://schemas.microsoft.com/office/drawing/2014/main" id="{CD3239C5-75E0-471B-9A1E-85843CB60BBF}"/>
+              </a:ext>
+            </a:extLst>
+          </p:cNvPr>
+          <p:cNvPicPr>
+            <a:picLocks noChangeAspect="1"/>
+          </p:cNvPicPr>
+          <p:nvPr/>
+        </p:nvPicPr>
+        <p:blipFill>
+          <a:blip r:embed="rId8"/>
+          <a:stretch>
+            <a:fillRect/>
+          </a:stretch>
+        </p:blipFill>
+        <p:spPr>
+          <a:xfrm>
+            <a:off x="2066193" y="5519221"/>
+            <a:ext cx="4383142" cy="523220"/>
+          </a:xfrm>
+          <a:prstGeom prst="rect">
+            <a:avLst/>
+          </a:prstGeom>
+        </p:spPr>
+      </p:pic>
+      <p:sp>
+        <p:nvSpPr>
+          <p:cNvPr id="11" name="TextBox 10">
+            <a:extLst>
+              <a:ext uri="{FF2B5EF4-FFF2-40B4-BE49-F238E27FC236}">
+                <a16:creationId xmlns:a16="http://schemas.microsoft.com/office/drawing/2014/main" id="{F720F03E-342D-4381-8F4D-43B3561662A0}"/>
               </a:ext>
             </a:extLst>
           </p:cNvPr>
@@ -16832,7 +16970,7 @@
         </p:nvSpPr>
         <p:spPr>
           <a:xfrm>
-            <a:off x="6638301" y="1036561"/>
+            <a:off x="232293" y="2659141"/>
             <a:ext cx="2422984" cy="523220"/>
           </a:xfrm>
           <a:prstGeom prst="rect">
@@ -16848,17 +16986,17 @@
           <a:p>
             <a:r>
               <a:rPr lang="en-GB" sz="1400" dirty="0"/>
-              <a:t>8. Create and move to new branch</a:t>
-            </a:r>
-          </a:p>
-        </p:txBody>
-      </p:sp>
-      <p:sp>
-        <p:nvSpPr>
-          <p:cNvPr id="11" name="TextBox 10">
-            <a:extLst>
-              <a:ext uri="{FF2B5EF4-FFF2-40B4-BE49-F238E27FC236}">
-                <a16:creationId xmlns:a16="http://schemas.microsoft.com/office/drawing/2014/main" id="{32F1990D-C26F-4050-957A-3FF8640573A8}"/>
+              <a:t>3. Create first file for repository</a:t>
+            </a:r>
+          </a:p>
+        </p:txBody>
+      </p:sp>
+      <p:sp>
+        <p:nvSpPr>
+          <p:cNvPr id="13" name="TextBox 12">
+            <a:extLst>
+              <a:ext uri="{FF2B5EF4-FFF2-40B4-BE49-F238E27FC236}">
+                <a16:creationId xmlns:a16="http://schemas.microsoft.com/office/drawing/2014/main" id="{9AC92111-7EBB-4255-B2A9-A9F0278CE46B}"/>
               </a:ext>
             </a:extLst>
           </p:cNvPr>
@@ -16867,8 +17005,8 @@
         </p:nvSpPr>
         <p:spPr>
           <a:xfrm>
-            <a:off x="3168269" y="2356579"/>
-            <a:ext cx="3587761" cy="307777"/>
+            <a:off x="4337871" y="2659141"/>
+            <a:ext cx="4032406" cy="523220"/>
           </a:xfrm>
           <a:prstGeom prst="rect">
             <a:avLst/>
@@ -16883,17 +17021,17 @@
           <a:p>
             <a:r>
               <a:rPr lang="en-GB" sz="1400" dirty="0"/>
-              <a:t>9. Edit file within the new branch and save</a:t>
-            </a:r>
-          </a:p>
-        </p:txBody>
-      </p:sp>
-      <p:sp>
-        <p:nvSpPr>
-          <p:cNvPr id="12" name="TextBox 11">
-            <a:extLst>
-              <a:ext uri="{FF2B5EF4-FFF2-40B4-BE49-F238E27FC236}">
-                <a16:creationId xmlns:a16="http://schemas.microsoft.com/office/drawing/2014/main" id="{10CE4C5C-EDFB-4AC2-909C-75EF358030A5}"/>
+              <a:t>4. Check status, add and commit file with message</a:t>
+            </a:r>
+          </a:p>
+        </p:txBody>
+      </p:sp>
+      <p:sp>
+        <p:nvSpPr>
+          <p:cNvPr id="15" name="TextBox 14">
+            <a:extLst>
+              <a:ext uri="{FF2B5EF4-FFF2-40B4-BE49-F238E27FC236}">
+                <a16:creationId xmlns:a16="http://schemas.microsoft.com/office/drawing/2014/main" id="{35C79EAA-B192-46CA-A8B0-C2EA949CB849}"/>
               </a:ext>
             </a:extLst>
           </p:cNvPr>
@@ -16902,8 +17040,8 @@
         </p:nvSpPr>
         <p:spPr>
           <a:xfrm>
-            <a:off x="6638301" y="4660971"/>
-            <a:ext cx="2422984" cy="738664"/>
+            <a:off x="188976" y="5059052"/>
+            <a:ext cx="2967462" cy="307777"/>
           </a:xfrm>
           <a:prstGeom prst="rect">
             <a:avLst/>
@@ -16918,7 +17056,77 @@
           <a:p>
             <a:r>
               <a:rPr lang="en-GB" sz="1400" dirty="0"/>
-              <a:t>10. Check status, add changes and commit with message</a:t>
+              <a:t>5. Create ‘remote’ repo on GitHub</a:t>
+            </a:r>
+          </a:p>
+        </p:txBody>
+      </p:sp>
+      <p:sp>
+        <p:nvSpPr>
+          <p:cNvPr id="17" name="TextBox 16">
+            <a:extLst>
+              <a:ext uri="{FF2B5EF4-FFF2-40B4-BE49-F238E27FC236}">
+                <a16:creationId xmlns:a16="http://schemas.microsoft.com/office/drawing/2014/main" id="{1931B312-AB1C-4F0B-9F6F-BAEDE0155D4C}"/>
+              </a:ext>
+            </a:extLst>
+          </p:cNvPr>
+          <p:cNvSpPr txBox="1"/>
+          <p:nvPr/>
+        </p:nvSpPr>
+        <p:spPr>
+          <a:xfrm>
+            <a:off x="4333046" y="5012885"/>
+            <a:ext cx="4621977" cy="307777"/>
+          </a:xfrm>
+          <a:prstGeom prst="rect">
+            <a:avLst/>
+          </a:prstGeom>
+          <a:noFill/>
+        </p:spPr>
+        <p:txBody>
+          <a:bodyPr wrap="square" rtlCol="0">
+            <a:spAutoFit/>
+          </a:bodyPr>
+          <a:lstStyle/>
+          <a:p>
+            <a:r>
+              <a:rPr lang="en-GB" sz="1400" dirty="0"/>
+              <a:t>6. Connect local and remote repos, push files</a:t>
+            </a:r>
+          </a:p>
+        </p:txBody>
+      </p:sp>
+      <p:sp>
+        <p:nvSpPr>
+          <p:cNvPr id="18" name="TextBox 17">
+            <a:extLst>
+              <a:ext uri="{FF2B5EF4-FFF2-40B4-BE49-F238E27FC236}">
+                <a16:creationId xmlns:a16="http://schemas.microsoft.com/office/drawing/2014/main" id="{2CB3F09B-1A7D-4587-890E-7DFD87024F9D}"/>
+              </a:ext>
+            </a:extLst>
+          </p:cNvPr>
+          <p:cNvSpPr txBox="1"/>
+          <p:nvPr/>
+        </p:nvSpPr>
+        <p:spPr>
+          <a:xfrm>
+            <a:off x="232293" y="6034052"/>
+            <a:ext cx="3618738" cy="307777"/>
+          </a:xfrm>
+          <a:prstGeom prst="rect">
+            <a:avLst/>
+          </a:prstGeom>
+          <a:noFill/>
+        </p:spPr>
+        <p:txBody>
+          <a:bodyPr wrap="square" rtlCol="0">
+            <a:spAutoFit/>
+          </a:bodyPr>
+          <a:lstStyle/>
+          <a:p>
+            <a:r>
+              <a:rPr lang="en-GB" sz="1400" dirty="0"/>
+              <a:t>7. Check GitHub to see files and branches</a:t>
             </a:r>
           </a:p>
         </p:txBody>
@@ -16926,7 +17134,7 @@
     </p:spTree>
     <p:extLst>
       <p:ext uri="{BB962C8B-B14F-4D97-AF65-F5344CB8AC3E}">
-        <p14:creationId xmlns:p14="http://schemas.microsoft.com/office/powerpoint/2010/main" val="98407624"/>
+        <p14:creationId xmlns:p14="http://schemas.microsoft.com/office/powerpoint/2010/main" val="3909519556"/>
       </p:ext>
     </p:extLst>
   </p:cSld>
@@ -17768,15 +17976,6 @@
 </file>
 
 <file path=customXml/item1.xml><?xml version="1.0" encoding="utf-8"?>
-<?mso-contentType ?>
-<FormTemplates xmlns="http://schemas.microsoft.com/sharepoint/v3/contenttype/forms">
-  <Display>DocumentLibraryForm</Display>
-  <Edit>DocumentLibraryForm</Edit>
-  <New>DocumentLibraryForm</New>
-</FormTemplates>
-</file>
-
-<file path=customXml/item2.xml><?xml version="1.0" encoding="utf-8"?>
 <ct:contentTypeSchema xmlns:ct="http://schemas.microsoft.com/office/2006/metadata/contentType" xmlns:ma="http://schemas.microsoft.com/office/2006/metadata/properties/metaAttributes" ct:_="" ma:_="" ma:contentTypeName="Document" ma:contentTypeID="0x010100308E40E706C7A346904F58642B7D1969" ma:contentTypeVersion="0" ma:contentTypeDescription="Create a new document." ma:contentTypeScope="" ma:versionID="0ea485b46902d4f7e49967f1b2c25a65">
   <xsd:schema xmlns:xsd="http://www.w3.org/2001/XMLSchema" xmlns:xs="http://www.w3.org/2001/XMLSchema" xmlns:p="http://schemas.microsoft.com/office/2006/metadata/properties" targetNamespace="http://schemas.microsoft.com/office/2006/metadata/properties" ma:root="true" ma:fieldsID="90078a0fe6c183ae62661f67b7399e8a">
     <xsd:element name="properties">
@@ -17890,6 +18089,15 @@
 </ct:contentTypeSchema>
 </file>
 
+<file path=customXml/item2.xml><?xml version="1.0" encoding="utf-8"?>
+<?mso-contentType ?>
+<FormTemplates xmlns="http://schemas.microsoft.com/sharepoint/v3/contenttype/forms">
+  <Display>DocumentLibraryForm</Display>
+  <Edit>DocumentLibraryForm</Edit>
+  <New>DocumentLibraryForm</New>
+</FormTemplates>
+</file>
+
 <file path=customXml/item3.xml><?xml version="1.0" encoding="utf-8"?>
 <p:properties xmlns:p="http://schemas.microsoft.com/office/2006/metadata/properties" xmlns:xsi="http://www.w3.org/2001/XMLSchema-instance" xmlns:pc="http://schemas.microsoft.com/office/infopath/2007/PartnerControls">
   <documentManagement/>
@@ -17897,14 +18105,6 @@
 </file>
 
 <file path=customXml/itemProps1.xml><?xml version="1.0" encoding="utf-8"?>
-<ds:datastoreItem xmlns:ds="http://schemas.openxmlformats.org/officeDocument/2006/customXml" ds:itemID="{A6333066-D95F-4DC9-8F45-8431A5C3C76B}">
-  <ds:schemaRefs>
-    <ds:schemaRef ds:uri="http://schemas.microsoft.com/sharepoint/v3/contenttype/forms"/>
-  </ds:schemaRefs>
-</ds:datastoreItem>
-</file>
-
-<file path=customXml/itemProps2.xml><?xml version="1.0" encoding="utf-8"?>
 <ds:datastoreItem xmlns:ds="http://schemas.openxmlformats.org/officeDocument/2006/customXml" ds:itemID="{08DD32EF-F09C-4573-9C23-B48EA7D5886E}">
   <ds:schemaRefs>
     <ds:schemaRef ds:uri="http://schemas.microsoft.com/office/2006/metadata/contentType"/>
@@ -17916,6 +18116,14 @@
     <ds:schemaRef ds:uri="http://purl.org/dc/terms/"/>
     <ds:schemaRef ds:uri="http://schemas.microsoft.com/internal/obd"/>
     <ds:schemaRef ds:uri="http://schemas.microsoft.com/office/infopath/2007/PartnerControls"/>
+  </ds:schemaRefs>
+</ds:datastoreItem>
+</file>
+
+<file path=customXml/itemProps2.xml><?xml version="1.0" encoding="utf-8"?>
+<ds:datastoreItem xmlns:ds="http://schemas.openxmlformats.org/officeDocument/2006/customXml" ds:itemID="{A6333066-D95F-4DC9-8F45-8431A5C3C76B}">
+  <ds:schemaRefs>
+    <ds:schemaRef ds:uri="http://schemas.microsoft.com/sharepoint/v3/contenttype/forms"/>
   </ds:schemaRefs>
 </ds:datastoreItem>
 </file>

</xml_diff>